<commit_message>
upload chapter4 ppt -v2
</commit_message>
<xml_diff>
--- a/Javascript_Perfect_Guide/week02_c04.pptx
+++ b/Javascript_Perfect_Guide/week02_c04.pptx
@@ -5,7 +5,7 @@
     <p:sldMasterId id="2147483648" r:id="rId1"/>
   </p:sldMasterIdLst>
   <p:notesMasterIdLst>
-    <p:notesMasterId r:id="rId16"/>
+    <p:notesMasterId r:id="rId17"/>
   </p:notesMasterIdLst>
   <p:sldIdLst>
     <p:sldId id="256" r:id="rId2"/>
@@ -21,7 +21,8 @@
     <p:sldId id="271" r:id="rId12"/>
     <p:sldId id="272" r:id="rId13"/>
     <p:sldId id="273" r:id="rId14"/>
-    <p:sldId id="274" r:id="rId15"/>
+    <p:sldId id="275" r:id="rId15"/>
+    <p:sldId id="274" r:id="rId16"/>
   </p:sldIdLst>
   <p:sldSz cx="9144000" cy="6858000" type="screen4x3"/>
   <p:notesSz cx="6858000" cy="9144000"/>
@@ -221,7 +222,7 @@
           <a:p>
             <a:fld id="{05C7776E-DE5C-4F05-B07F-00A91CF8752B}" type="datetimeFigureOut">
               <a:rPr lang="ko-KR" altLang="en-US" smtClean="0"/>
-              <a:t>2018. 1. 8.</a:t>
+              <a:t>2018. 1. 9.</a:t>
             </a:fld>
             <a:endParaRPr lang="ko-KR" altLang="en-US"/>
           </a:p>
@@ -911,6 +912,92 @@
     </p:spTree>
     <p:extLst>
       <p:ext uri="{BB962C8B-B14F-4D97-AF65-F5344CB8AC3E}">
+        <p14:creationId xmlns:p14="http://schemas.microsoft.com/office/powerpoint/2010/main" val="518146150"/>
+      </p:ext>
+    </p:extLst>
+  </p:cSld>
+  <p:clrMapOvr>
+    <a:masterClrMapping/>
+  </p:clrMapOvr>
+</p:notes>
+</file>
+
+<file path=ppt/notesSlides/notesSlide14.xml><?xml version="1.0" encoding="utf-8"?>
+<p:notes xmlns:a="http://schemas.openxmlformats.org/drawingml/2006/main" xmlns:r="http://schemas.openxmlformats.org/officeDocument/2006/relationships" xmlns:p="http://schemas.openxmlformats.org/presentationml/2006/main">
+  <p:cSld>
+    <p:spTree>
+      <p:nvGrpSpPr>
+        <p:cNvPr id="1" name=""/>
+        <p:cNvGrpSpPr/>
+        <p:nvPr/>
+      </p:nvGrpSpPr>
+      <p:grpSpPr>
+        <a:xfrm>
+          <a:off x="0" y="0"/>
+          <a:ext cx="0" cy="0"/>
+          <a:chOff x="0" y="0"/>
+          <a:chExt cx="0" cy="0"/>
+        </a:xfrm>
+      </p:grpSpPr>
+      <p:sp>
+        <p:nvSpPr>
+          <p:cNvPr id="2" name="슬라이드 이미지 개체 틀 1"/>
+          <p:cNvSpPr>
+            <a:spLocks noGrp="1" noRot="1" noChangeAspect="1"/>
+          </p:cNvSpPr>
+          <p:nvPr>
+            <p:ph type="sldImg"/>
+          </p:nvPr>
+        </p:nvSpPr>
+        <p:spPr/>
+      </p:sp>
+      <p:sp>
+        <p:nvSpPr>
+          <p:cNvPr id="3" name="슬라이드 노트 개체 틀 2"/>
+          <p:cNvSpPr>
+            <a:spLocks noGrp="1"/>
+          </p:cNvSpPr>
+          <p:nvPr>
+            <p:ph type="body" idx="1"/>
+          </p:nvPr>
+        </p:nvSpPr>
+        <p:spPr/>
+        <p:txBody>
+          <a:bodyPr>
+            <a:normAutofit/>
+          </a:bodyPr>
+          <a:lstStyle/>
+          <a:p>
+            <a:endParaRPr lang="ko-KR" altLang="en-US" dirty="0"/>
+          </a:p>
+        </p:txBody>
+      </p:sp>
+      <p:sp>
+        <p:nvSpPr>
+          <p:cNvPr id="4" name="슬라이드 번호 개체 틀 3"/>
+          <p:cNvSpPr>
+            <a:spLocks noGrp="1"/>
+          </p:cNvSpPr>
+          <p:nvPr>
+            <p:ph type="sldNum" sz="quarter" idx="10"/>
+          </p:nvPr>
+        </p:nvSpPr>
+        <p:spPr/>
+        <p:txBody>
+          <a:bodyPr/>
+          <a:lstStyle/>
+          <a:p>
+            <a:fld id="{363F2302-BBF3-4341-9BA5-57316F180DD2}" type="slidenum">
+              <a:rPr lang="ko-KR" altLang="en-US" smtClean="0"/>
+              <a:t>15</a:t>
+            </a:fld>
+            <a:endParaRPr lang="ko-KR" altLang="en-US"/>
+          </a:p>
+        </p:txBody>
+      </p:sp>
+    </p:spTree>
+    <p:extLst>
+      <p:ext uri="{BB962C8B-B14F-4D97-AF65-F5344CB8AC3E}">
         <p14:creationId xmlns:p14="http://schemas.microsoft.com/office/powerpoint/2010/main" val="68345715"/>
       </p:ext>
     </p:extLst>
@@ -1790,7 +1877,7 @@
           <a:p>
             <a:fld id="{0D376A1C-8576-477A-9EF2-422E0DEFCEB8}" type="datetimeFigureOut">
               <a:rPr lang="ko-KR" altLang="en-US" smtClean="0"/>
-              <a:t>2018. 1. 8.</a:t>
+              <a:t>2018. 1. 9.</a:t>
             </a:fld>
             <a:endParaRPr lang="ko-KR" altLang="en-US"/>
           </a:p>
@@ -1955,7 +2042,7 @@
           <a:p>
             <a:fld id="{0D376A1C-8576-477A-9EF2-422E0DEFCEB8}" type="datetimeFigureOut">
               <a:rPr lang="ko-KR" altLang="en-US" smtClean="0"/>
-              <a:t>2018. 1. 8.</a:t>
+              <a:t>2018. 1. 9.</a:t>
             </a:fld>
             <a:endParaRPr lang="ko-KR" altLang="en-US"/>
           </a:p>
@@ -2130,7 +2217,7 @@
           <a:p>
             <a:fld id="{0D376A1C-8576-477A-9EF2-422E0DEFCEB8}" type="datetimeFigureOut">
               <a:rPr lang="ko-KR" altLang="en-US" smtClean="0"/>
-              <a:t>2018. 1. 8.</a:t>
+              <a:t>2018. 1. 9.</a:t>
             </a:fld>
             <a:endParaRPr lang="ko-KR" altLang="en-US"/>
           </a:p>
@@ -2295,7 +2382,7 @@
           <a:p>
             <a:fld id="{0D376A1C-8576-477A-9EF2-422E0DEFCEB8}" type="datetimeFigureOut">
               <a:rPr lang="ko-KR" altLang="en-US" smtClean="0"/>
-              <a:t>2018. 1. 8.</a:t>
+              <a:t>2018. 1. 9.</a:t>
             </a:fld>
             <a:endParaRPr lang="ko-KR" altLang="en-US"/>
           </a:p>
@@ -2536,7 +2623,7 @@
           <a:p>
             <a:fld id="{0D376A1C-8576-477A-9EF2-422E0DEFCEB8}" type="datetimeFigureOut">
               <a:rPr lang="ko-KR" altLang="en-US" smtClean="0"/>
-              <a:t>2018. 1. 8.</a:t>
+              <a:t>2018. 1. 9.</a:t>
             </a:fld>
             <a:endParaRPr lang="ko-KR" altLang="en-US"/>
           </a:p>
@@ -2819,7 +2906,7 @@
           <a:p>
             <a:fld id="{0D376A1C-8576-477A-9EF2-422E0DEFCEB8}" type="datetimeFigureOut">
               <a:rPr lang="ko-KR" altLang="en-US" smtClean="0"/>
-              <a:t>2018. 1. 8.</a:t>
+              <a:t>2018. 1. 9.</a:t>
             </a:fld>
             <a:endParaRPr lang="ko-KR" altLang="en-US"/>
           </a:p>
@@ -3236,7 +3323,7 @@
           <a:p>
             <a:fld id="{0D376A1C-8576-477A-9EF2-422E0DEFCEB8}" type="datetimeFigureOut">
               <a:rPr lang="ko-KR" altLang="en-US" smtClean="0"/>
-              <a:t>2018. 1. 8.</a:t>
+              <a:t>2018. 1. 9.</a:t>
             </a:fld>
             <a:endParaRPr lang="ko-KR" altLang="en-US"/>
           </a:p>
@@ -3349,7 +3436,7 @@
           <a:p>
             <a:fld id="{0D376A1C-8576-477A-9EF2-422E0DEFCEB8}" type="datetimeFigureOut">
               <a:rPr lang="ko-KR" altLang="en-US" smtClean="0"/>
-              <a:t>2018. 1. 8.</a:t>
+              <a:t>2018. 1. 9.</a:t>
             </a:fld>
             <a:endParaRPr lang="ko-KR" altLang="en-US"/>
           </a:p>
@@ -3439,7 +3526,7 @@
           <a:p>
             <a:fld id="{0D376A1C-8576-477A-9EF2-422E0DEFCEB8}" type="datetimeFigureOut">
               <a:rPr lang="ko-KR" altLang="en-US" smtClean="0"/>
-              <a:t>2018. 1. 8.</a:t>
+              <a:t>2018. 1. 9.</a:t>
             </a:fld>
             <a:endParaRPr lang="ko-KR" altLang="en-US"/>
           </a:p>
@@ -3711,7 +3798,7 @@
           <a:p>
             <a:fld id="{0D376A1C-8576-477A-9EF2-422E0DEFCEB8}" type="datetimeFigureOut">
               <a:rPr lang="ko-KR" altLang="en-US" smtClean="0"/>
-              <a:t>2018. 1. 8.</a:t>
+              <a:t>2018. 1. 9.</a:t>
             </a:fld>
             <a:endParaRPr lang="ko-KR" altLang="en-US"/>
           </a:p>
@@ -3959,7 +4046,7 @@
           <a:p>
             <a:fld id="{0D376A1C-8576-477A-9EF2-422E0DEFCEB8}" type="datetimeFigureOut">
               <a:rPr lang="ko-KR" altLang="en-US" smtClean="0"/>
-              <a:t>2018. 1. 8.</a:t>
+              <a:t>2018. 1. 9.</a:t>
             </a:fld>
             <a:endParaRPr lang="ko-KR" altLang="en-US"/>
           </a:p>
@@ -4167,7 +4254,7 @@
           <a:p>
             <a:fld id="{0D376A1C-8576-477A-9EF2-422E0DEFCEB8}" type="datetimeFigureOut">
               <a:rPr lang="ko-KR" altLang="en-US" smtClean="0"/>
-              <a:t>2018. 1. 8.</a:t>
+              <a:t>2018. 1. 9.</a:t>
             </a:fld>
             <a:endParaRPr lang="ko-KR" altLang="en-US"/>
           </a:p>
@@ -4586,21 +4673,7 @@
                 <a:ea typeface="Nanum Gothic" charset="-127"/>
                 <a:cs typeface="Nanum Gothic" charset="-127"/>
               </a:rPr>
-              <a:t>주차 자바스크립트 </a:t>
-            </a:r>
-            <a:r>
-              <a:rPr lang="ko-KR" altLang="en-US" sz="1600" dirty="0" smtClean="0">
-                <a:solidFill>
-                  <a:schemeClr val="tx1">
-                    <a:lumMod val="50000"/>
-                    <a:lumOff val="50000"/>
-                  </a:schemeClr>
-                </a:solidFill>
-                <a:latin typeface="Nanum Gothic" charset="-127"/>
-                <a:ea typeface="Nanum Gothic" charset="-127"/>
-                <a:cs typeface="Nanum Gothic" charset="-127"/>
-              </a:rPr>
-              <a:t>스터디</a:t>
+              <a:t>주차 자바스크립트 스터디</a:t>
             </a:r>
             <a:endParaRPr lang="ko-KR" altLang="en-US" sz="1600" dirty="0">
               <a:solidFill>
@@ -5375,7 +5448,7 @@
           <p:nvPr>
             <p:extLst>
               <p:ext uri="{D42A27DB-BD31-4B8C-83A1-F6EECF244321}">
-                <p14:modId xmlns:p14="http://schemas.microsoft.com/office/powerpoint/2010/main" val="232133877"/>
+                <p14:modId xmlns:p14="http://schemas.microsoft.com/office/powerpoint/2010/main" val="1114517277"/>
               </p:ext>
             </p:extLst>
           </p:nvPr>
@@ -5917,20 +5990,6 @@
                         </a:lnSpc>
                       </a:pPr>
                       <a:r>
-                        <a:rPr kumimoji="1" lang="ko-KR" altLang="en-US" sz="1400" dirty="0" smtClean="0">
-                          <a:solidFill>
-                            <a:schemeClr val="tx1">
-                              <a:lumMod val="65000"/>
-                              <a:lumOff val="35000"/>
-                            </a:schemeClr>
-                          </a:solidFill>
-                          <a:latin typeface="Nanum Gothic" charset="-127"/>
-                          <a:ea typeface="Nanum Gothic" charset="-127"/>
-                          <a:cs typeface="Nanum Gothic" charset="-127"/>
-                        </a:rPr>
-                        <a:t>평가 표현식 </a:t>
-                      </a:r>
-                      <a:r>
                         <a:rPr kumimoji="1" lang="en-US" altLang="ko-KR" sz="1400" dirty="0" err="1" smtClean="0">
                           <a:solidFill>
                             <a:schemeClr val="tx1">
@@ -5958,17 +6017,6 @@
                         </a:rPr>
                         <a:t>()</a:t>
                       </a:r>
-                      <a:endParaRPr kumimoji="1" lang="en-US" altLang="ko-KR" sz="1400" dirty="0" smtClean="0">
-                        <a:solidFill>
-                          <a:schemeClr val="tx1">
-                            <a:lumMod val="65000"/>
-                            <a:lumOff val="35000"/>
-                          </a:schemeClr>
-                        </a:solidFill>
-                        <a:latin typeface="Nanum Gothic" charset="-127"/>
-                        <a:ea typeface="Nanum Gothic" charset="-127"/>
-                        <a:cs typeface="Nanum Gothic" charset="-127"/>
-                      </a:endParaRPr>
                     </a:p>
                   </a:txBody>
                   <a:tcPr marL="0" marR="0" marT="0" marB="0" anchor="ctr"/>
@@ -6130,18 +6178,7 @@
                 <a:ea typeface="Nanum Gothic" charset="-127"/>
                 <a:cs typeface="Nanum Gothic" charset="-127"/>
               </a:rPr>
-              <a:t>8</a:t>
-            </a:r>
-            <a:r>
-              <a:rPr lang="en-US" altLang="ko-KR" sz="2000" b="1" dirty="0" smtClean="0">
-                <a:solidFill>
-                  <a:schemeClr val="tx2"/>
-                </a:solidFill>
-                <a:latin typeface="Nanum Gothic" charset="-127"/>
-                <a:ea typeface="Nanum Gothic" charset="-127"/>
-                <a:cs typeface="Nanum Gothic" charset="-127"/>
-              </a:rPr>
-              <a:t>.</a:t>
+              <a:t>8.</a:t>
             </a:r>
             <a:r>
               <a:rPr lang="ko-KR" altLang="en-US" sz="2000" b="1" dirty="0" smtClean="0">
@@ -7903,18 +7940,7 @@
                 <a:ea typeface="Nanum Gothic" charset="-127"/>
                 <a:cs typeface="Nanum Gothic" charset="-127"/>
               </a:rPr>
-              <a:t>9</a:t>
-            </a:r>
-            <a:r>
-              <a:rPr lang="en-US" altLang="ko-KR" sz="2000" b="1" dirty="0" smtClean="0">
-                <a:solidFill>
-                  <a:schemeClr val="tx2"/>
-                </a:solidFill>
-                <a:latin typeface="Nanum Gothic" charset="-127"/>
-                <a:ea typeface="Nanum Gothic" charset="-127"/>
-                <a:cs typeface="Nanum Gothic" charset="-127"/>
-              </a:rPr>
-              <a:t>.</a:t>
+              <a:t>9.</a:t>
             </a:r>
             <a:r>
               <a:rPr lang="ko-KR" altLang="en-US" sz="2000" b="1" dirty="0" smtClean="0">
@@ -9493,18 +9519,7 @@
                 <a:ea typeface="Nanum Gothic" charset="-127"/>
                 <a:cs typeface="Nanum Gothic" charset="-127"/>
               </a:rPr>
-              <a:t>9</a:t>
-            </a:r>
-            <a:r>
-              <a:rPr lang="en-US" altLang="ko-KR" sz="2000" b="1" dirty="0" smtClean="0">
-                <a:solidFill>
-                  <a:schemeClr val="tx2"/>
-                </a:solidFill>
-                <a:latin typeface="Nanum Gothic" charset="-127"/>
-                <a:ea typeface="Nanum Gothic" charset="-127"/>
-                <a:cs typeface="Nanum Gothic" charset="-127"/>
-              </a:rPr>
-              <a:t>.</a:t>
+              <a:t>9.</a:t>
             </a:r>
             <a:r>
               <a:rPr lang="ko-KR" altLang="en-US" sz="2000" b="1" dirty="0" smtClean="0">
@@ -10172,10 +10187,10 @@
                 <a:ea typeface="Nanum Gothic" charset="-127"/>
                 <a:cs typeface="Nanum Gothic" charset="-127"/>
               </a:rPr>
-              <a:t>10</a:t>
-            </a:r>
-            <a:r>
-              <a:rPr lang="en-US" altLang="ko-KR" sz="2000" b="1" dirty="0" smtClean="0">
+              <a:t>10.</a:t>
+            </a:r>
+            <a:r>
+              <a:rPr lang="ko-KR" altLang="en-US" sz="2000" b="1" dirty="0" smtClean="0">
                 <a:solidFill>
                   <a:schemeClr val="tx2"/>
                 </a:solidFill>
@@ -10183,40 +10198,7 @@
                 <a:ea typeface="Nanum Gothic" charset="-127"/>
                 <a:cs typeface="Nanum Gothic" charset="-127"/>
               </a:rPr>
-              <a:t>.</a:t>
-            </a:r>
-            <a:r>
-              <a:rPr lang="ko-KR" altLang="en-US" sz="2000" b="1" dirty="0" smtClean="0">
-                <a:solidFill>
-                  <a:schemeClr val="tx2"/>
-                </a:solidFill>
-                <a:latin typeface="Nanum Gothic" charset="-127"/>
-                <a:ea typeface="Nanum Gothic" charset="-127"/>
-                <a:cs typeface="Nanum Gothic" charset="-127"/>
-              </a:rPr>
-              <a:t> </a:t>
-            </a:r>
-            <a:r>
-              <a:rPr lang="ko-KR" altLang="en-US" sz="2000" b="1" dirty="0" smtClean="0">
-                <a:solidFill>
-                  <a:schemeClr val="tx2"/>
-                </a:solidFill>
-                <a:latin typeface="Nanum Gothic" charset="-127"/>
-                <a:ea typeface="Nanum Gothic" charset="-127"/>
-                <a:cs typeface="Nanum Gothic" charset="-127"/>
-              </a:rPr>
-              <a:t>기타 </a:t>
-            </a:r>
-            <a:r>
-              <a:rPr lang="ko-KR" altLang="en-US" sz="2000" b="1" dirty="0" smtClean="0">
-                <a:solidFill>
-                  <a:schemeClr val="tx2"/>
-                </a:solidFill>
-                <a:latin typeface="Nanum Gothic" charset="-127"/>
-                <a:ea typeface="Nanum Gothic" charset="-127"/>
-                <a:cs typeface="Nanum Gothic" charset="-127"/>
-              </a:rPr>
-              <a:t>연산자</a:t>
+              <a:t> 기타 연산자</a:t>
             </a:r>
             <a:endParaRPr lang="ko-KR" altLang="en-US" sz="2000" b="1" dirty="0">
               <a:solidFill>
@@ -10292,8 +10274,8 @@
         </p:nvSpPr>
         <p:spPr>
           <a:xfrm>
-            <a:off x="546013" y="1663758"/>
-            <a:ext cx="1564852" cy="369332"/>
+            <a:off x="546013" y="980728"/>
+            <a:ext cx="1273105" cy="369332"/>
           </a:xfrm>
           <a:prstGeom prst="rect">
             <a:avLst/>
@@ -10330,7 +10312,20 @@
                 <a:ea typeface="Nanum Gothic" charset="-127"/>
                 <a:cs typeface="Nanum Gothic" charset="-127"/>
               </a:rPr>
-              <a:t>AND ( &amp;&amp; )</a:t>
+              <a:t>in </a:t>
+            </a:r>
+            <a:r>
+              <a:rPr kumimoji="1" lang="ko-KR" altLang="en-US" b="1" dirty="0" smtClean="0">
+                <a:solidFill>
+                  <a:schemeClr val="accent6">
+                    <a:lumMod val="50000"/>
+                  </a:schemeClr>
+                </a:solidFill>
+                <a:latin typeface="Nanum Gothic" charset="-127"/>
+                <a:ea typeface="Nanum Gothic" charset="-127"/>
+                <a:cs typeface="Nanum Gothic" charset="-127"/>
+              </a:rPr>
+              <a:t>연산자</a:t>
             </a:r>
             <a:endParaRPr kumimoji="1" lang="ko-KR" altLang="en-US" b="1" dirty="0">
               <a:solidFill>
@@ -10353,8 +10348,8 @@
         </p:nvSpPr>
         <p:spPr>
           <a:xfrm>
-            <a:off x="732487" y="2033090"/>
-            <a:ext cx="1896673" cy="387798"/>
+            <a:off x="732487" y="1757557"/>
+            <a:ext cx="5844870" cy="978729"/>
           </a:xfrm>
           <a:prstGeom prst="rect">
             <a:avLst/>
@@ -10384,7 +10379,7 @@
                 <a:ea typeface="Nanum Gothic" charset="-127"/>
                 <a:cs typeface="Nanum Gothic" charset="-127"/>
               </a:rPr>
-              <a:t>둘다 </a:t>
+              <a:t>프로퍼티나 인덱스를 체크하는 연산자</a:t>
             </a:r>
             <a:r>
               <a:rPr kumimoji="1" lang="en-US" altLang="ko-KR" sz="1600" dirty="0" smtClean="0">
@@ -10398,6 +10393,143 @@
                 <a:ea typeface="Nanum Gothic" charset="-127"/>
                 <a:cs typeface="Nanum Gothic" charset="-127"/>
               </a:rPr>
+              <a:t>.</a:t>
+            </a:r>
+          </a:p>
+          <a:p>
+            <a:pPr>
+              <a:lnSpc>
+                <a:spcPct val="120000"/>
+              </a:lnSpc>
+            </a:pPr>
+            <a:r>
+              <a:rPr kumimoji="1" lang="ko-KR" altLang="en-US" sz="1600" dirty="0" smtClean="0">
+                <a:solidFill>
+                  <a:schemeClr val="tx1">
+                    <a:lumMod val="75000"/>
+                    <a:lumOff val="25000"/>
+                  </a:schemeClr>
+                </a:solidFill>
+                <a:latin typeface="Nanum Gothic" charset="-127"/>
+                <a:ea typeface="Nanum Gothic" charset="-127"/>
+                <a:cs typeface="Nanum Gothic" charset="-127"/>
+              </a:rPr>
+              <a:t>위와같이 사용하며</a:t>
+            </a:r>
+            <a:r>
+              <a:rPr kumimoji="1" lang="en-US" altLang="ko-KR" sz="1600" dirty="0" smtClean="0">
+                <a:solidFill>
+                  <a:schemeClr val="tx1">
+                    <a:lumMod val="75000"/>
+                    <a:lumOff val="25000"/>
+                  </a:schemeClr>
+                </a:solidFill>
+                <a:latin typeface="Nanum Gothic" charset="-127"/>
+                <a:ea typeface="Nanum Gothic" charset="-127"/>
+                <a:cs typeface="Nanum Gothic" charset="-127"/>
+              </a:rPr>
+              <a:t>,</a:t>
+            </a:r>
+            <a:r>
+              <a:rPr kumimoji="1" lang="ko-KR" altLang="en-US" sz="1600" dirty="0" smtClean="0">
+                <a:solidFill>
+                  <a:schemeClr val="tx1">
+                    <a:lumMod val="75000"/>
+                    <a:lumOff val="25000"/>
+                  </a:schemeClr>
+                </a:solidFill>
+                <a:latin typeface="Nanum Gothic" charset="-127"/>
+                <a:ea typeface="Nanum Gothic" charset="-127"/>
+                <a:cs typeface="Nanum Gothic" charset="-127"/>
+              </a:rPr>
+              <a:t> 좌변이 우변의 </a:t>
+            </a:r>
+            <a:r>
+              <a:rPr kumimoji="1" lang="ko-KR" altLang="en-US" sz="1600" b="1" dirty="0" smtClean="0">
+                <a:solidFill>
+                  <a:schemeClr val="tx1">
+                    <a:lumMod val="75000"/>
+                    <a:lumOff val="25000"/>
+                  </a:schemeClr>
+                </a:solidFill>
+                <a:latin typeface="Nanum Gothic" charset="-127"/>
+                <a:ea typeface="Nanum Gothic" charset="-127"/>
+                <a:cs typeface="Nanum Gothic" charset="-127"/>
+              </a:rPr>
+              <a:t>프로퍼티</a:t>
+            </a:r>
+            <a:r>
+              <a:rPr kumimoji="1" lang="ko-KR" altLang="en-US" sz="1600" dirty="0" smtClean="0">
+                <a:solidFill>
+                  <a:schemeClr val="tx1">
+                    <a:lumMod val="75000"/>
+                    <a:lumOff val="25000"/>
+                  </a:schemeClr>
+                </a:solidFill>
+                <a:latin typeface="Nanum Gothic" charset="-127"/>
+                <a:ea typeface="Nanum Gothic" charset="-127"/>
+                <a:cs typeface="Nanum Gothic" charset="-127"/>
+              </a:rPr>
+              <a:t> 또는 </a:t>
+            </a:r>
+            <a:r>
+              <a:rPr kumimoji="1" lang="ko-KR" altLang="en-US" sz="1600" b="1" dirty="0" smtClean="0">
+                <a:solidFill>
+                  <a:schemeClr val="tx1">
+                    <a:lumMod val="75000"/>
+                    <a:lumOff val="25000"/>
+                  </a:schemeClr>
+                </a:solidFill>
+                <a:latin typeface="Nanum Gothic" charset="-127"/>
+                <a:ea typeface="Nanum Gothic" charset="-127"/>
+                <a:cs typeface="Nanum Gothic" charset="-127"/>
+              </a:rPr>
+              <a:t>인덱스</a:t>
+            </a:r>
+            <a:r>
+              <a:rPr kumimoji="1" lang="ko-KR" altLang="en-US" sz="1600" dirty="0" smtClean="0">
+                <a:solidFill>
+                  <a:schemeClr val="tx1">
+                    <a:lumMod val="75000"/>
+                    <a:lumOff val="25000"/>
+                  </a:schemeClr>
+                </a:solidFill>
+                <a:latin typeface="Nanum Gothic" charset="-127"/>
+                <a:ea typeface="Nanum Gothic" charset="-127"/>
+                <a:cs typeface="Nanum Gothic" charset="-127"/>
+              </a:rPr>
+              <a:t>일 경우에</a:t>
+            </a:r>
+            <a:endParaRPr kumimoji="1" lang="en-US" altLang="ko-KR" sz="1600" dirty="0" smtClean="0">
+              <a:solidFill>
+                <a:schemeClr val="tx1">
+                  <a:lumMod val="75000"/>
+                  <a:lumOff val="25000"/>
+                </a:schemeClr>
+              </a:solidFill>
+              <a:latin typeface="Nanum Gothic" charset="-127"/>
+              <a:ea typeface="Nanum Gothic" charset="-127"/>
+              <a:cs typeface="Nanum Gothic" charset="-127"/>
+            </a:endParaRPr>
+          </a:p>
+          <a:p>
+            <a:pPr>
+              <a:lnSpc>
+                <a:spcPct val="120000"/>
+              </a:lnSpc>
+            </a:pPr>
+            <a:r>
+              <a:rPr kumimoji="1" lang="en-US" altLang="ko-KR" sz="1600" dirty="0" smtClean="0">
+                <a:solidFill>
+                  <a:schemeClr val="tx1">
+                    <a:lumMod val="75000"/>
+                    <a:lumOff val="25000"/>
+                  </a:schemeClr>
+                </a:solidFill>
+                <a:latin typeface="Nanum Gothic" charset="-127"/>
+                <a:ea typeface="Nanum Gothic" charset="-127"/>
+                <a:cs typeface="Nanum Gothic" charset="-127"/>
+              </a:rPr>
               <a:t>true</a:t>
             </a:r>
             <a:r>
@@ -10412,7 +10544,7 @@
                 <a:ea typeface="Nanum Gothic" charset="-127"/>
                 <a:cs typeface="Nanum Gothic" charset="-127"/>
               </a:rPr>
-              <a:t>일 때 </a:t>
+              <a:t>를 반환한다</a:t>
             </a:r>
             <a:r>
               <a:rPr kumimoji="1" lang="en-US" altLang="ko-KR" sz="1600" dirty="0" smtClean="0">
@@ -10426,7 +10558,35 @@
                 <a:ea typeface="Nanum Gothic" charset="-127"/>
                 <a:cs typeface="Nanum Gothic" charset="-127"/>
               </a:rPr>
-              <a:t>true</a:t>
+              <a:t>.</a:t>
+            </a:r>
+            <a:r>
+              <a:rPr kumimoji="1" lang="ko-KR" altLang="en-US" sz="1600" dirty="0" smtClean="0">
+                <a:solidFill>
+                  <a:schemeClr val="tx1">
+                    <a:lumMod val="75000"/>
+                    <a:lumOff val="25000"/>
+                  </a:schemeClr>
+                </a:solidFill>
+                <a:latin typeface="Nanum Gothic" charset="-127"/>
+                <a:ea typeface="Nanum Gothic" charset="-127"/>
+                <a:cs typeface="Nanum Gothic" charset="-127"/>
+              </a:rPr>
+              <a:t> 그렇지 않을 때 </a:t>
+            </a:r>
+            <a:r>
+              <a:rPr kumimoji="1" lang="en-US" altLang="ko-KR" sz="1600" dirty="0" smtClean="0">
+                <a:solidFill>
+                  <a:schemeClr val="tx1">
+                    <a:lumMod val="75000"/>
+                    <a:lumOff val="25000"/>
+                  </a:schemeClr>
+                </a:solidFill>
+                <a:latin typeface="Nanum Gothic" charset="-127"/>
+                <a:ea typeface="Nanum Gothic" charset="-127"/>
+                <a:cs typeface="Nanum Gothic" charset="-127"/>
+              </a:rPr>
+              <a:t>false.</a:t>
             </a:r>
           </a:p>
         </p:txBody>
@@ -10439,8 +10599,8 @@
         </p:nvSpPr>
         <p:spPr>
           <a:xfrm>
-            <a:off x="546012" y="3076921"/>
-            <a:ext cx="1160895" cy="369332"/>
+            <a:off x="546012" y="2924159"/>
+            <a:ext cx="2178802" cy="369332"/>
           </a:xfrm>
           <a:prstGeom prst="rect">
             <a:avLst/>
@@ -10467,6 +10627,19 @@
               <a:t>► </a:t>
             </a:r>
             <a:r>
+              <a:rPr kumimoji="1" lang="en-US" altLang="ko-KR" b="1" dirty="0" err="1" smtClean="0">
+                <a:solidFill>
+                  <a:schemeClr val="accent6">
+                    <a:lumMod val="50000"/>
+                  </a:schemeClr>
+                </a:solidFill>
+                <a:latin typeface="Nanum Gothic" charset="-127"/>
+                <a:ea typeface="Nanum Gothic" charset="-127"/>
+                <a:cs typeface="Nanum Gothic" charset="-127"/>
+              </a:rPr>
+              <a:t>instanceof</a:t>
+            </a:r>
+            <a:r>
               <a:rPr kumimoji="1" lang="en-US" altLang="ko-KR" b="1" dirty="0" smtClean="0">
                 <a:solidFill>
                   <a:schemeClr val="accent6">
@@ -10477,7 +10650,20 @@
                 <a:ea typeface="Nanum Gothic" charset="-127"/>
                 <a:cs typeface="Nanum Gothic" charset="-127"/>
               </a:rPr>
-              <a:t>OR ( || )</a:t>
+              <a:t> </a:t>
+            </a:r>
+            <a:r>
+              <a:rPr kumimoji="1" lang="ko-KR" altLang="en-US" b="1" dirty="0" smtClean="0">
+                <a:solidFill>
+                  <a:schemeClr val="accent6">
+                    <a:lumMod val="50000"/>
+                  </a:schemeClr>
+                </a:solidFill>
+                <a:latin typeface="Nanum Gothic" charset="-127"/>
+                <a:ea typeface="Nanum Gothic" charset="-127"/>
+                <a:cs typeface="Nanum Gothic" charset="-127"/>
+              </a:rPr>
+              <a:t>연산자</a:t>
             </a:r>
             <a:endParaRPr kumimoji="1" lang="ko-KR" altLang="en-US" b="1" dirty="0">
               <a:solidFill>
@@ -10494,14 +10680,14 @@
       </p:sp>
       <p:sp>
         <p:nvSpPr>
-          <p:cNvPr id="12" name="TextBox 11"/>
+          <p:cNvPr id="11" name="TextBox 6"/>
           <p:cNvSpPr txBox="1"/>
           <p:nvPr/>
         </p:nvSpPr>
         <p:spPr>
           <a:xfrm>
-            <a:off x="730799" y="3473250"/>
-            <a:ext cx="2473754" cy="387798"/>
+            <a:off x="735389" y="1380671"/>
+            <a:ext cx="4785284" cy="337785"/>
           </a:xfrm>
           <a:prstGeom prst="rect">
             <a:avLst/>
@@ -10520,85 +10706,228 @@
               </a:lnSpc>
             </a:pPr>
             <a:r>
-              <a:rPr kumimoji="1" lang="ko-KR" altLang="en-US" sz="1600" dirty="0" smtClean="0">
-                <a:solidFill>
-                  <a:schemeClr val="tx1">
-                    <a:lumMod val="75000"/>
-                    <a:lumOff val="25000"/>
-                  </a:schemeClr>
-                </a:solidFill>
-                <a:latin typeface="Nanum Gothic" charset="-127"/>
-                <a:ea typeface="Nanum Gothic" charset="-127"/>
-                <a:cs typeface="Nanum Gothic" charset="-127"/>
-              </a:rPr>
-              <a:t>둘중 하나라도 </a:t>
-            </a:r>
-            <a:r>
-              <a:rPr kumimoji="1" lang="en-US" altLang="ko-KR" sz="1600" dirty="0" smtClean="0">
-                <a:solidFill>
-                  <a:schemeClr val="tx1">
-                    <a:lumMod val="75000"/>
-                    <a:lumOff val="25000"/>
-                  </a:schemeClr>
-                </a:solidFill>
-                <a:latin typeface="Nanum Gothic" charset="-127"/>
-                <a:ea typeface="Nanum Gothic" charset="-127"/>
-                <a:cs typeface="Nanum Gothic" charset="-127"/>
-              </a:rPr>
-              <a:t>true</a:t>
-            </a:r>
-            <a:r>
-              <a:rPr kumimoji="1" lang="ko-KR" altLang="en-US" sz="1600" dirty="0" smtClean="0">
-                <a:solidFill>
-                  <a:schemeClr val="tx1">
-                    <a:lumMod val="75000"/>
-                    <a:lumOff val="25000"/>
-                  </a:schemeClr>
-                </a:solidFill>
-                <a:latin typeface="Nanum Gothic" charset="-127"/>
-                <a:ea typeface="Nanum Gothic" charset="-127"/>
-                <a:cs typeface="Nanum Gothic" charset="-127"/>
-              </a:rPr>
-              <a:t>면 </a:t>
-            </a:r>
-            <a:r>
-              <a:rPr kumimoji="1" lang="en-US" altLang="ko-KR" sz="1600" dirty="0" smtClean="0">
-                <a:solidFill>
-                  <a:schemeClr val="tx1">
-                    <a:lumMod val="75000"/>
-                    <a:lumOff val="25000"/>
-                  </a:schemeClr>
-                </a:solidFill>
-                <a:latin typeface="Nanum Gothic" charset="-127"/>
-                <a:ea typeface="Nanum Gothic" charset="-127"/>
-                <a:cs typeface="Nanum Gothic" charset="-127"/>
-              </a:rPr>
-              <a:t>true</a:t>
-            </a:r>
-            <a:endParaRPr kumimoji="1" lang="en-US" altLang="ko-KR" sz="1600" dirty="0" smtClean="0">
-              <a:solidFill>
-                <a:schemeClr val="tx1">
-                  <a:lumMod val="50000"/>
-                  <a:lumOff val="50000"/>
-                </a:schemeClr>
-              </a:solidFill>
-              <a:latin typeface="Nanum Gothic" charset="-127"/>
-              <a:ea typeface="Nanum Gothic" charset="-127"/>
-              <a:cs typeface="Nanum Gothic" charset="-127"/>
-            </a:endParaRPr>
+              <a:rPr kumimoji="1" lang="en-US" altLang="ko-KR" sz="1400" dirty="0" smtClean="0">
+                <a:solidFill>
+                  <a:schemeClr val="tx1">
+                    <a:lumMod val="50000"/>
+                    <a:lumOff val="50000"/>
+                  </a:schemeClr>
+                </a:solidFill>
+                <a:latin typeface="Consolas" charset="0"/>
+                <a:ea typeface="Consolas" charset="0"/>
+                <a:cs typeface="Consolas" charset="0"/>
+              </a:rPr>
+              <a:t>[</a:t>
+            </a:r>
+            <a:r>
+              <a:rPr kumimoji="1" lang="ko-KR" altLang="en-US" sz="1400" dirty="0" smtClean="0">
+                <a:solidFill>
+                  <a:schemeClr val="tx1">
+                    <a:lumMod val="50000"/>
+                    <a:lumOff val="50000"/>
+                  </a:schemeClr>
+                </a:solidFill>
+                <a:latin typeface="Consolas" charset="0"/>
+                <a:ea typeface="Consolas" charset="0"/>
+                <a:cs typeface="Consolas" charset="0"/>
+              </a:rPr>
+              <a:t>문자열</a:t>
+            </a:r>
+            <a:r>
+              <a:rPr kumimoji="1" lang="en-US" altLang="ko-KR" sz="1400" dirty="0" smtClean="0">
+                <a:solidFill>
+                  <a:schemeClr val="tx1">
+                    <a:lumMod val="50000"/>
+                    <a:lumOff val="50000"/>
+                  </a:schemeClr>
+                </a:solidFill>
+                <a:latin typeface="Consolas" charset="0"/>
+                <a:ea typeface="Consolas" charset="0"/>
+                <a:cs typeface="Consolas" charset="0"/>
+              </a:rPr>
+              <a:t>]</a:t>
+            </a:r>
+            <a:r>
+              <a:rPr kumimoji="1" lang="ko-KR" altLang="en-US" sz="1400" dirty="0" smtClean="0">
+                <a:solidFill>
+                  <a:schemeClr val="tx1">
+                    <a:lumMod val="50000"/>
+                    <a:lumOff val="50000"/>
+                  </a:schemeClr>
+                </a:solidFill>
+                <a:latin typeface="Consolas" charset="0"/>
+                <a:ea typeface="Consolas" charset="0"/>
+                <a:cs typeface="Consolas" charset="0"/>
+              </a:rPr>
+              <a:t> </a:t>
+            </a:r>
+            <a:r>
+              <a:rPr kumimoji="1" lang="en-US" altLang="ko-KR" sz="1400" dirty="0" smtClean="0">
+                <a:solidFill>
+                  <a:schemeClr val="tx1">
+                    <a:lumMod val="50000"/>
+                    <a:lumOff val="50000"/>
+                  </a:schemeClr>
+                </a:solidFill>
+                <a:latin typeface="Consolas" charset="0"/>
+                <a:ea typeface="Consolas" charset="0"/>
+                <a:cs typeface="Consolas" charset="0"/>
+              </a:rPr>
+              <a:t>in [</a:t>
+            </a:r>
+            <a:r>
+              <a:rPr kumimoji="1" lang="ko-KR" altLang="en-US" sz="1400" dirty="0" smtClean="0">
+                <a:solidFill>
+                  <a:schemeClr val="tx1">
+                    <a:lumMod val="50000"/>
+                    <a:lumOff val="50000"/>
+                  </a:schemeClr>
+                </a:solidFill>
+                <a:latin typeface="Consolas" charset="0"/>
+                <a:ea typeface="Consolas" charset="0"/>
+                <a:cs typeface="Consolas" charset="0"/>
+              </a:rPr>
+              <a:t>객체</a:t>
+            </a:r>
+            <a:r>
+              <a:rPr kumimoji="1" lang="en-US" altLang="ko-KR" sz="1400" dirty="0" smtClean="0">
+                <a:solidFill>
+                  <a:schemeClr val="tx1">
+                    <a:lumMod val="50000"/>
+                    <a:lumOff val="50000"/>
+                  </a:schemeClr>
+                </a:solidFill>
+                <a:latin typeface="Consolas" charset="0"/>
+                <a:ea typeface="Consolas" charset="0"/>
+                <a:cs typeface="Consolas" charset="0"/>
+              </a:rPr>
+              <a:t>],</a:t>
+            </a:r>
+            <a:r>
+              <a:rPr kumimoji="1" lang="ko-KR" altLang="en-US" sz="1400" dirty="0" smtClean="0">
+                <a:solidFill>
+                  <a:schemeClr val="tx1">
+                    <a:lumMod val="50000"/>
+                    <a:lumOff val="50000"/>
+                  </a:schemeClr>
+                </a:solidFill>
+                <a:latin typeface="Consolas" charset="0"/>
+                <a:ea typeface="Consolas" charset="0"/>
+                <a:cs typeface="Consolas" charset="0"/>
+              </a:rPr>
+              <a:t>  </a:t>
+            </a:r>
+            <a:r>
+              <a:rPr kumimoji="1" lang="en-US" altLang="ko-KR" sz="1400" dirty="0" smtClean="0">
+                <a:solidFill>
+                  <a:schemeClr val="tx1">
+                    <a:lumMod val="50000"/>
+                    <a:lumOff val="50000"/>
+                  </a:schemeClr>
+                </a:solidFill>
+                <a:latin typeface="Consolas" charset="0"/>
+                <a:ea typeface="Consolas" charset="0"/>
+                <a:cs typeface="Consolas" charset="0"/>
+              </a:rPr>
+              <a:t>[</a:t>
+            </a:r>
+            <a:r>
+              <a:rPr kumimoji="1" lang="ko-KR" altLang="en-US" sz="1400" dirty="0" smtClean="0">
+                <a:solidFill>
+                  <a:schemeClr val="tx1">
+                    <a:lumMod val="50000"/>
+                    <a:lumOff val="50000"/>
+                  </a:schemeClr>
+                </a:solidFill>
+                <a:latin typeface="Consolas" charset="0"/>
+                <a:ea typeface="Consolas" charset="0"/>
+                <a:cs typeface="Consolas" charset="0"/>
+              </a:rPr>
+              <a:t>숫자 또는 문자열</a:t>
+            </a:r>
+            <a:r>
+              <a:rPr kumimoji="1" lang="en-US" altLang="ko-KR" sz="1400" dirty="0" smtClean="0">
+                <a:solidFill>
+                  <a:schemeClr val="tx1">
+                    <a:lumMod val="50000"/>
+                    <a:lumOff val="50000"/>
+                  </a:schemeClr>
+                </a:solidFill>
+                <a:latin typeface="Consolas" charset="0"/>
+                <a:ea typeface="Consolas" charset="0"/>
+                <a:cs typeface="Consolas" charset="0"/>
+              </a:rPr>
+              <a:t>]</a:t>
+            </a:r>
+            <a:r>
+              <a:rPr kumimoji="1" lang="ko-KR" altLang="en-US" sz="1400" dirty="0" smtClean="0">
+                <a:solidFill>
+                  <a:schemeClr val="tx1">
+                    <a:lumMod val="50000"/>
+                    <a:lumOff val="50000"/>
+                  </a:schemeClr>
+                </a:solidFill>
+                <a:latin typeface="Consolas" charset="0"/>
+                <a:ea typeface="Consolas" charset="0"/>
+                <a:cs typeface="Consolas" charset="0"/>
+              </a:rPr>
+              <a:t> </a:t>
+            </a:r>
+            <a:r>
+              <a:rPr kumimoji="1" lang="en-US" altLang="ko-KR" sz="1400" dirty="0" smtClean="0">
+                <a:solidFill>
+                  <a:schemeClr val="tx1">
+                    <a:lumMod val="50000"/>
+                    <a:lumOff val="50000"/>
+                  </a:schemeClr>
+                </a:solidFill>
+                <a:latin typeface="Consolas" charset="0"/>
+                <a:ea typeface="Consolas" charset="0"/>
+                <a:cs typeface="Consolas" charset="0"/>
+              </a:rPr>
+              <a:t>in [</a:t>
+            </a:r>
+            <a:r>
+              <a:rPr kumimoji="1" lang="ko-KR" altLang="en-US" sz="1400" dirty="0" smtClean="0">
+                <a:solidFill>
+                  <a:schemeClr val="tx1">
+                    <a:lumMod val="50000"/>
+                    <a:lumOff val="50000"/>
+                  </a:schemeClr>
+                </a:solidFill>
+                <a:latin typeface="Consolas" charset="0"/>
+                <a:ea typeface="Consolas" charset="0"/>
+                <a:cs typeface="Consolas" charset="0"/>
+              </a:rPr>
+              <a:t>배열</a:t>
+            </a:r>
+            <a:r>
+              <a:rPr kumimoji="1" lang="en-US" altLang="ko-KR" sz="1400" dirty="0" smtClean="0">
+                <a:solidFill>
+                  <a:schemeClr val="tx1">
+                    <a:lumMod val="50000"/>
+                    <a:lumOff val="50000"/>
+                  </a:schemeClr>
+                </a:solidFill>
+                <a:latin typeface="Consolas" charset="0"/>
+                <a:ea typeface="Consolas" charset="0"/>
+                <a:cs typeface="Consolas" charset="0"/>
+              </a:rPr>
+              <a:t>]</a:t>
+            </a:r>
           </a:p>
         </p:txBody>
       </p:sp>
       <p:sp>
         <p:nvSpPr>
-          <p:cNvPr id="15" name="TextBox 14"/>
+          <p:cNvPr id="18" name="TextBox 6"/>
           <p:cNvSpPr txBox="1"/>
           <p:nvPr/>
         </p:nvSpPr>
         <p:spPr>
           <a:xfrm>
-            <a:off x="680710" y="620688"/>
-            <a:ext cx="4570482" cy="338554"/>
+            <a:off x="680710" y="3748766"/>
+            <a:ext cx="5190845" cy="683264"/>
           </a:xfrm>
           <a:prstGeom prst="rect">
             <a:avLst/>
@@ -10611,6 +10940,11 @@
           </a:bodyPr>
           <a:lstStyle/>
           <a:p>
+            <a:pPr>
+              <a:lnSpc>
+                <a:spcPct val="120000"/>
+              </a:lnSpc>
+            </a:pPr>
             <a:r>
               <a:rPr kumimoji="1" lang="ko-KR" altLang="en-US" sz="1600" dirty="0" smtClean="0">
                 <a:solidFill>
@@ -10623,13 +10957,97 @@
                 <a:ea typeface="Nanum Gothic" charset="-127"/>
                 <a:cs typeface="Nanum Gothic" charset="-127"/>
               </a:rPr>
-              <a:t>대부분의 언어에 있는 연산자로 자세한 설명은 생략</a:t>
+              <a:t>객체의 </a:t>
+            </a:r>
+            <a:r>
+              <a:rPr kumimoji="1" lang="ko-KR" altLang="en-US" sz="1600" dirty="0" smtClean="0">
+                <a:solidFill>
+                  <a:schemeClr val="tx1">
+                    <a:lumMod val="75000"/>
+                    <a:lumOff val="25000"/>
+                  </a:schemeClr>
+                </a:solidFill>
+                <a:latin typeface="Nanum Gothic" charset="-127"/>
+                <a:ea typeface="Nanum Gothic" charset="-127"/>
+                <a:cs typeface="Nanum Gothic" charset="-127"/>
+              </a:rPr>
+              <a:t>클래스</a:t>
+            </a:r>
+            <a:r>
+              <a:rPr kumimoji="1" lang="en-US" altLang="ko-KR" sz="1600" dirty="0" smtClean="0">
+                <a:solidFill>
+                  <a:schemeClr val="tx1">
+                    <a:lumMod val="75000"/>
+                    <a:lumOff val="25000"/>
+                  </a:schemeClr>
+                </a:solidFill>
+                <a:latin typeface="Nanum Gothic" charset="-127"/>
+                <a:ea typeface="Nanum Gothic" charset="-127"/>
+                <a:cs typeface="Nanum Gothic" charset="-127"/>
+              </a:rPr>
+              <a:t>(</a:t>
+            </a:r>
+            <a:r>
+              <a:rPr kumimoji="1" lang="ko-KR" altLang="en-US" sz="1600" dirty="0" smtClean="0">
+                <a:solidFill>
+                  <a:schemeClr val="tx1">
+                    <a:lumMod val="75000"/>
+                    <a:lumOff val="25000"/>
+                  </a:schemeClr>
+                </a:solidFill>
+                <a:latin typeface="Nanum Gothic" charset="-127"/>
+                <a:ea typeface="Nanum Gothic" charset="-127"/>
+                <a:cs typeface="Nanum Gothic" charset="-127"/>
+              </a:rPr>
+              <a:t>생성자 함수</a:t>
+            </a:r>
+            <a:r>
+              <a:rPr kumimoji="1" lang="en-US" altLang="ko-KR" sz="1600" dirty="0" smtClean="0">
+                <a:solidFill>
+                  <a:schemeClr val="tx1">
+                    <a:lumMod val="75000"/>
+                    <a:lumOff val="25000"/>
+                  </a:schemeClr>
+                </a:solidFill>
+                <a:latin typeface="Nanum Gothic" charset="-127"/>
+                <a:ea typeface="Nanum Gothic" charset="-127"/>
+                <a:cs typeface="Nanum Gothic" charset="-127"/>
+              </a:rPr>
+              <a:t>)</a:t>
+            </a:r>
+            <a:r>
+              <a:rPr kumimoji="1" lang="ko-KR" altLang="en-US" sz="1600" dirty="0" smtClean="0">
+                <a:solidFill>
+                  <a:schemeClr val="tx1">
+                    <a:lumMod val="75000"/>
+                    <a:lumOff val="25000"/>
+                  </a:schemeClr>
+                </a:solidFill>
+                <a:latin typeface="Nanum Gothic" charset="-127"/>
+                <a:ea typeface="Nanum Gothic" charset="-127"/>
+                <a:cs typeface="Nanum Gothic" charset="-127"/>
+              </a:rPr>
+              <a:t>를 </a:t>
+            </a:r>
+            <a:r>
+              <a:rPr kumimoji="1" lang="ko-KR" altLang="en-US" sz="1600" dirty="0" smtClean="0">
+                <a:solidFill>
+                  <a:schemeClr val="tx1">
+                    <a:lumMod val="75000"/>
+                    <a:lumOff val="25000"/>
+                  </a:schemeClr>
+                </a:solidFill>
+                <a:latin typeface="Nanum Gothic" charset="-127"/>
+                <a:ea typeface="Nanum Gothic" charset="-127"/>
+                <a:cs typeface="Nanum Gothic" charset="-127"/>
+              </a:rPr>
+              <a:t>체크하는 연산자</a:t>
             </a:r>
             <a:endParaRPr kumimoji="1" lang="en-US" altLang="ko-KR" sz="1600" dirty="0" smtClean="0">
               <a:solidFill>
                 <a:schemeClr val="tx1">
-                  <a:lumMod val="50000"/>
-                  <a:lumOff val="50000"/>
+                  <a:lumMod val="75000"/>
+                  <a:lumOff val="25000"/>
                 </a:schemeClr>
               </a:solidFill>
               <a:latin typeface="Nanum Gothic" charset="-127"/>
@@ -10637,18 +11055,95 @@
               <a:cs typeface="Nanum Gothic" charset="-127"/>
             </a:endParaRPr>
           </a:p>
+          <a:p>
+            <a:pPr>
+              <a:lnSpc>
+                <a:spcPct val="120000"/>
+              </a:lnSpc>
+            </a:pPr>
+            <a:r>
+              <a:rPr kumimoji="1" lang="ko-KR" altLang="en-US" sz="1600" dirty="0" smtClean="0">
+                <a:solidFill>
+                  <a:schemeClr val="tx1">
+                    <a:lumMod val="75000"/>
+                    <a:lumOff val="25000"/>
+                  </a:schemeClr>
+                </a:solidFill>
+                <a:latin typeface="Nanum Gothic" charset="-127"/>
+                <a:ea typeface="Nanum Gothic" charset="-127"/>
+                <a:cs typeface="Nanum Gothic" charset="-127"/>
+              </a:rPr>
+              <a:t>후에 프로토타입 체이닝을 알고나면 더 </a:t>
+            </a:r>
+            <a:r>
+              <a:rPr kumimoji="1" lang="ko-KR" altLang="en-US" sz="1600" dirty="0" smtClean="0">
+                <a:solidFill>
+                  <a:schemeClr val="tx1">
+                    <a:lumMod val="75000"/>
+                    <a:lumOff val="25000"/>
+                  </a:schemeClr>
+                </a:solidFill>
+                <a:latin typeface="Nanum Gothic" charset="-127"/>
+                <a:ea typeface="Nanum Gothic" charset="-127"/>
+                <a:cs typeface="Nanum Gothic" charset="-127"/>
+              </a:rPr>
+              <a:t>잘 이해 할 </a:t>
+            </a:r>
+            <a:r>
+              <a:rPr kumimoji="1" lang="ko-KR" altLang="en-US" sz="1600" dirty="0" smtClean="0">
+                <a:solidFill>
+                  <a:schemeClr val="tx1">
+                    <a:lumMod val="75000"/>
+                    <a:lumOff val="25000"/>
+                  </a:schemeClr>
+                </a:solidFill>
+                <a:latin typeface="Nanum Gothic" charset="-127"/>
+                <a:ea typeface="Nanum Gothic" charset="-127"/>
+                <a:cs typeface="Nanum Gothic" charset="-127"/>
+              </a:rPr>
+              <a:t>수 </a:t>
+            </a:r>
+            <a:r>
+              <a:rPr kumimoji="1" lang="ko-KR" altLang="en-US" sz="1600" dirty="0" smtClean="0">
+                <a:solidFill>
+                  <a:schemeClr val="tx1">
+                    <a:lumMod val="75000"/>
+                    <a:lumOff val="25000"/>
+                  </a:schemeClr>
+                </a:solidFill>
+                <a:latin typeface="Nanum Gothic" charset="-127"/>
+                <a:ea typeface="Nanum Gothic" charset="-127"/>
+                <a:cs typeface="Nanum Gothic" charset="-127"/>
+              </a:rPr>
+              <a:t>있다</a:t>
+            </a:r>
+            <a:r>
+              <a:rPr kumimoji="1" lang="en-US" altLang="ko-KR" sz="1600" dirty="0" smtClean="0">
+                <a:solidFill>
+                  <a:schemeClr val="tx1">
+                    <a:lumMod val="75000"/>
+                    <a:lumOff val="25000"/>
+                  </a:schemeClr>
+                </a:solidFill>
+                <a:latin typeface="Nanum Gothic" charset="-127"/>
+                <a:ea typeface="Nanum Gothic" charset="-127"/>
+                <a:cs typeface="Nanum Gothic" charset="-127"/>
+              </a:rPr>
+              <a:t>.</a:t>
+            </a:r>
+          </a:p>
         </p:txBody>
       </p:sp>
       <p:sp>
         <p:nvSpPr>
-          <p:cNvPr id="16" name="TextBox 15"/>
+          <p:cNvPr id="19" name="TextBox 6"/>
           <p:cNvSpPr txBox="1"/>
           <p:nvPr/>
         </p:nvSpPr>
         <p:spPr>
           <a:xfrm>
-            <a:off x="546011" y="4606514"/>
-            <a:ext cx="1295547" cy="369332"/>
+            <a:off x="683612" y="3371880"/>
+            <a:ext cx="3130985" cy="337785"/>
           </a:xfrm>
           <a:prstGeom prst="rect">
             <a:avLst/>
@@ -10661,55 +11156,136 @@
           </a:bodyPr>
           <a:lstStyle/>
           <a:p>
-            <a:r>
-              <a:rPr kumimoji="1" lang="ko-KR" altLang="en-US" b="1" dirty="0" smtClean="0">
-                <a:solidFill>
-                  <a:schemeClr val="accent6">
-                    <a:lumMod val="50000"/>
-                  </a:schemeClr>
-                </a:solidFill>
-                <a:latin typeface="Nanum Gothic" charset="-127"/>
-                <a:ea typeface="Nanum Gothic" charset="-127"/>
-                <a:cs typeface="Nanum Gothic" charset="-127"/>
-              </a:rPr>
-              <a:t>► </a:t>
-            </a:r>
-            <a:r>
-              <a:rPr kumimoji="1" lang="en-US" altLang="ko-KR" b="1" dirty="0" smtClean="0">
-                <a:solidFill>
-                  <a:schemeClr val="accent6">
-                    <a:lumMod val="50000"/>
-                  </a:schemeClr>
-                </a:solidFill>
-                <a:latin typeface="Nanum Gothic" charset="-127"/>
-                <a:ea typeface="Nanum Gothic" charset="-127"/>
-                <a:cs typeface="Nanum Gothic" charset="-127"/>
-              </a:rPr>
-              <a:t>NOT ( ! )</a:t>
-            </a:r>
-            <a:endParaRPr kumimoji="1" lang="ko-KR" altLang="en-US" b="1" dirty="0">
-              <a:solidFill>
-                <a:schemeClr val="accent6">
-                  <a:lumMod val="50000"/>
-                </a:schemeClr>
-              </a:solidFill>
-              <a:latin typeface="Nanum Gothic" charset="-127"/>
-              <a:ea typeface="Nanum Gothic" charset="-127"/>
-              <a:cs typeface="Nanum Gothic" charset="-127"/>
-            </a:endParaRPr>
+            <a:pPr>
+              <a:lnSpc>
+                <a:spcPct val="120000"/>
+              </a:lnSpc>
+            </a:pPr>
+            <a:r>
+              <a:rPr kumimoji="1" lang="en-US" altLang="ko-KR" sz="1400" dirty="0" smtClean="0">
+                <a:solidFill>
+                  <a:schemeClr val="tx1">
+                    <a:lumMod val="50000"/>
+                    <a:lumOff val="50000"/>
+                  </a:schemeClr>
+                </a:solidFill>
+                <a:latin typeface="Consolas" charset="0"/>
+                <a:ea typeface="Consolas" charset="0"/>
+                <a:cs typeface="Consolas" charset="0"/>
+              </a:rPr>
+              <a:t>[</a:t>
+            </a:r>
+            <a:r>
+              <a:rPr kumimoji="1" lang="ko-KR" altLang="en-US" sz="1400" dirty="0" smtClean="0">
+                <a:solidFill>
+                  <a:schemeClr val="tx1">
+                    <a:lumMod val="50000"/>
+                    <a:lumOff val="50000"/>
+                  </a:schemeClr>
+                </a:solidFill>
+                <a:latin typeface="Consolas" charset="0"/>
+                <a:ea typeface="Consolas" charset="0"/>
+                <a:cs typeface="Consolas" charset="0"/>
+              </a:rPr>
+              <a:t>객체</a:t>
+            </a:r>
+            <a:r>
+              <a:rPr kumimoji="1" lang="en-US" altLang="ko-KR" sz="1400" dirty="0" smtClean="0">
+                <a:solidFill>
+                  <a:schemeClr val="tx1">
+                    <a:lumMod val="50000"/>
+                    <a:lumOff val="50000"/>
+                  </a:schemeClr>
+                </a:solidFill>
+                <a:latin typeface="Consolas" charset="0"/>
+                <a:ea typeface="Consolas" charset="0"/>
+                <a:cs typeface="Consolas" charset="0"/>
+              </a:rPr>
+              <a:t>]</a:t>
+            </a:r>
+            <a:r>
+              <a:rPr kumimoji="1" lang="ko-KR" altLang="en-US" sz="1400" dirty="0" smtClean="0">
+                <a:solidFill>
+                  <a:schemeClr val="tx1">
+                    <a:lumMod val="50000"/>
+                    <a:lumOff val="50000"/>
+                  </a:schemeClr>
+                </a:solidFill>
+                <a:latin typeface="Consolas" charset="0"/>
+                <a:ea typeface="Consolas" charset="0"/>
+                <a:cs typeface="Consolas" charset="0"/>
+              </a:rPr>
+              <a:t> </a:t>
+            </a:r>
+            <a:r>
+              <a:rPr kumimoji="1" lang="en-US" altLang="ko-KR" sz="1400" dirty="0" err="1" smtClean="0">
+                <a:solidFill>
+                  <a:schemeClr val="tx1">
+                    <a:lumMod val="50000"/>
+                    <a:lumOff val="50000"/>
+                  </a:schemeClr>
+                </a:solidFill>
+                <a:latin typeface="Consolas" charset="0"/>
+                <a:ea typeface="Consolas" charset="0"/>
+                <a:cs typeface="Consolas" charset="0"/>
+              </a:rPr>
+              <a:t>instanceof</a:t>
+            </a:r>
+            <a:r>
+              <a:rPr kumimoji="1" lang="en-US" altLang="ko-KR" sz="1400" dirty="0" smtClean="0">
+                <a:solidFill>
+                  <a:schemeClr val="tx1">
+                    <a:lumMod val="50000"/>
+                    <a:lumOff val="50000"/>
+                  </a:schemeClr>
+                </a:solidFill>
+                <a:latin typeface="Consolas" charset="0"/>
+                <a:ea typeface="Consolas" charset="0"/>
+                <a:cs typeface="Consolas" charset="0"/>
+              </a:rPr>
+              <a:t> [</a:t>
+            </a:r>
+            <a:r>
+              <a:rPr kumimoji="1" lang="ko-KR" altLang="en-US" sz="1400" dirty="0" smtClean="0">
+                <a:solidFill>
+                  <a:schemeClr val="tx1">
+                    <a:lumMod val="50000"/>
+                    <a:lumOff val="50000"/>
+                  </a:schemeClr>
+                </a:solidFill>
+                <a:latin typeface="Consolas" charset="0"/>
+                <a:ea typeface="Consolas" charset="0"/>
+                <a:cs typeface="Consolas" charset="0"/>
+              </a:rPr>
+              <a:t>생성자 함수</a:t>
+            </a:r>
+            <a:r>
+              <a:rPr kumimoji="1" lang="en-US" altLang="ko-KR" sz="1400" dirty="0" smtClean="0">
+                <a:solidFill>
+                  <a:schemeClr val="tx1">
+                    <a:lumMod val="50000"/>
+                    <a:lumOff val="50000"/>
+                  </a:schemeClr>
+                </a:solidFill>
+                <a:latin typeface="Consolas" charset="0"/>
+                <a:ea typeface="Consolas" charset="0"/>
+                <a:cs typeface="Consolas" charset="0"/>
+              </a:rPr>
+              <a:t>]</a:t>
+            </a:r>
           </a:p>
         </p:txBody>
       </p:sp>
       <p:sp>
         <p:nvSpPr>
-          <p:cNvPr id="17" name="TextBox 16"/>
+          <p:cNvPr id="13" name="TextBox 9"/>
           <p:cNvSpPr txBox="1"/>
           <p:nvPr/>
         </p:nvSpPr>
         <p:spPr>
           <a:xfrm>
-            <a:off x="730798" y="5082048"/>
-            <a:ext cx="2443298" cy="363176"/>
+            <a:off x="546012" y="4724359"/>
+            <a:ext cx="1755609" cy="369332"/>
           </a:xfrm>
           <a:prstGeom prst="rect">
             <a:avLst/>
@@ -10722,12 +11298,113 @@
           </a:bodyPr>
           <a:lstStyle/>
           <a:p>
+            <a:r>
+              <a:rPr kumimoji="1" lang="ko-KR" altLang="en-US" b="1" dirty="0" smtClean="0">
+                <a:solidFill>
+                  <a:schemeClr val="accent6">
+                    <a:lumMod val="50000"/>
+                  </a:schemeClr>
+                </a:solidFill>
+                <a:latin typeface="Nanum Gothic" charset="-127"/>
+                <a:ea typeface="Nanum Gothic" charset="-127"/>
+                <a:cs typeface="Nanum Gothic" charset="-127"/>
+              </a:rPr>
+              <a:t>► </a:t>
+            </a:r>
+            <a:r>
+              <a:rPr kumimoji="1" lang="en-US" altLang="ko-KR" b="1" dirty="0" err="1" smtClean="0">
+                <a:solidFill>
+                  <a:schemeClr val="accent6">
+                    <a:lumMod val="50000"/>
+                  </a:schemeClr>
+                </a:solidFill>
+                <a:latin typeface="Nanum Gothic" charset="-127"/>
+                <a:ea typeface="Nanum Gothic" charset="-127"/>
+                <a:cs typeface="Nanum Gothic" charset="-127"/>
+              </a:rPr>
+              <a:t>typeof</a:t>
+            </a:r>
+            <a:r>
+              <a:rPr kumimoji="1" lang="en-US" altLang="ko-KR" b="1" dirty="0" smtClean="0">
+                <a:solidFill>
+                  <a:schemeClr val="accent6">
+                    <a:lumMod val="50000"/>
+                  </a:schemeClr>
+                </a:solidFill>
+                <a:latin typeface="Nanum Gothic" charset="-127"/>
+                <a:ea typeface="Nanum Gothic" charset="-127"/>
+                <a:cs typeface="Nanum Gothic" charset="-127"/>
+              </a:rPr>
+              <a:t> </a:t>
+            </a:r>
+            <a:r>
+              <a:rPr kumimoji="1" lang="ko-KR" altLang="en-US" b="1" dirty="0" smtClean="0">
+                <a:solidFill>
+                  <a:schemeClr val="accent6">
+                    <a:lumMod val="50000"/>
+                  </a:schemeClr>
+                </a:solidFill>
+                <a:latin typeface="Nanum Gothic" charset="-127"/>
+                <a:ea typeface="Nanum Gothic" charset="-127"/>
+                <a:cs typeface="Nanum Gothic" charset="-127"/>
+              </a:rPr>
+              <a:t>연산자</a:t>
+            </a:r>
+            <a:endParaRPr kumimoji="1" lang="ko-KR" altLang="en-US" b="1" dirty="0">
+              <a:solidFill>
+                <a:schemeClr val="accent6">
+                  <a:lumMod val="50000"/>
+                </a:schemeClr>
+              </a:solidFill>
+              <a:latin typeface="Nanum Gothic" charset="-127"/>
+              <a:ea typeface="Nanum Gothic" charset="-127"/>
+              <a:cs typeface="Nanum Gothic" charset="-127"/>
+            </a:endParaRPr>
+          </a:p>
+        </p:txBody>
+      </p:sp>
+      <p:sp>
+        <p:nvSpPr>
+          <p:cNvPr id="14" name="TextBox 6"/>
+          <p:cNvSpPr txBox="1"/>
+          <p:nvPr/>
+        </p:nvSpPr>
+        <p:spPr>
+          <a:xfrm>
+            <a:off x="680710" y="5548966"/>
+            <a:ext cx="4942379" cy="978729"/>
+          </a:xfrm>
+          <a:prstGeom prst="rect">
+            <a:avLst/>
+          </a:prstGeom>
+          <a:noFill/>
+        </p:spPr>
+        <p:txBody>
+          <a:bodyPr wrap="none" rtlCol="0">
+            <a:spAutoFit/>
+          </a:bodyPr>
+          <a:lstStyle/>
+          <a:p>
             <a:pPr>
               <a:lnSpc>
                 <a:spcPct val="120000"/>
               </a:lnSpc>
             </a:pPr>
             <a:r>
+              <a:rPr kumimoji="1" lang="ko-KR" altLang="en-US" sz="1600" dirty="0" smtClean="0">
+                <a:solidFill>
+                  <a:schemeClr val="tx1">
+                    <a:lumMod val="75000"/>
+                    <a:lumOff val="25000"/>
+                  </a:schemeClr>
+                </a:solidFill>
+                <a:latin typeface="Nanum Gothic" charset="-127"/>
+                <a:ea typeface="Nanum Gothic" charset="-127"/>
+                <a:cs typeface="Nanum Gothic" charset="-127"/>
+              </a:rPr>
+              <a:t>피연산자의 데이터 타입을 확인하는 연산자</a:t>
+            </a:r>
+            <a:r>
               <a:rPr kumimoji="1" lang="en-US" altLang="ko-KR" sz="1600" dirty="0" smtClean="0">
                 <a:solidFill>
                   <a:schemeClr val="tx1">
@@ -10739,8 +11416,26 @@
                 <a:ea typeface="Nanum Gothic" charset="-127"/>
                 <a:cs typeface="Nanum Gothic" charset="-127"/>
               </a:rPr>
-              <a:t>true</a:t>
-            </a:r>
+              <a:t>.</a:t>
+            </a:r>
+            <a:endParaRPr kumimoji="1" lang="en-US" altLang="ko-KR" sz="1600" dirty="0" smtClean="0">
+              <a:solidFill>
+                <a:schemeClr val="tx1">
+                  <a:lumMod val="75000"/>
+                  <a:lumOff val="25000"/>
+                </a:schemeClr>
+              </a:solidFill>
+              <a:latin typeface="Nanum Gothic" charset="-127"/>
+              <a:ea typeface="Nanum Gothic" charset="-127"/>
+              <a:cs typeface="Nanum Gothic" charset="-127"/>
+            </a:endParaRPr>
+          </a:p>
+          <a:p>
+            <a:pPr>
+              <a:lnSpc>
+                <a:spcPct val="120000"/>
+              </a:lnSpc>
+            </a:pPr>
             <a:r>
               <a:rPr kumimoji="1" lang="ko-KR" altLang="en-US" sz="1600" dirty="0" smtClean="0">
                 <a:solidFill>
@@ -10753,7 +11448,39 @@
                 <a:ea typeface="Nanum Gothic" charset="-127"/>
                 <a:cs typeface="Nanum Gothic" charset="-127"/>
               </a:rPr>
-              <a:t>면 </a:t>
+              <a:t>몇가지 알아둬야할 부분은 </a:t>
+            </a:r>
+            <a:endParaRPr kumimoji="1" lang="en-US" altLang="ko-KR" sz="1600" dirty="0" smtClean="0">
+              <a:solidFill>
+                <a:schemeClr val="tx1">
+                  <a:lumMod val="75000"/>
+                  <a:lumOff val="25000"/>
+                </a:schemeClr>
+              </a:solidFill>
+              <a:latin typeface="Nanum Gothic" charset="-127"/>
+              <a:ea typeface="Nanum Gothic" charset="-127"/>
+              <a:cs typeface="Nanum Gothic" charset="-127"/>
+            </a:endParaRPr>
+          </a:p>
+          <a:p>
+            <a:pPr>
+              <a:lnSpc>
+                <a:spcPct val="120000"/>
+              </a:lnSpc>
+            </a:pPr>
+            <a:r>
+              <a:rPr kumimoji="1" lang="en-US" altLang="ko-KR" sz="1600" dirty="0" err="1" smtClean="0">
+                <a:solidFill>
+                  <a:schemeClr val="tx1">
+                    <a:lumMod val="75000"/>
+                    <a:lumOff val="25000"/>
+                  </a:schemeClr>
+                </a:solidFill>
+                <a:latin typeface="Nanum Gothic" charset="-127"/>
+                <a:ea typeface="Nanum Gothic" charset="-127"/>
+                <a:cs typeface="Nanum Gothic" charset="-127"/>
+              </a:rPr>
+              <a:t>typeof</a:t>
             </a:r>
             <a:r>
               <a:rPr kumimoji="1" lang="en-US" altLang="ko-KR" sz="1600" dirty="0" smtClean="0">
@@ -10767,21 +11494,21 @@
                 <a:ea typeface="Nanum Gothic" charset="-127"/>
                 <a:cs typeface="Nanum Gothic" charset="-127"/>
               </a:rPr>
-              <a:t>false, false</a:t>
-            </a:r>
-            <a:r>
-              <a:rPr kumimoji="1" lang="ko-KR" altLang="en-US" sz="1600" dirty="0" smtClean="0">
-                <a:solidFill>
-                  <a:schemeClr val="tx1">
-                    <a:lumMod val="75000"/>
-                    <a:lumOff val="25000"/>
-                  </a:schemeClr>
-                </a:solidFill>
-                <a:latin typeface="Nanum Gothic" charset="-127"/>
-                <a:ea typeface="Nanum Gothic" charset="-127"/>
-                <a:cs typeface="Nanum Gothic" charset="-127"/>
-              </a:rPr>
-              <a:t>면 </a:t>
+              <a:t> undefined : undefined / </a:t>
+            </a:r>
+            <a:r>
+              <a:rPr kumimoji="1" lang="en-US" altLang="ko-KR" sz="1600" dirty="0" err="1" smtClean="0">
+                <a:solidFill>
+                  <a:schemeClr val="tx1">
+                    <a:lumMod val="75000"/>
+                    <a:lumOff val="25000"/>
+                  </a:schemeClr>
+                </a:solidFill>
+                <a:latin typeface="Nanum Gothic" charset="-127"/>
+                <a:ea typeface="Nanum Gothic" charset="-127"/>
+                <a:cs typeface="Nanum Gothic" charset="-127"/>
+              </a:rPr>
+              <a:t>typeof</a:t>
             </a:r>
             <a:r>
               <a:rPr kumimoji="1" lang="en-US" altLang="ko-KR" sz="1600" dirty="0" smtClean="0">
@@ -10795,18 +11522,115 @@
                 <a:ea typeface="Nanum Gothic" charset="-127"/>
                 <a:cs typeface="Nanum Gothic" charset="-127"/>
               </a:rPr>
-              <a:t>true</a:t>
+              <a:t> null : object</a:t>
             </a:r>
             <a:endParaRPr kumimoji="1" lang="en-US" altLang="ko-KR" sz="1600" dirty="0" smtClean="0">
+              <a:solidFill>
+                <a:schemeClr val="tx1">
+                  <a:lumMod val="75000"/>
+                  <a:lumOff val="25000"/>
+                </a:schemeClr>
+              </a:solidFill>
+              <a:latin typeface="Nanum Gothic" charset="-127"/>
+              <a:ea typeface="Nanum Gothic" charset="-127"/>
+              <a:cs typeface="Nanum Gothic" charset="-127"/>
+            </a:endParaRPr>
+          </a:p>
+        </p:txBody>
+      </p:sp>
+      <p:sp>
+        <p:nvSpPr>
+          <p:cNvPr id="16" name="TextBox 6"/>
+          <p:cNvSpPr txBox="1"/>
+          <p:nvPr/>
+        </p:nvSpPr>
+        <p:spPr>
+          <a:xfrm>
+            <a:off x="683612" y="5172080"/>
+            <a:ext cx="1896673" cy="337785"/>
+          </a:xfrm>
+          <a:prstGeom prst="rect">
+            <a:avLst/>
+          </a:prstGeom>
+          <a:noFill/>
+        </p:spPr>
+        <p:txBody>
+          <a:bodyPr wrap="none" rtlCol="0">
+            <a:spAutoFit/>
+          </a:bodyPr>
+          <a:lstStyle/>
+          <a:p>
+            <a:pPr>
+              <a:lnSpc>
+                <a:spcPct val="120000"/>
+              </a:lnSpc>
+            </a:pPr>
+            <a:r>
+              <a:rPr kumimoji="1" lang="en-US" altLang="ko-KR" sz="1400" dirty="0" err="1" smtClean="0">
+                <a:solidFill>
+                  <a:schemeClr val="tx1">
+                    <a:lumMod val="50000"/>
+                    <a:lumOff val="50000"/>
+                  </a:schemeClr>
+                </a:solidFill>
+                <a:latin typeface="Consolas" charset="0"/>
+                <a:ea typeface="Consolas" charset="0"/>
+                <a:cs typeface="Consolas" charset="0"/>
+              </a:rPr>
+              <a:t>typeof</a:t>
+            </a:r>
+            <a:r>
+              <a:rPr kumimoji="1" lang="en-US" altLang="ko-KR" sz="1400" dirty="0" smtClean="0">
+                <a:solidFill>
+                  <a:schemeClr val="tx1">
+                    <a:lumMod val="50000"/>
+                    <a:lumOff val="50000"/>
+                  </a:schemeClr>
+                </a:solidFill>
+                <a:latin typeface="Consolas" charset="0"/>
+                <a:ea typeface="Consolas" charset="0"/>
+                <a:cs typeface="Consolas" charset="0"/>
+              </a:rPr>
+              <a:t> [</a:t>
+            </a:r>
+            <a:r>
+              <a:rPr kumimoji="1" lang="ko-KR" altLang="en-US" sz="1400" dirty="0" smtClean="0">
+                <a:solidFill>
+                  <a:schemeClr val="tx1">
+                    <a:lumMod val="50000"/>
+                    <a:lumOff val="50000"/>
+                  </a:schemeClr>
+                </a:solidFill>
+                <a:latin typeface="Consolas" charset="0"/>
+                <a:ea typeface="Consolas" charset="0"/>
+                <a:cs typeface="Consolas" charset="0"/>
+              </a:rPr>
+              <a:t>모든 타입</a:t>
+            </a:r>
+            <a:r>
+              <a:rPr kumimoji="1" lang="en-US" altLang="ko-KR" sz="1400" dirty="0" smtClean="0">
+                <a:solidFill>
+                  <a:schemeClr val="tx1">
+                    <a:lumMod val="50000"/>
+                    <a:lumOff val="50000"/>
+                  </a:schemeClr>
+                </a:solidFill>
+                <a:latin typeface="Consolas" charset="0"/>
+                <a:ea typeface="Consolas" charset="0"/>
+                <a:cs typeface="Consolas" charset="0"/>
+              </a:rPr>
+              <a:t>]</a:t>
+            </a:r>
+            <a:endParaRPr kumimoji="1" lang="en-US" altLang="ko-KR" sz="1400" dirty="0" smtClean="0">
               <a:solidFill>
                 <a:schemeClr val="tx1">
                   <a:lumMod val="50000"/>
                   <a:lumOff val="50000"/>
                 </a:schemeClr>
               </a:solidFill>
-              <a:latin typeface="Nanum Gothic" charset="-127"/>
-              <a:ea typeface="Nanum Gothic" charset="-127"/>
-              <a:cs typeface="Nanum Gothic" charset="-127"/>
+              <a:latin typeface="Consolas" charset="0"/>
+              <a:ea typeface="Consolas" charset="0"/>
+              <a:cs typeface="Consolas" charset="0"/>
             </a:endParaRPr>
           </a:p>
         </p:txBody>
@@ -10873,10 +11697,10 @@
                 <a:ea typeface="Nanum Gothic" charset="-127"/>
                 <a:cs typeface="Nanum Gothic" charset="-127"/>
               </a:rPr>
-              <a:t>10</a:t>
-            </a:r>
-            <a:r>
-              <a:rPr lang="en-US" altLang="ko-KR" sz="2000" b="1" dirty="0" smtClean="0">
+              <a:t>10.</a:t>
+            </a:r>
+            <a:r>
+              <a:rPr lang="ko-KR" altLang="en-US" sz="2000" b="1" dirty="0" smtClean="0">
                 <a:solidFill>
                   <a:schemeClr val="tx2"/>
                 </a:solidFill>
@@ -10884,51 +11708,7 @@
                 <a:ea typeface="Nanum Gothic" charset="-127"/>
                 <a:cs typeface="Nanum Gothic" charset="-127"/>
               </a:rPr>
-              <a:t>.</a:t>
-            </a:r>
-            <a:r>
-              <a:rPr lang="ko-KR" altLang="en-US" sz="2000" b="1" dirty="0" smtClean="0">
-                <a:solidFill>
-                  <a:schemeClr val="tx2"/>
-                </a:solidFill>
-                <a:latin typeface="Nanum Gothic" charset="-127"/>
-                <a:ea typeface="Nanum Gothic" charset="-127"/>
-                <a:cs typeface="Nanum Gothic" charset="-127"/>
-              </a:rPr>
-              <a:t> </a:t>
-            </a:r>
-            <a:r>
-              <a:rPr lang="ko-KR" altLang="en-US" sz="2000" b="1" dirty="0" smtClean="0">
-                <a:solidFill>
-                  <a:schemeClr val="tx2"/>
-                </a:solidFill>
-                <a:latin typeface="Nanum Gothic" charset="-127"/>
-                <a:ea typeface="Nanum Gothic" charset="-127"/>
-                <a:cs typeface="Nanum Gothic" charset="-127"/>
-              </a:rPr>
-              <a:t>평가 표현식 </a:t>
-            </a:r>
-            <a:r>
-              <a:rPr lang="en-US" altLang="ko-KR" sz="2000" b="1" dirty="0" err="1" smtClean="0">
-                <a:solidFill>
-                  <a:schemeClr val="tx2"/>
-                </a:solidFill>
-                <a:latin typeface="Nanum Gothic" charset="-127"/>
-                <a:ea typeface="Nanum Gothic" charset="-127"/>
-                <a:cs typeface="Nanum Gothic" charset="-127"/>
-              </a:rPr>
-              <a:t>eval</a:t>
-            </a:r>
-            <a:r>
-              <a:rPr lang="en-US" altLang="ko-KR" sz="2000" b="1" dirty="0" smtClean="0">
-                <a:solidFill>
-                  <a:schemeClr val="tx2"/>
-                </a:solidFill>
-                <a:latin typeface="Nanum Gothic" charset="-127"/>
-                <a:ea typeface="Nanum Gothic" charset="-127"/>
-                <a:cs typeface="Nanum Gothic" charset="-127"/>
-              </a:rPr>
-              <a:t>()</a:t>
+              <a:t> 기타 연산자</a:t>
             </a:r>
             <a:endParaRPr lang="ko-KR" altLang="en-US" sz="2000" b="1" dirty="0">
               <a:solidFill>
@@ -11004,8 +11784,8 @@
         </p:nvSpPr>
         <p:spPr>
           <a:xfrm>
-            <a:off x="546013" y="1663758"/>
-            <a:ext cx="1564852" cy="369332"/>
+            <a:off x="546013" y="836712"/>
+            <a:ext cx="1731564" cy="369332"/>
           </a:xfrm>
           <a:prstGeom prst="rect">
             <a:avLst/>
@@ -11042,7 +11822,20 @@
                 <a:ea typeface="Nanum Gothic" charset="-127"/>
                 <a:cs typeface="Nanum Gothic" charset="-127"/>
               </a:rPr>
-              <a:t>AND ( &amp;&amp; )</a:t>
+              <a:t>delete </a:t>
+            </a:r>
+            <a:r>
+              <a:rPr kumimoji="1" lang="ko-KR" altLang="en-US" b="1" dirty="0" smtClean="0">
+                <a:solidFill>
+                  <a:schemeClr val="accent6">
+                    <a:lumMod val="50000"/>
+                  </a:schemeClr>
+                </a:solidFill>
+                <a:latin typeface="Nanum Gothic" charset="-127"/>
+                <a:ea typeface="Nanum Gothic" charset="-127"/>
+                <a:cs typeface="Nanum Gothic" charset="-127"/>
+              </a:rPr>
+              <a:t>연산자</a:t>
             </a:r>
             <a:endParaRPr kumimoji="1" lang="ko-KR" altLang="en-US" b="1" dirty="0">
               <a:solidFill>
@@ -11065,8 +11858,8 @@
         </p:nvSpPr>
         <p:spPr>
           <a:xfrm>
-            <a:off x="732487" y="2033090"/>
-            <a:ext cx="1896673" cy="387798"/>
+            <a:off x="732487" y="1556007"/>
+            <a:ext cx="7545655" cy="1274195"/>
           </a:xfrm>
           <a:prstGeom prst="rect">
             <a:avLst/>
@@ -11085,6 +11878,41 @@
               </a:lnSpc>
             </a:pPr>
             <a:r>
+              <a:rPr kumimoji="1" lang="ko-KR" altLang="en-US" sz="1600" b="1" dirty="0" smtClean="0">
+                <a:solidFill>
+                  <a:schemeClr val="tx1">
+                    <a:lumMod val="75000"/>
+                    <a:lumOff val="25000"/>
+                  </a:schemeClr>
+                </a:solidFill>
+                <a:latin typeface="Nanum Gothic" charset="-127"/>
+                <a:ea typeface="Nanum Gothic" charset="-127"/>
+                <a:cs typeface="Nanum Gothic" charset="-127"/>
+              </a:rPr>
+              <a:t>객체의 프로퍼티를 삭제하는 연산자</a:t>
+            </a:r>
+            <a:r>
+              <a:rPr kumimoji="1" lang="en-US" altLang="ko-KR" sz="1600" b="1" dirty="0" smtClean="0">
+                <a:solidFill>
+                  <a:schemeClr val="tx1">
+                    <a:lumMod val="75000"/>
+                    <a:lumOff val="25000"/>
+                  </a:schemeClr>
+                </a:solidFill>
+                <a:latin typeface="Nanum Gothic" charset="-127"/>
+                <a:ea typeface="Nanum Gothic" charset="-127"/>
+                <a:cs typeface="Nanum Gothic" charset="-127"/>
+              </a:rPr>
+              <a:t>.</a:t>
+            </a:r>
+          </a:p>
+          <a:p>
+            <a:pPr>
+              <a:lnSpc>
+                <a:spcPct val="120000"/>
+              </a:lnSpc>
+            </a:pPr>
+            <a:r>
               <a:rPr kumimoji="1" lang="ko-KR" altLang="en-US" sz="1600" dirty="0" smtClean="0">
                 <a:solidFill>
                   <a:schemeClr val="tx1">
@@ -11096,7 +11924,7 @@
                 <a:ea typeface="Nanum Gothic" charset="-127"/>
                 <a:cs typeface="Nanum Gothic" charset="-127"/>
               </a:rPr>
-              <a:t>둘다 </a:t>
+              <a:t>마치 해당 프로퍼티에 </a:t>
             </a:r>
             <a:r>
               <a:rPr kumimoji="1" lang="en-US" altLang="ko-KR" sz="1600" dirty="0" smtClean="0">
@@ -11110,7 +11938,7 @@
                 <a:ea typeface="Nanum Gothic" charset="-127"/>
                 <a:cs typeface="Nanum Gothic" charset="-127"/>
               </a:rPr>
-              <a:t>true</a:t>
+              <a:t>undefined</a:t>
             </a:r>
             <a:r>
               <a:rPr kumimoji="1" lang="ko-KR" altLang="en-US" sz="1600" dirty="0" smtClean="0">
@@ -11124,7 +11952,7 @@
                 <a:ea typeface="Nanum Gothic" charset="-127"/>
                 <a:cs typeface="Nanum Gothic" charset="-127"/>
               </a:rPr>
-              <a:t>일 때 </a:t>
+              <a:t>를 할당하는 것 처럼 보일 수 있으나</a:t>
             </a:r>
             <a:r>
               <a:rPr kumimoji="1" lang="en-US" altLang="ko-KR" sz="1600" dirty="0" smtClean="0">
@@ -11138,8 +11966,257 @@
                 <a:ea typeface="Nanum Gothic" charset="-127"/>
                 <a:cs typeface="Nanum Gothic" charset="-127"/>
               </a:rPr>
-              <a:t>true</a:t>
-            </a:r>
+              <a:t>,</a:t>
+            </a:r>
+          </a:p>
+          <a:p>
+            <a:pPr>
+              <a:lnSpc>
+                <a:spcPct val="120000"/>
+              </a:lnSpc>
+            </a:pPr>
+            <a:r>
+              <a:rPr kumimoji="1" lang="ko-KR" altLang="en-US" sz="1600" dirty="0" smtClean="0">
+                <a:solidFill>
+                  <a:schemeClr val="tx1">
+                    <a:lumMod val="75000"/>
+                    <a:lumOff val="25000"/>
+                  </a:schemeClr>
+                </a:solidFill>
+                <a:latin typeface="Nanum Gothic" charset="-127"/>
+                <a:ea typeface="Nanum Gothic" charset="-127"/>
+                <a:cs typeface="Nanum Gothic" charset="-127"/>
+              </a:rPr>
+              <a:t>프로퍼티를 삭제하는 것이다</a:t>
+            </a:r>
+            <a:r>
+              <a:rPr kumimoji="1" lang="en-US" altLang="ko-KR" sz="1600" dirty="0" smtClean="0">
+                <a:solidFill>
+                  <a:schemeClr val="tx1">
+                    <a:lumMod val="75000"/>
+                    <a:lumOff val="25000"/>
+                  </a:schemeClr>
+                </a:solidFill>
+                <a:latin typeface="Nanum Gothic" charset="-127"/>
+                <a:ea typeface="Nanum Gothic" charset="-127"/>
+                <a:cs typeface="Nanum Gothic" charset="-127"/>
+              </a:rPr>
+              <a:t>.</a:t>
+            </a:r>
+            <a:r>
+              <a:rPr kumimoji="1" lang="ko-KR" altLang="en-US" sz="1600" dirty="0" smtClean="0">
+                <a:solidFill>
+                  <a:schemeClr val="tx1">
+                    <a:lumMod val="75000"/>
+                    <a:lumOff val="25000"/>
+                  </a:schemeClr>
+                </a:solidFill>
+                <a:latin typeface="Nanum Gothic" charset="-127"/>
+                <a:ea typeface="Nanum Gothic" charset="-127"/>
+                <a:cs typeface="Nanum Gothic" charset="-127"/>
+              </a:rPr>
+              <a:t> 삭제에 성공하면 </a:t>
+            </a:r>
+            <a:r>
+              <a:rPr kumimoji="1" lang="en-US" altLang="ko-KR" sz="1600" dirty="0" smtClean="0">
+                <a:solidFill>
+                  <a:schemeClr val="tx1">
+                    <a:lumMod val="75000"/>
+                    <a:lumOff val="25000"/>
+                  </a:schemeClr>
+                </a:solidFill>
+                <a:latin typeface="Nanum Gothic" charset="-127"/>
+                <a:ea typeface="Nanum Gothic" charset="-127"/>
+                <a:cs typeface="Nanum Gothic" charset="-127"/>
+              </a:rPr>
+              <a:t>true, </a:t>
+            </a:r>
+            <a:r>
+              <a:rPr kumimoji="1" lang="ko-KR" altLang="en-US" sz="1600" dirty="0" smtClean="0">
+                <a:solidFill>
+                  <a:schemeClr val="tx1">
+                    <a:lumMod val="75000"/>
+                    <a:lumOff val="25000"/>
+                  </a:schemeClr>
+                </a:solidFill>
+                <a:latin typeface="Nanum Gothic" charset="-127"/>
+                <a:ea typeface="Nanum Gothic" charset="-127"/>
+                <a:cs typeface="Nanum Gothic" charset="-127"/>
+              </a:rPr>
+              <a:t>실패하면 </a:t>
+            </a:r>
+            <a:r>
+              <a:rPr kumimoji="1" lang="en-US" altLang="ko-KR" sz="1600" dirty="0" smtClean="0">
+                <a:solidFill>
+                  <a:schemeClr val="tx1">
+                    <a:lumMod val="75000"/>
+                    <a:lumOff val="25000"/>
+                  </a:schemeClr>
+                </a:solidFill>
+                <a:latin typeface="Nanum Gothic" charset="-127"/>
+                <a:ea typeface="Nanum Gothic" charset="-127"/>
+                <a:cs typeface="Nanum Gothic" charset="-127"/>
+              </a:rPr>
+              <a:t>false</a:t>
+            </a:r>
+            <a:r>
+              <a:rPr kumimoji="1" lang="ko-KR" altLang="en-US" sz="1600" dirty="0" smtClean="0">
+                <a:solidFill>
+                  <a:schemeClr val="tx1">
+                    <a:lumMod val="75000"/>
+                    <a:lumOff val="25000"/>
+                  </a:schemeClr>
+                </a:solidFill>
+                <a:latin typeface="Nanum Gothic" charset="-127"/>
+                <a:ea typeface="Nanum Gothic" charset="-127"/>
+                <a:cs typeface="Nanum Gothic" charset="-127"/>
+              </a:rPr>
+              <a:t>를 반환한다</a:t>
+            </a:r>
+            <a:r>
+              <a:rPr kumimoji="1" lang="en-US" altLang="ko-KR" sz="1600" dirty="0" smtClean="0">
+                <a:solidFill>
+                  <a:schemeClr val="tx1">
+                    <a:lumMod val="75000"/>
+                    <a:lumOff val="25000"/>
+                  </a:schemeClr>
+                </a:solidFill>
+                <a:latin typeface="Nanum Gothic" charset="-127"/>
+                <a:ea typeface="Nanum Gothic" charset="-127"/>
+                <a:cs typeface="Nanum Gothic" charset="-127"/>
+              </a:rPr>
+              <a:t>.</a:t>
+            </a:r>
+          </a:p>
+          <a:p>
+            <a:pPr>
+              <a:lnSpc>
+                <a:spcPct val="120000"/>
+              </a:lnSpc>
+            </a:pPr>
+            <a:r>
+              <a:rPr kumimoji="1" lang="ko-KR" altLang="en-US" sz="1600" dirty="0" smtClean="0">
+                <a:solidFill>
+                  <a:schemeClr val="tx1">
+                    <a:lumMod val="75000"/>
+                    <a:lumOff val="25000"/>
+                  </a:schemeClr>
+                </a:solidFill>
+                <a:latin typeface="Nanum Gothic" charset="-127"/>
+                <a:ea typeface="Nanum Gothic" charset="-127"/>
+                <a:cs typeface="Nanum Gothic" charset="-127"/>
+              </a:rPr>
+              <a:t>배열에 사용 시 해당 인덱스가 삭제되고 </a:t>
+            </a:r>
+            <a:r>
+              <a:rPr kumimoji="1" lang="en-US" altLang="ko-KR" sz="1600" dirty="0" smtClean="0">
+                <a:solidFill>
+                  <a:schemeClr val="tx1">
+                    <a:lumMod val="75000"/>
+                    <a:lumOff val="25000"/>
+                  </a:schemeClr>
+                </a:solidFill>
+                <a:latin typeface="Nanum Gothic" charset="-127"/>
+                <a:ea typeface="Nanum Gothic" charset="-127"/>
+                <a:cs typeface="Nanum Gothic" charset="-127"/>
+              </a:rPr>
+              <a:t>length</a:t>
+            </a:r>
+            <a:r>
+              <a:rPr kumimoji="1" lang="ko-KR" altLang="en-US" sz="1600" dirty="0" smtClean="0">
+                <a:solidFill>
+                  <a:schemeClr val="tx1">
+                    <a:lumMod val="75000"/>
+                    <a:lumOff val="25000"/>
+                  </a:schemeClr>
+                </a:solidFill>
+                <a:latin typeface="Nanum Gothic" charset="-127"/>
+                <a:ea typeface="Nanum Gothic" charset="-127"/>
+                <a:cs typeface="Nanum Gothic" charset="-127"/>
+              </a:rPr>
+              <a:t>가 변하지 않는다</a:t>
+            </a:r>
+            <a:r>
+              <a:rPr kumimoji="1" lang="en-US" altLang="ko-KR" sz="1600" dirty="0" smtClean="0">
+                <a:solidFill>
+                  <a:schemeClr val="tx1">
+                    <a:lumMod val="75000"/>
+                    <a:lumOff val="25000"/>
+                  </a:schemeClr>
+                </a:solidFill>
+                <a:latin typeface="Nanum Gothic" charset="-127"/>
+                <a:ea typeface="Nanum Gothic" charset="-127"/>
+                <a:cs typeface="Nanum Gothic" charset="-127"/>
+              </a:rPr>
+              <a:t>.</a:t>
+            </a:r>
+            <a:r>
+              <a:rPr kumimoji="1" lang="ko-KR" altLang="en-US" sz="1600" dirty="0" smtClean="0">
+                <a:solidFill>
+                  <a:schemeClr val="tx1">
+                    <a:lumMod val="75000"/>
+                    <a:lumOff val="25000"/>
+                  </a:schemeClr>
+                </a:solidFill>
+                <a:latin typeface="Nanum Gothic" charset="-127"/>
+                <a:ea typeface="Nanum Gothic" charset="-127"/>
+                <a:cs typeface="Nanum Gothic" charset="-127"/>
+              </a:rPr>
+              <a:t> </a:t>
+            </a:r>
+            <a:r>
+              <a:rPr kumimoji="1" lang="en-US" altLang="ko-KR" sz="1600" dirty="0" smtClean="0">
+                <a:solidFill>
+                  <a:schemeClr val="tx1">
+                    <a:lumMod val="75000"/>
+                    <a:lumOff val="25000"/>
+                  </a:schemeClr>
+                </a:solidFill>
+                <a:latin typeface="Nanum Gothic" charset="-127"/>
+                <a:ea typeface="Nanum Gothic" charset="-127"/>
+                <a:cs typeface="Nanum Gothic" charset="-127"/>
+              </a:rPr>
+              <a:t>(</a:t>
+            </a:r>
+            <a:r>
+              <a:rPr kumimoji="1" lang="ko-KR" altLang="en-US" sz="1600" dirty="0" smtClean="0">
+                <a:solidFill>
+                  <a:schemeClr val="tx1">
+                    <a:lumMod val="75000"/>
+                    <a:lumOff val="25000"/>
+                  </a:schemeClr>
+                </a:solidFill>
+                <a:latin typeface="Nanum Gothic" charset="-127"/>
+                <a:ea typeface="Nanum Gothic" charset="-127"/>
+                <a:cs typeface="Nanum Gothic" charset="-127"/>
+              </a:rPr>
+              <a:t>배열에는 쓰지말자</a:t>
+            </a:r>
+            <a:r>
+              <a:rPr kumimoji="1" lang="en-US" altLang="ko-KR" sz="1600" dirty="0">
+                <a:solidFill>
+                  <a:schemeClr val="tx1">
+                    <a:lumMod val="75000"/>
+                    <a:lumOff val="25000"/>
+                  </a:schemeClr>
+                </a:solidFill>
+                <a:latin typeface="Nanum Gothic" charset="-127"/>
+                <a:ea typeface="Nanum Gothic" charset="-127"/>
+                <a:cs typeface="Nanum Gothic" charset="-127"/>
+              </a:rPr>
+              <a:t>)</a:t>
+            </a:r>
+            <a:endParaRPr kumimoji="1" lang="en-US" altLang="ko-KR" sz="1600" dirty="0" smtClean="0">
+              <a:solidFill>
+                <a:schemeClr val="tx1">
+                  <a:lumMod val="75000"/>
+                  <a:lumOff val="25000"/>
+                </a:schemeClr>
+              </a:solidFill>
+              <a:latin typeface="Nanum Gothic" charset="-127"/>
+              <a:ea typeface="Nanum Gothic" charset="-127"/>
+              <a:cs typeface="Nanum Gothic" charset="-127"/>
+            </a:endParaRPr>
           </a:p>
         </p:txBody>
       </p:sp>
@@ -11151,8 +12228,8 @@
         </p:nvSpPr>
         <p:spPr>
           <a:xfrm>
-            <a:off x="546012" y="3076921"/>
-            <a:ext cx="1160895" cy="369332"/>
+            <a:off x="546012" y="2924159"/>
+            <a:ext cx="1524776" cy="369332"/>
           </a:xfrm>
           <a:prstGeom prst="rect">
             <a:avLst/>
@@ -11189,7 +12266,20 @@
                 <a:ea typeface="Nanum Gothic" charset="-127"/>
                 <a:cs typeface="Nanum Gothic" charset="-127"/>
               </a:rPr>
-              <a:t>OR ( || )</a:t>
+              <a:t>void </a:t>
+            </a:r>
+            <a:r>
+              <a:rPr kumimoji="1" lang="ko-KR" altLang="en-US" b="1" dirty="0" smtClean="0">
+                <a:solidFill>
+                  <a:schemeClr val="accent6">
+                    <a:lumMod val="50000"/>
+                  </a:schemeClr>
+                </a:solidFill>
+                <a:latin typeface="Nanum Gothic" charset="-127"/>
+                <a:ea typeface="Nanum Gothic" charset="-127"/>
+                <a:cs typeface="Nanum Gothic" charset="-127"/>
+              </a:rPr>
+              <a:t>연산자</a:t>
             </a:r>
             <a:endParaRPr kumimoji="1" lang="ko-KR" altLang="en-US" b="1" dirty="0">
               <a:solidFill>
@@ -11206,14 +12296,14 @@
       </p:sp>
       <p:sp>
         <p:nvSpPr>
-          <p:cNvPr id="12" name="TextBox 11"/>
+          <p:cNvPr id="11" name="TextBox 6"/>
           <p:cNvSpPr txBox="1"/>
           <p:nvPr/>
         </p:nvSpPr>
         <p:spPr>
           <a:xfrm>
-            <a:off x="730799" y="3473250"/>
-            <a:ext cx="2473754" cy="387798"/>
+            <a:off x="735389" y="1195967"/>
+            <a:ext cx="1874231" cy="340093"/>
           </a:xfrm>
           <a:prstGeom prst="rect">
             <a:avLst/>
@@ -11232,85 +12322,43 @@
               </a:lnSpc>
             </a:pPr>
             <a:r>
-              <a:rPr kumimoji="1" lang="ko-KR" altLang="en-US" sz="1600" dirty="0" smtClean="0">
-                <a:solidFill>
-                  <a:schemeClr val="tx1">
-                    <a:lumMod val="75000"/>
-                    <a:lumOff val="25000"/>
-                  </a:schemeClr>
-                </a:solidFill>
-                <a:latin typeface="Nanum Gothic" charset="-127"/>
-                <a:ea typeface="Nanum Gothic" charset="-127"/>
-                <a:cs typeface="Nanum Gothic" charset="-127"/>
-              </a:rPr>
-              <a:t>둘중 하나라도 </a:t>
-            </a:r>
-            <a:r>
-              <a:rPr kumimoji="1" lang="en-US" altLang="ko-KR" sz="1600" dirty="0" smtClean="0">
-                <a:solidFill>
-                  <a:schemeClr val="tx1">
-                    <a:lumMod val="75000"/>
-                    <a:lumOff val="25000"/>
-                  </a:schemeClr>
-                </a:solidFill>
-                <a:latin typeface="Nanum Gothic" charset="-127"/>
-                <a:ea typeface="Nanum Gothic" charset="-127"/>
-                <a:cs typeface="Nanum Gothic" charset="-127"/>
-              </a:rPr>
-              <a:t>true</a:t>
-            </a:r>
-            <a:r>
-              <a:rPr kumimoji="1" lang="ko-KR" altLang="en-US" sz="1600" dirty="0" smtClean="0">
-                <a:solidFill>
-                  <a:schemeClr val="tx1">
-                    <a:lumMod val="75000"/>
-                    <a:lumOff val="25000"/>
-                  </a:schemeClr>
-                </a:solidFill>
-                <a:latin typeface="Nanum Gothic" charset="-127"/>
-                <a:ea typeface="Nanum Gothic" charset="-127"/>
-                <a:cs typeface="Nanum Gothic" charset="-127"/>
-              </a:rPr>
-              <a:t>면 </a:t>
-            </a:r>
-            <a:r>
-              <a:rPr kumimoji="1" lang="en-US" altLang="ko-KR" sz="1600" dirty="0" smtClean="0">
-                <a:solidFill>
-                  <a:schemeClr val="tx1">
-                    <a:lumMod val="75000"/>
-                    <a:lumOff val="25000"/>
-                  </a:schemeClr>
-                </a:solidFill>
-                <a:latin typeface="Nanum Gothic" charset="-127"/>
-                <a:ea typeface="Nanum Gothic" charset="-127"/>
-                <a:cs typeface="Nanum Gothic" charset="-127"/>
-              </a:rPr>
-              <a:t>true</a:t>
-            </a:r>
-            <a:endParaRPr kumimoji="1" lang="en-US" altLang="ko-KR" sz="1600" dirty="0" smtClean="0">
+              <a:rPr kumimoji="1" lang="en-US" altLang="ko-KR" sz="1400" dirty="0" smtClean="0">
+                <a:solidFill>
+                  <a:schemeClr val="tx1">
+                    <a:lumMod val="50000"/>
+                    <a:lumOff val="50000"/>
+                  </a:schemeClr>
+                </a:solidFill>
+                <a:latin typeface="Consolas" charset="0"/>
+                <a:ea typeface="Consolas" charset="0"/>
+                <a:cs typeface="Consolas" charset="0"/>
+              </a:rPr>
+              <a:t>delete [property]</a:t>
+            </a:r>
+            <a:endParaRPr kumimoji="1" lang="en-US" altLang="ko-KR" sz="1400" dirty="0" smtClean="0">
               <a:solidFill>
                 <a:schemeClr val="tx1">
                   <a:lumMod val="50000"/>
                   <a:lumOff val="50000"/>
                 </a:schemeClr>
               </a:solidFill>
-              <a:latin typeface="Nanum Gothic" charset="-127"/>
-              <a:ea typeface="Nanum Gothic" charset="-127"/>
-              <a:cs typeface="Nanum Gothic" charset="-127"/>
+              <a:latin typeface="Consolas" charset="0"/>
+              <a:ea typeface="Consolas" charset="0"/>
+              <a:cs typeface="Consolas" charset="0"/>
             </a:endParaRPr>
           </a:p>
         </p:txBody>
       </p:sp>
       <p:sp>
         <p:nvSpPr>
-          <p:cNvPr id="16" name="TextBox 15"/>
+          <p:cNvPr id="18" name="TextBox 6"/>
           <p:cNvSpPr txBox="1"/>
           <p:nvPr/>
         </p:nvSpPr>
         <p:spPr>
           <a:xfrm>
-            <a:off x="546011" y="4606514"/>
-            <a:ext cx="1295547" cy="369332"/>
+            <a:off x="680710" y="3691232"/>
+            <a:ext cx="4721164" cy="387798"/>
           </a:xfrm>
           <a:prstGeom prst="rect">
             <a:avLst/>
@@ -11323,36 +12371,86 @@
           </a:bodyPr>
           <a:lstStyle/>
           <a:p>
-            <a:r>
-              <a:rPr kumimoji="1" lang="ko-KR" altLang="en-US" b="1" dirty="0" smtClean="0">
-                <a:solidFill>
-                  <a:schemeClr val="accent6">
-                    <a:lumMod val="50000"/>
-                  </a:schemeClr>
-                </a:solidFill>
-                <a:latin typeface="Nanum Gothic" charset="-127"/>
-                <a:ea typeface="Nanum Gothic" charset="-127"/>
-                <a:cs typeface="Nanum Gothic" charset="-127"/>
-              </a:rPr>
-              <a:t>► </a:t>
-            </a:r>
-            <a:r>
-              <a:rPr kumimoji="1" lang="en-US" altLang="ko-KR" b="1" dirty="0" smtClean="0">
-                <a:solidFill>
-                  <a:schemeClr val="accent6">
-                    <a:lumMod val="50000"/>
-                  </a:schemeClr>
-                </a:solidFill>
-                <a:latin typeface="Nanum Gothic" charset="-127"/>
-                <a:ea typeface="Nanum Gothic" charset="-127"/>
-                <a:cs typeface="Nanum Gothic" charset="-127"/>
-              </a:rPr>
-              <a:t>NOT ( ! )</a:t>
-            </a:r>
-            <a:endParaRPr kumimoji="1" lang="ko-KR" altLang="en-US" b="1" dirty="0">
+            <a:pPr>
+              <a:lnSpc>
+                <a:spcPct val="120000"/>
+              </a:lnSpc>
+            </a:pPr>
+            <a:r>
+              <a:rPr kumimoji="1" lang="ko-KR" altLang="en-US" sz="1600" dirty="0" smtClean="0">
+                <a:solidFill>
+                  <a:schemeClr val="tx1">
+                    <a:lumMod val="75000"/>
+                    <a:lumOff val="25000"/>
+                  </a:schemeClr>
+                </a:solidFill>
+                <a:latin typeface="Nanum Gothic" charset="-127"/>
+                <a:ea typeface="Nanum Gothic" charset="-127"/>
+                <a:cs typeface="Nanum Gothic" charset="-127"/>
+              </a:rPr>
+              <a:t>피연산자를 무시하고 </a:t>
+            </a:r>
+            <a:r>
+              <a:rPr kumimoji="1" lang="en-US" altLang="ko-KR" sz="1600" b="1" dirty="0" smtClean="0">
+                <a:solidFill>
+                  <a:schemeClr val="tx1">
+                    <a:lumMod val="75000"/>
+                    <a:lumOff val="25000"/>
+                  </a:schemeClr>
+                </a:solidFill>
+                <a:latin typeface="Nanum Gothic" charset="-127"/>
+                <a:ea typeface="Nanum Gothic" charset="-127"/>
+                <a:cs typeface="Nanum Gothic" charset="-127"/>
+              </a:rPr>
+              <a:t>undefined</a:t>
+            </a:r>
+            <a:r>
+              <a:rPr kumimoji="1" lang="ko-KR" altLang="en-US" sz="1600" b="1" dirty="0" smtClean="0">
+                <a:solidFill>
+                  <a:schemeClr val="tx1">
+                    <a:lumMod val="75000"/>
+                    <a:lumOff val="25000"/>
+                  </a:schemeClr>
+                </a:solidFill>
+                <a:latin typeface="Nanum Gothic" charset="-127"/>
+                <a:ea typeface="Nanum Gothic" charset="-127"/>
+                <a:cs typeface="Nanum Gothic" charset="-127"/>
+              </a:rPr>
+              <a:t>를 반환</a:t>
+            </a:r>
+            <a:r>
+              <a:rPr kumimoji="1" lang="ko-KR" altLang="en-US" sz="1600" dirty="0" smtClean="0">
+                <a:solidFill>
+                  <a:schemeClr val="tx1">
+                    <a:lumMod val="75000"/>
+                    <a:lumOff val="25000"/>
+                  </a:schemeClr>
+                </a:solidFill>
+                <a:latin typeface="Nanum Gothic" charset="-127"/>
+                <a:ea typeface="Nanum Gothic" charset="-127"/>
+                <a:cs typeface="Nanum Gothic" charset="-127"/>
+              </a:rPr>
+              <a:t>하는 연산자</a:t>
+            </a:r>
+            <a:r>
+              <a:rPr kumimoji="1" lang="en-US" altLang="ko-KR" sz="1600" dirty="0" smtClean="0">
+                <a:solidFill>
+                  <a:schemeClr val="tx1">
+                    <a:lumMod val="75000"/>
+                    <a:lumOff val="25000"/>
+                  </a:schemeClr>
+                </a:solidFill>
+                <a:latin typeface="Nanum Gothic" charset="-127"/>
+                <a:ea typeface="Nanum Gothic" charset="-127"/>
+                <a:cs typeface="Nanum Gothic" charset="-127"/>
+              </a:rPr>
+              <a:t>.</a:t>
+            </a:r>
+            <a:endParaRPr kumimoji="1" lang="en-US" altLang="ko-KR" sz="1600" dirty="0" smtClean="0">
               <a:solidFill>
-                <a:schemeClr val="accent6">
-                  <a:lumMod val="50000"/>
+                <a:schemeClr val="tx1">
+                  <a:lumMod val="75000"/>
+                  <a:lumOff val="25000"/>
                 </a:schemeClr>
               </a:solidFill>
               <a:latin typeface="Nanum Gothic" charset="-127"/>
@@ -11364,14 +12462,14 @@
       </p:sp>
       <p:sp>
         <p:nvSpPr>
-          <p:cNvPr id="17" name="TextBox 16"/>
+          <p:cNvPr id="19" name="TextBox 6"/>
           <p:cNvSpPr txBox="1"/>
           <p:nvPr/>
         </p:nvSpPr>
         <p:spPr>
           <a:xfrm>
-            <a:off x="730798" y="5082048"/>
-            <a:ext cx="2443298" cy="363176"/>
+            <a:off x="683612" y="3331192"/>
+            <a:ext cx="1697901" cy="337785"/>
           </a:xfrm>
           <a:prstGeom prst="rect">
             <a:avLst/>
@@ -11390,85 +12488,1553 @@
               </a:lnSpc>
             </a:pPr>
             <a:r>
-              <a:rPr kumimoji="1" lang="en-US" altLang="ko-KR" sz="1600" dirty="0" smtClean="0">
-                <a:solidFill>
-                  <a:schemeClr val="tx1">
-                    <a:lumMod val="75000"/>
-                    <a:lumOff val="25000"/>
-                  </a:schemeClr>
-                </a:solidFill>
-                <a:latin typeface="Nanum Gothic" charset="-127"/>
-                <a:ea typeface="Nanum Gothic" charset="-127"/>
-                <a:cs typeface="Nanum Gothic" charset="-127"/>
-              </a:rPr>
-              <a:t>true</a:t>
-            </a:r>
-            <a:r>
-              <a:rPr kumimoji="1" lang="ko-KR" altLang="en-US" sz="1600" dirty="0" smtClean="0">
-                <a:solidFill>
-                  <a:schemeClr val="tx1">
-                    <a:lumMod val="75000"/>
-                    <a:lumOff val="25000"/>
-                  </a:schemeClr>
-                </a:solidFill>
-                <a:latin typeface="Nanum Gothic" charset="-127"/>
-                <a:ea typeface="Nanum Gothic" charset="-127"/>
-                <a:cs typeface="Nanum Gothic" charset="-127"/>
-              </a:rPr>
-              <a:t>면 </a:t>
-            </a:r>
-            <a:r>
-              <a:rPr kumimoji="1" lang="en-US" altLang="ko-KR" sz="1600" dirty="0" smtClean="0">
-                <a:solidFill>
-                  <a:schemeClr val="tx1">
-                    <a:lumMod val="75000"/>
-                    <a:lumOff val="25000"/>
-                  </a:schemeClr>
-                </a:solidFill>
-                <a:latin typeface="Nanum Gothic" charset="-127"/>
-                <a:ea typeface="Nanum Gothic" charset="-127"/>
-                <a:cs typeface="Nanum Gothic" charset="-127"/>
-              </a:rPr>
-              <a:t>false, false</a:t>
-            </a:r>
-            <a:r>
-              <a:rPr kumimoji="1" lang="ko-KR" altLang="en-US" sz="1600" dirty="0" smtClean="0">
-                <a:solidFill>
-                  <a:schemeClr val="tx1">
-                    <a:lumMod val="75000"/>
-                    <a:lumOff val="25000"/>
-                  </a:schemeClr>
-                </a:solidFill>
-                <a:latin typeface="Nanum Gothic" charset="-127"/>
-                <a:ea typeface="Nanum Gothic" charset="-127"/>
-                <a:cs typeface="Nanum Gothic" charset="-127"/>
-              </a:rPr>
-              <a:t>면 </a:t>
-            </a:r>
-            <a:r>
-              <a:rPr kumimoji="1" lang="en-US" altLang="ko-KR" sz="1600" dirty="0" smtClean="0">
-                <a:solidFill>
-                  <a:schemeClr val="tx1">
-                    <a:lumMod val="75000"/>
-                    <a:lumOff val="25000"/>
-                  </a:schemeClr>
-                </a:solidFill>
-                <a:latin typeface="Nanum Gothic" charset="-127"/>
-                <a:ea typeface="Nanum Gothic" charset="-127"/>
-                <a:cs typeface="Nanum Gothic" charset="-127"/>
-              </a:rPr>
-              <a:t>true</a:t>
-            </a:r>
-            <a:endParaRPr kumimoji="1" lang="en-US" altLang="ko-KR" sz="1600" dirty="0" smtClean="0">
+              <a:rPr kumimoji="1" lang="en-US" altLang="ko-KR" sz="1400" dirty="0" smtClean="0">
+                <a:solidFill>
+                  <a:schemeClr val="tx1">
+                    <a:lumMod val="50000"/>
+                    <a:lumOff val="50000"/>
+                  </a:schemeClr>
+                </a:solidFill>
+                <a:latin typeface="Consolas" charset="0"/>
+                <a:ea typeface="Consolas" charset="0"/>
+                <a:cs typeface="Consolas" charset="0"/>
+              </a:rPr>
+              <a:t>void</a:t>
+            </a:r>
+            <a:r>
+              <a:rPr kumimoji="1" lang="en-US" altLang="ko-KR" sz="1400" dirty="0" smtClean="0">
+                <a:solidFill>
+                  <a:schemeClr val="tx1">
+                    <a:lumMod val="50000"/>
+                    <a:lumOff val="50000"/>
+                  </a:schemeClr>
+                </a:solidFill>
+                <a:latin typeface="Consolas" charset="0"/>
+                <a:ea typeface="Consolas" charset="0"/>
+                <a:cs typeface="Consolas" charset="0"/>
+              </a:rPr>
+              <a:t> [</a:t>
+            </a:r>
+            <a:r>
+              <a:rPr kumimoji="1" lang="ko-KR" altLang="en-US" sz="1400" dirty="0" smtClean="0">
+                <a:solidFill>
+                  <a:schemeClr val="tx1">
+                    <a:lumMod val="50000"/>
+                    <a:lumOff val="50000"/>
+                  </a:schemeClr>
+                </a:solidFill>
+                <a:latin typeface="Consolas" charset="0"/>
+                <a:ea typeface="Consolas" charset="0"/>
+                <a:cs typeface="Consolas" charset="0"/>
+              </a:rPr>
+              <a:t>모든 타입</a:t>
+            </a:r>
+            <a:r>
+              <a:rPr kumimoji="1" lang="en-US" altLang="ko-KR" sz="1400" dirty="0" smtClean="0">
+                <a:solidFill>
+                  <a:schemeClr val="tx1">
+                    <a:lumMod val="50000"/>
+                    <a:lumOff val="50000"/>
+                  </a:schemeClr>
+                </a:solidFill>
+                <a:latin typeface="Consolas" charset="0"/>
+                <a:ea typeface="Consolas" charset="0"/>
+                <a:cs typeface="Consolas" charset="0"/>
+              </a:rPr>
+              <a:t>]</a:t>
+            </a:r>
+            <a:endParaRPr kumimoji="1" lang="en-US" altLang="ko-KR" sz="1400" dirty="0" smtClean="0">
               <a:solidFill>
                 <a:schemeClr val="tx1">
                   <a:lumMod val="50000"/>
                   <a:lumOff val="50000"/>
                 </a:schemeClr>
               </a:solidFill>
+              <a:latin typeface="Consolas" charset="0"/>
+              <a:ea typeface="Consolas" charset="0"/>
+              <a:cs typeface="Consolas" charset="0"/>
+            </a:endParaRPr>
+          </a:p>
+        </p:txBody>
+      </p:sp>
+      <p:sp>
+        <p:nvSpPr>
+          <p:cNvPr id="13" name="TextBox 9"/>
+          <p:cNvSpPr txBox="1"/>
+          <p:nvPr/>
+        </p:nvSpPr>
+        <p:spPr>
+          <a:xfrm>
+            <a:off x="546012" y="4220303"/>
+            <a:ext cx="1747594" cy="369332"/>
+          </a:xfrm>
+          <a:prstGeom prst="rect">
+            <a:avLst/>
+          </a:prstGeom>
+          <a:noFill/>
+        </p:spPr>
+        <p:txBody>
+          <a:bodyPr wrap="none" rtlCol="0">
+            <a:spAutoFit/>
+          </a:bodyPr>
+          <a:lstStyle/>
+          <a:p>
+            <a:r>
+              <a:rPr kumimoji="1" lang="ko-KR" altLang="en-US" b="1" dirty="0" smtClean="0">
+                <a:solidFill>
+                  <a:schemeClr val="accent6">
+                    <a:lumMod val="50000"/>
+                  </a:schemeClr>
+                </a:solidFill>
+                <a:latin typeface="Nanum Gothic" charset="-127"/>
+                <a:ea typeface="Nanum Gothic" charset="-127"/>
+                <a:cs typeface="Nanum Gothic" charset="-127"/>
+              </a:rPr>
+              <a:t>► </a:t>
+            </a:r>
+            <a:r>
+              <a:rPr kumimoji="1" lang="ko-KR" altLang="en-US" b="1" dirty="0" smtClean="0">
+                <a:solidFill>
+                  <a:schemeClr val="accent6">
+                    <a:lumMod val="50000"/>
+                  </a:schemeClr>
+                </a:solidFill>
+                <a:latin typeface="Nanum Gothic" charset="-127"/>
+                <a:ea typeface="Nanum Gothic" charset="-127"/>
+                <a:cs typeface="Nanum Gothic" charset="-127"/>
+              </a:rPr>
+              <a:t>쉼표</a:t>
+            </a:r>
+            <a:r>
+              <a:rPr kumimoji="1" lang="en-US" altLang="ko-KR" b="1" dirty="0" smtClean="0">
+                <a:solidFill>
+                  <a:schemeClr val="accent6">
+                    <a:lumMod val="50000"/>
+                  </a:schemeClr>
+                </a:solidFill>
+                <a:latin typeface="Nanum Gothic" charset="-127"/>
+                <a:ea typeface="Nanum Gothic" charset="-127"/>
+                <a:cs typeface="Nanum Gothic" charset="-127"/>
+              </a:rPr>
+              <a:t>(,) </a:t>
+            </a:r>
+            <a:r>
+              <a:rPr kumimoji="1" lang="ko-KR" altLang="en-US" b="1" dirty="0" smtClean="0">
+                <a:solidFill>
+                  <a:schemeClr val="accent6">
+                    <a:lumMod val="50000"/>
+                  </a:schemeClr>
+                </a:solidFill>
+                <a:latin typeface="Nanum Gothic" charset="-127"/>
+                <a:ea typeface="Nanum Gothic" charset="-127"/>
+                <a:cs typeface="Nanum Gothic" charset="-127"/>
+              </a:rPr>
+              <a:t>연산자</a:t>
+            </a:r>
+            <a:endParaRPr kumimoji="1" lang="ko-KR" altLang="en-US" b="1" dirty="0">
+              <a:solidFill>
+                <a:schemeClr val="accent6">
+                  <a:lumMod val="50000"/>
+                </a:schemeClr>
+              </a:solidFill>
               <a:latin typeface="Nanum Gothic" charset="-127"/>
               <a:ea typeface="Nanum Gothic" charset="-127"/>
               <a:cs typeface="Nanum Gothic" charset="-127"/>
+            </a:endParaRPr>
+          </a:p>
+        </p:txBody>
+      </p:sp>
+      <p:sp>
+        <p:nvSpPr>
+          <p:cNvPr id="14" name="TextBox 6"/>
+          <p:cNvSpPr txBox="1"/>
+          <p:nvPr/>
+        </p:nvSpPr>
+        <p:spPr>
+          <a:xfrm>
+            <a:off x="680710" y="4987376"/>
+            <a:ext cx="5085046" cy="683264"/>
+          </a:xfrm>
+          <a:prstGeom prst="rect">
+            <a:avLst/>
+          </a:prstGeom>
+          <a:noFill/>
+        </p:spPr>
+        <p:txBody>
+          <a:bodyPr wrap="none" rtlCol="0">
+            <a:spAutoFit/>
+          </a:bodyPr>
+          <a:lstStyle/>
+          <a:p>
+            <a:pPr>
+              <a:lnSpc>
+                <a:spcPct val="120000"/>
+              </a:lnSpc>
+            </a:pPr>
+            <a:r>
+              <a:rPr kumimoji="1" lang="ko-KR" altLang="en-US" sz="1600" dirty="0" smtClean="0">
+                <a:solidFill>
+                  <a:schemeClr val="tx1">
+                    <a:lumMod val="75000"/>
+                    <a:lumOff val="25000"/>
+                  </a:schemeClr>
+                </a:solidFill>
+                <a:latin typeface="Nanum Gothic" charset="-127"/>
+                <a:ea typeface="Nanum Gothic" charset="-127"/>
+                <a:cs typeface="Nanum Gothic" charset="-127"/>
+              </a:rPr>
+              <a:t>왼쪽을 평가하고</a:t>
+            </a:r>
+            <a:r>
+              <a:rPr kumimoji="1" lang="en-US" altLang="ko-KR" sz="1600" dirty="0" smtClean="0">
+                <a:solidFill>
+                  <a:schemeClr val="tx1">
+                    <a:lumMod val="75000"/>
+                    <a:lumOff val="25000"/>
+                  </a:schemeClr>
+                </a:solidFill>
+                <a:latin typeface="Nanum Gothic" charset="-127"/>
+                <a:ea typeface="Nanum Gothic" charset="-127"/>
+                <a:cs typeface="Nanum Gothic" charset="-127"/>
+              </a:rPr>
+              <a:t>,</a:t>
+            </a:r>
+            <a:r>
+              <a:rPr kumimoji="1" lang="ko-KR" altLang="en-US" sz="1600" dirty="0" smtClean="0">
+                <a:solidFill>
+                  <a:schemeClr val="tx1">
+                    <a:lumMod val="75000"/>
+                    <a:lumOff val="25000"/>
+                  </a:schemeClr>
+                </a:solidFill>
+                <a:latin typeface="Nanum Gothic" charset="-127"/>
+                <a:ea typeface="Nanum Gothic" charset="-127"/>
+                <a:cs typeface="Nanum Gothic" charset="-127"/>
+              </a:rPr>
+              <a:t> 오른쪽을 평가하며</a:t>
+            </a:r>
+            <a:r>
+              <a:rPr kumimoji="1" lang="en-US" altLang="ko-KR" sz="1600" dirty="0" smtClean="0">
+                <a:solidFill>
+                  <a:schemeClr val="tx1">
+                    <a:lumMod val="75000"/>
+                    <a:lumOff val="25000"/>
+                  </a:schemeClr>
+                </a:solidFill>
+                <a:latin typeface="Nanum Gothic" charset="-127"/>
+                <a:ea typeface="Nanum Gothic" charset="-127"/>
+                <a:cs typeface="Nanum Gothic" charset="-127"/>
+              </a:rPr>
+              <a:t>,</a:t>
+            </a:r>
+            <a:r>
+              <a:rPr kumimoji="1" lang="ko-KR" altLang="en-US" sz="1600" dirty="0" smtClean="0">
+                <a:solidFill>
+                  <a:schemeClr val="tx1">
+                    <a:lumMod val="75000"/>
+                    <a:lumOff val="25000"/>
+                  </a:schemeClr>
+                </a:solidFill>
+                <a:latin typeface="Nanum Gothic" charset="-127"/>
+                <a:ea typeface="Nanum Gothic" charset="-127"/>
+                <a:cs typeface="Nanum Gothic" charset="-127"/>
+              </a:rPr>
+              <a:t> </a:t>
+            </a:r>
+            <a:r>
+              <a:rPr kumimoji="1" lang="ko-KR" altLang="en-US" sz="1600" b="1" dirty="0" smtClean="0">
+                <a:solidFill>
+                  <a:schemeClr val="tx1">
+                    <a:lumMod val="75000"/>
+                    <a:lumOff val="25000"/>
+                  </a:schemeClr>
+                </a:solidFill>
+                <a:latin typeface="Nanum Gothic" charset="-127"/>
+                <a:ea typeface="Nanum Gothic" charset="-127"/>
+                <a:cs typeface="Nanum Gothic" charset="-127"/>
+              </a:rPr>
+              <a:t>오른쪽을 반환</a:t>
+            </a:r>
+            <a:r>
+              <a:rPr kumimoji="1" lang="ko-KR" altLang="en-US" sz="1600" dirty="0" smtClean="0">
+                <a:solidFill>
+                  <a:schemeClr val="tx1">
+                    <a:lumMod val="75000"/>
+                    <a:lumOff val="25000"/>
+                  </a:schemeClr>
+                </a:solidFill>
+                <a:latin typeface="Nanum Gothic" charset="-127"/>
+                <a:ea typeface="Nanum Gothic" charset="-127"/>
+                <a:cs typeface="Nanum Gothic" charset="-127"/>
+              </a:rPr>
+              <a:t>한다</a:t>
+            </a:r>
+            <a:r>
+              <a:rPr kumimoji="1" lang="en-US" altLang="ko-KR" sz="1600" dirty="0" smtClean="0">
+                <a:solidFill>
+                  <a:schemeClr val="tx1">
+                    <a:lumMod val="75000"/>
+                    <a:lumOff val="25000"/>
+                  </a:schemeClr>
+                </a:solidFill>
+                <a:latin typeface="Nanum Gothic" charset="-127"/>
+                <a:ea typeface="Nanum Gothic" charset="-127"/>
+                <a:cs typeface="Nanum Gothic" charset="-127"/>
+              </a:rPr>
+              <a:t>.</a:t>
+            </a:r>
+          </a:p>
+          <a:p>
+            <a:pPr>
+              <a:lnSpc>
+                <a:spcPct val="120000"/>
+              </a:lnSpc>
+            </a:pPr>
+            <a:r>
+              <a:rPr kumimoji="1" lang="en-US" altLang="ko-KR" sz="1600" dirty="0" err="1" smtClean="0">
+                <a:solidFill>
+                  <a:schemeClr val="tx1">
+                    <a:lumMod val="75000"/>
+                    <a:lumOff val="25000"/>
+                  </a:schemeClr>
+                </a:solidFill>
+                <a:latin typeface="Nanum Gothic" charset="-127"/>
+                <a:ea typeface="Nanum Gothic" charset="-127"/>
+                <a:cs typeface="Nanum Gothic" charset="-127"/>
+              </a:rPr>
+              <a:t>i</a:t>
+            </a:r>
+            <a:r>
+              <a:rPr kumimoji="1" lang="en-US" altLang="ko-KR" sz="1600" dirty="0" smtClean="0">
+                <a:solidFill>
+                  <a:schemeClr val="tx1">
+                    <a:lumMod val="75000"/>
+                    <a:lumOff val="25000"/>
+                  </a:schemeClr>
+                </a:solidFill>
+                <a:latin typeface="Nanum Gothic" charset="-127"/>
+                <a:ea typeface="Nanum Gothic" charset="-127"/>
+                <a:cs typeface="Nanum Gothic" charset="-127"/>
+              </a:rPr>
+              <a:t> = 0, j = 0;</a:t>
+            </a:r>
+            <a:r>
+              <a:rPr kumimoji="1" lang="ko-KR" altLang="en-US" sz="1600" dirty="0" smtClean="0">
+                <a:solidFill>
+                  <a:schemeClr val="tx1">
+                    <a:lumMod val="75000"/>
+                    <a:lumOff val="25000"/>
+                  </a:schemeClr>
+                </a:solidFill>
+                <a:latin typeface="Nanum Gothic" charset="-127"/>
+                <a:ea typeface="Nanum Gothic" charset="-127"/>
+                <a:cs typeface="Nanum Gothic" charset="-127"/>
+              </a:rPr>
+              <a:t> 이 표현식은 </a:t>
+            </a:r>
+            <a:r>
+              <a:rPr kumimoji="1" lang="en-US" altLang="ko-KR" sz="1600" dirty="0" smtClean="0">
+                <a:solidFill>
+                  <a:schemeClr val="tx1">
+                    <a:lumMod val="75000"/>
+                    <a:lumOff val="25000"/>
+                  </a:schemeClr>
+                </a:solidFill>
+                <a:latin typeface="Nanum Gothic" charset="-127"/>
+                <a:ea typeface="Nanum Gothic" charset="-127"/>
+                <a:cs typeface="Nanum Gothic" charset="-127"/>
+              </a:rPr>
+              <a:t>0</a:t>
+            </a:r>
+            <a:r>
+              <a:rPr kumimoji="1" lang="ko-KR" altLang="en-US" sz="1600" dirty="0" smtClean="0">
+                <a:solidFill>
+                  <a:schemeClr val="tx1">
+                    <a:lumMod val="75000"/>
+                    <a:lumOff val="25000"/>
+                  </a:schemeClr>
+                </a:solidFill>
+                <a:latin typeface="Nanum Gothic" charset="-127"/>
+                <a:ea typeface="Nanum Gothic" charset="-127"/>
+                <a:cs typeface="Nanum Gothic" charset="-127"/>
+              </a:rPr>
+              <a:t>이 된다</a:t>
+            </a:r>
+            <a:r>
+              <a:rPr kumimoji="1" lang="en-US" altLang="ko-KR" sz="1600" dirty="0" smtClean="0">
+                <a:solidFill>
+                  <a:schemeClr val="tx1">
+                    <a:lumMod val="75000"/>
+                    <a:lumOff val="25000"/>
+                  </a:schemeClr>
+                </a:solidFill>
+                <a:latin typeface="Nanum Gothic" charset="-127"/>
+                <a:ea typeface="Nanum Gothic" charset="-127"/>
+                <a:cs typeface="Nanum Gothic" charset="-127"/>
+              </a:rPr>
+              <a:t>.</a:t>
+            </a:r>
+            <a:endParaRPr kumimoji="1" lang="en-US" altLang="ko-KR" sz="1600" dirty="0" smtClean="0">
+              <a:solidFill>
+                <a:schemeClr val="tx1">
+                  <a:lumMod val="75000"/>
+                  <a:lumOff val="25000"/>
+                </a:schemeClr>
+              </a:solidFill>
+              <a:latin typeface="Nanum Gothic" charset="-127"/>
+              <a:ea typeface="Nanum Gothic" charset="-127"/>
+              <a:cs typeface="Nanum Gothic" charset="-127"/>
+            </a:endParaRPr>
+          </a:p>
+        </p:txBody>
+      </p:sp>
+      <p:sp>
+        <p:nvSpPr>
+          <p:cNvPr id="16" name="TextBox 6"/>
+          <p:cNvSpPr txBox="1"/>
+          <p:nvPr/>
+        </p:nvSpPr>
+        <p:spPr>
+          <a:xfrm>
+            <a:off x="683612" y="4627336"/>
+            <a:ext cx="2416046" cy="337785"/>
+          </a:xfrm>
+          <a:prstGeom prst="rect">
+            <a:avLst/>
+          </a:prstGeom>
+          <a:noFill/>
+        </p:spPr>
+        <p:txBody>
+          <a:bodyPr wrap="none" rtlCol="0">
+            <a:spAutoFit/>
+          </a:bodyPr>
+          <a:lstStyle/>
+          <a:p>
+            <a:pPr>
+              <a:lnSpc>
+                <a:spcPct val="120000"/>
+              </a:lnSpc>
+            </a:pPr>
+            <a:r>
+              <a:rPr kumimoji="1" lang="en-US" altLang="ko-KR" sz="1400" dirty="0" smtClean="0">
+                <a:solidFill>
+                  <a:schemeClr val="tx1">
+                    <a:lumMod val="50000"/>
+                    <a:lumOff val="50000"/>
+                  </a:schemeClr>
+                </a:solidFill>
+                <a:latin typeface="Consolas" charset="0"/>
+                <a:ea typeface="Consolas" charset="0"/>
+                <a:cs typeface="Consolas" charset="0"/>
+              </a:rPr>
+              <a:t>[</a:t>
+            </a:r>
+            <a:r>
+              <a:rPr kumimoji="1" lang="ko-KR" altLang="en-US" sz="1400" dirty="0" smtClean="0">
+                <a:solidFill>
+                  <a:schemeClr val="tx1">
+                    <a:lumMod val="50000"/>
+                    <a:lumOff val="50000"/>
+                  </a:schemeClr>
+                </a:solidFill>
+                <a:latin typeface="Consolas" charset="0"/>
+                <a:ea typeface="Consolas" charset="0"/>
+                <a:cs typeface="Consolas" charset="0"/>
+              </a:rPr>
+              <a:t>모든 타입</a:t>
+            </a:r>
+            <a:r>
+              <a:rPr kumimoji="1" lang="en-US" altLang="ko-KR" sz="1400" dirty="0" smtClean="0">
+                <a:solidFill>
+                  <a:schemeClr val="tx1">
+                    <a:lumMod val="50000"/>
+                    <a:lumOff val="50000"/>
+                  </a:schemeClr>
+                </a:solidFill>
+                <a:latin typeface="Consolas" charset="0"/>
+                <a:ea typeface="Consolas" charset="0"/>
+                <a:cs typeface="Consolas" charset="0"/>
+              </a:rPr>
+              <a:t>],</a:t>
+            </a:r>
+            <a:r>
+              <a:rPr kumimoji="1" lang="ko-KR" altLang="en-US" sz="1400" dirty="0" smtClean="0">
+                <a:solidFill>
+                  <a:schemeClr val="tx1">
+                    <a:lumMod val="50000"/>
+                    <a:lumOff val="50000"/>
+                  </a:schemeClr>
+                </a:solidFill>
+                <a:latin typeface="Consolas" charset="0"/>
+                <a:ea typeface="Consolas" charset="0"/>
+                <a:cs typeface="Consolas" charset="0"/>
+              </a:rPr>
+              <a:t> </a:t>
+            </a:r>
+            <a:r>
+              <a:rPr kumimoji="1" lang="en-US" altLang="ko-KR" sz="1400" dirty="0" smtClean="0">
+                <a:solidFill>
+                  <a:schemeClr val="tx1">
+                    <a:lumMod val="50000"/>
+                    <a:lumOff val="50000"/>
+                  </a:schemeClr>
+                </a:solidFill>
+                <a:latin typeface="Consolas" charset="0"/>
+                <a:ea typeface="Consolas" charset="0"/>
+                <a:cs typeface="Consolas" charset="0"/>
+              </a:rPr>
+              <a:t>[</a:t>
+            </a:r>
+            <a:r>
+              <a:rPr kumimoji="1" lang="ko-KR" altLang="en-US" sz="1400" dirty="0" smtClean="0">
+                <a:solidFill>
+                  <a:schemeClr val="tx1">
+                    <a:lumMod val="50000"/>
+                    <a:lumOff val="50000"/>
+                  </a:schemeClr>
+                </a:solidFill>
+                <a:latin typeface="Consolas" charset="0"/>
+                <a:ea typeface="Consolas" charset="0"/>
+                <a:cs typeface="Consolas" charset="0"/>
+              </a:rPr>
+              <a:t>모든 타입</a:t>
+            </a:r>
+            <a:r>
+              <a:rPr kumimoji="1" lang="en-US" altLang="ko-KR" sz="1400" dirty="0" smtClean="0">
+                <a:solidFill>
+                  <a:schemeClr val="tx1">
+                    <a:lumMod val="50000"/>
+                    <a:lumOff val="50000"/>
+                  </a:schemeClr>
+                </a:solidFill>
+                <a:latin typeface="Consolas" charset="0"/>
+                <a:ea typeface="Consolas" charset="0"/>
+                <a:cs typeface="Consolas" charset="0"/>
+              </a:rPr>
+              <a:t>]</a:t>
+            </a:r>
+            <a:endParaRPr kumimoji="1" lang="en-US" altLang="ko-KR" sz="1400" dirty="0" smtClean="0">
+              <a:solidFill>
+                <a:schemeClr val="tx1">
+                  <a:lumMod val="50000"/>
+                  <a:lumOff val="50000"/>
+                </a:schemeClr>
+              </a:solidFill>
+              <a:latin typeface="Consolas" charset="0"/>
+              <a:ea typeface="Consolas" charset="0"/>
+              <a:cs typeface="Consolas" charset="0"/>
+            </a:endParaRPr>
+          </a:p>
+        </p:txBody>
+      </p:sp>
+      <p:sp>
+        <p:nvSpPr>
+          <p:cNvPr id="20" name="TextBox 9"/>
+          <p:cNvSpPr txBox="1"/>
+          <p:nvPr/>
+        </p:nvSpPr>
+        <p:spPr>
+          <a:xfrm>
+            <a:off x="546012" y="5892600"/>
+            <a:ext cx="1510350" cy="369332"/>
+          </a:xfrm>
+          <a:prstGeom prst="rect">
+            <a:avLst/>
+          </a:prstGeom>
+          <a:noFill/>
+        </p:spPr>
+        <p:txBody>
+          <a:bodyPr wrap="none" rtlCol="0">
+            <a:spAutoFit/>
+          </a:bodyPr>
+          <a:lstStyle/>
+          <a:p>
+            <a:r>
+              <a:rPr kumimoji="1" lang="ko-KR" altLang="en-US" b="1" dirty="0" smtClean="0">
+                <a:solidFill>
+                  <a:schemeClr val="accent6">
+                    <a:lumMod val="50000"/>
+                  </a:schemeClr>
+                </a:solidFill>
+                <a:latin typeface="Nanum Gothic" charset="-127"/>
+                <a:ea typeface="Nanum Gothic" charset="-127"/>
+                <a:cs typeface="Nanum Gothic" charset="-127"/>
+              </a:rPr>
+              <a:t>► </a:t>
+            </a:r>
+            <a:r>
+              <a:rPr kumimoji="1" lang="ko-KR" altLang="en-US" b="1" dirty="0" smtClean="0">
+                <a:solidFill>
+                  <a:schemeClr val="accent6">
+                    <a:lumMod val="50000"/>
+                  </a:schemeClr>
+                </a:solidFill>
+                <a:latin typeface="Nanum Gothic" charset="-127"/>
+                <a:ea typeface="Nanum Gothic" charset="-127"/>
+                <a:cs typeface="Nanum Gothic" charset="-127"/>
+              </a:rPr>
+              <a:t>삼항</a:t>
+            </a:r>
+            <a:r>
+              <a:rPr kumimoji="1" lang="en-US" altLang="ko-KR" b="1" dirty="0" smtClean="0">
+                <a:solidFill>
+                  <a:schemeClr val="accent6">
+                    <a:lumMod val="50000"/>
+                  </a:schemeClr>
+                </a:solidFill>
+                <a:latin typeface="Nanum Gothic" charset="-127"/>
+                <a:ea typeface="Nanum Gothic" charset="-127"/>
+                <a:cs typeface="Nanum Gothic" charset="-127"/>
+              </a:rPr>
+              <a:t> </a:t>
+            </a:r>
+            <a:r>
+              <a:rPr kumimoji="1" lang="ko-KR" altLang="en-US" b="1" dirty="0" smtClean="0">
+                <a:solidFill>
+                  <a:schemeClr val="accent6">
+                    <a:lumMod val="50000"/>
+                  </a:schemeClr>
+                </a:solidFill>
+                <a:latin typeface="Nanum Gothic" charset="-127"/>
+                <a:ea typeface="Nanum Gothic" charset="-127"/>
+                <a:cs typeface="Nanum Gothic" charset="-127"/>
+              </a:rPr>
+              <a:t>연산자</a:t>
+            </a:r>
+            <a:endParaRPr kumimoji="1" lang="ko-KR" altLang="en-US" b="1" dirty="0">
+              <a:solidFill>
+                <a:schemeClr val="accent6">
+                  <a:lumMod val="50000"/>
+                </a:schemeClr>
+              </a:solidFill>
+              <a:latin typeface="Nanum Gothic" charset="-127"/>
+              <a:ea typeface="Nanum Gothic" charset="-127"/>
+              <a:cs typeface="Nanum Gothic" charset="-127"/>
+            </a:endParaRPr>
+          </a:p>
+        </p:txBody>
+      </p:sp>
+      <p:sp>
+        <p:nvSpPr>
+          <p:cNvPr id="22" name="TextBox 6"/>
+          <p:cNvSpPr txBox="1"/>
+          <p:nvPr/>
+        </p:nvSpPr>
+        <p:spPr>
+          <a:xfrm>
+            <a:off x="683612" y="6299633"/>
+            <a:ext cx="3829895" cy="337785"/>
+          </a:xfrm>
+          <a:prstGeom prst="rect">
+            <a:avLst/>
+          </a:prstGeom>
+          <a:noFill/>
+        </p:spPr>
+        <p:txBody>
+          <a:bodyPr wrap="none" rtlCol="0">
+            <a:spAutoFit/>
+          </a:bodyPr>
+          <a:lstStyle/>
+          <a:p>
+            <a:pPr>
+              <a:lnSpc>
+                <a:spcPct val="120000"/>
+              </a:lnSpc>
+            </a:pPr>
+            <a:r>
+              <a:rPr kumimoji="1" lang="en-US" altLang="ko-KR" sz="1400" dirty="0" smtClean="0">
+                <a:solidFill>
+                  <a:schemeClr val="tx1">
+                    <a:lumMod val="50000"/>
+                    <a:lumOff val="50000"/>
+                  </a:schemeClr>
+                </a:solidFill>
+                <a:latin typeface="Consolas" charset="0"/>
+                <a:ea typeface="Consolas" charset="0"/>
+                <a:cs typeface="Consolas" charset="0"/>
+              </a:rPr>
+              <a:t>[</a:t>
+            </a:r>
+            <a:r>
+              <a:rPr kumimoji="1" lang="ko-KR" altLang="en-US" sz="1400" dirty="0" smtClean="0">
+                <a:solidFill>
+                  <a:schemeClr val="tx1">
+                    <a:lumMod val="50000"/>
+                    <a:lumOff val="50000"/>
+                  </a:schemeClr>
+                </a:solidFill>
+                <a:latin typeface="Consolas" charset="0"/>
+                <a:ea typeface="Consolas" charset="0"/>
+                <a:cs typeface="Consolas" charset="0"/>
+              </a:rPr>
+              <a:t>모든 타입</a:t>
+            </a:r>
+            <a:r>
+              <a:rPr kumimoji="1" lang="en-US" altLang="ko-KR" sz="1400" dirty="0" smtClean="0">
+                <a:solidFill>
+                  <a:schemeClr val="tx1">
+                    <a:lumMod val="50000"/>
+                    <a:lumOff val="50000"/>
+                  </a:schemeClr>
+                </a:solidFill>
+                <a:latin typeface="Consolas" charset="0"/>
+                <a:ea typeface="Consolas" charset="0"/>
+                <a:cs typeface="Consolas" charset="0"/>
+              </a:rPr>
+              <a:t>]</a:t>
+            </a:r>
+            <a:r>
+              <a:rPr kumimoji="1" lang="ko-KR" altLang="en-US" sz="1400" dirty="0" smtClean="0">
+                <a:solidFill>
+                  <a:schemeClr val="tx1">
+                    <a:lumMod val="50000"/>
+                    <a:lumOff val="50000"/>
+                  </a:schemeClr>
+                </a:solidFill>
+                <a:latin typeface="Consolas" charset="0"/>
+                <a:ea typeface="Consolas" charset="0"/>
+                <a:cs typeface="Consolas" charset="0"/>
+              </a:rPr>
+              <a:t> </a:t>
+            </a:r>
+            <a:r>
+              <a:rPr kumimoji="1" lang="en-US" altLang="ko-KR" sz="1400" dirty="0">
+                <a:solidFill>
+                  <a:schemeClr val="tx1">
+                    <a:lumMod val="50000"/>
+                    <a:lumOff val="50000"/>
+                  </a:schemeClr>
+                </a:solidFill>
+                <a:latin typeface="Consolas" charset="0"/>
+                <a:ea typeface="Consolas" charset="0"/>
+                <a:cs typeface="Consolas" charset="0"/>
+              </a:rPr>
+              <a:t>?</a:t>
+            </a:r>
+            <a:r>
+              <a:rPr kumimoji="1" lang="ko-KR" altLang="en-US" sz="1400" dirty="0" smtClean="0">
+                <a:solidFill>
+                  <a:schemeClr val="tx1">
+                    <a:lumMod val="50000"/>
+                    <a:lumOff val="50000"/>
+                  </a:schemeClr>
+                </a:solidFill>
+                <a:latin typeface="Consolas" charset="0"/>
+                <a:ea typeface="Consolas" charset="0"/>
+                <a:cs typeface="Consolas" charset="0"/>
+              </a:rPr>
+              <a:t> </a:t>
+            </a:r>
+            <a:r>
+              <a:rPr kumimoji="1" lang="en-US" altLang="ko-KR" sz="1400" dirty="0" smtClean="0">
+                <a:solidFill>
+                  <a:schemeClr val="tx1">
+                    <a:lumMod val="50000"/>
+                    <a:lumOff val="50000"/>
+                  </a:schemeClr>
+                </a:solidFill>
+                <a:latin typeface="Consolas" charset="0"/>
+                <a:ea typeface="Consolas" charset="0"/>
+                <a:cs typeface="Consolas" charset="0"/>
+              </a:rPr>
+              <a:t>[</a:t>
+            </a:r>
+            <a:r>
+              <a:rPr kumimoji="1" lang="ko-KR" altLang="en-US" sz="1400" dirty="0" smtClean="0">
+                <a:solidFill>
+                  <a:schemeClr val="tx1">
+                    <a:lumMod val="50000"/>
+                    <a:lumOff val="50000"/>
+                  </a:schemeClr>
+                </a:solidFill>
+                <a:latin typeface="Consolas" charset="0"/>
+                <a:ea typeface="Consolas" charset="0"/>
+                <a:cs typeface="Consolas" charset="0"/>
+              </a:rPr>
+              <a:t>모든 타입</a:t>
+            </a:r>
+            <a:r>
+              <a:rPr kumimoji="1" lang="en-US" altLang="ko-KR" sz="1400" dirty="0" smtClean="0">
+                <a:solidFill>
+                  <a:schemeClr val="tx1">
+                    <a:lumMod val="50000"/>
+                    <a:lumOff val="50000"/>
+                  </a:schemeClr>
+                </a:solidFill>
+                <a:latin typeface="Consolas" charset="0"/>
+                <a:ea typeface="Consolas" charset="0"/>
+                <a:cs typeface="Consolas" charset="0"/>
+              </a:rPr>
+              <a:t>]</a:t>
+            </a:r>
+            <a:r>
+              <a:rPr kumimoji="1" lang="ko-KR" altLang="en-US" sz="1400" dirty="0" smtClean="0">
+                <a:solidFill>
+                  <a:schemeClr val="tx1">
+                    <a:lumMod val="50000"/>
+                    <a:lumOff val="50000"/>
+                  </a:schemeClr>
+                </a:solidFill>
+                <a:latin typeface="Consolas" charset="0"/>
+                <a:ea typeface="Consolas" charset="0"/>
+                <a:cs typeface="Consolas" charset="0"/>
+              </a:rPr>
+              <a:t> </a:t>
+            </a:r>
+            <a:r>
+              <a:rPr kumimoji="1" lang="en-US" altLang="ko-KR" sz="1400" dirty="0" smtClean="0">
+                <a:solidFill>
+                  <a:schemeClr val="tx1">
+                    <a:lumMod val="50000"/>
+                    <a:lumOff val="50000"/>
+                  </a:schemeClr>
+                </a:solidFill>
+                <a:latin typeface="Consolas" charset="0"/>
+                <a:ea typeface="Consolas" charset="0"/>
+                <a:cs typeface="Consolas" charset="0"/>
+              </a:rPr>
+              <a:t>:</a:t>
+            </a:r>
+            <a:r>
+              <a:rPr kumimoji="1" lang="ko-KR" altLang="en-US" sz="1400" dirty="0" smtClean="0">
+                <a:solidFill>
+                  <a:schemeClr val="tx1">
+                    <a:lumMod val="50000"/>
+                    <a:lumOff val="50000"/>
+                  </a:schemeClr>
+                </a:solidFill>
+                <a:latin typeface="Consolas" charset="0"/>
+                <a:ea typeface="Consolas" charset="0"/>
+                <a:cs typeface="Consolas" charset="0"/>
+              </a:rPr>
+              <a:t> </a:t>
+            </a:r>
+            <a:r>
+              <a:rPr kumimoji="1" lang="en-US" altLang="ko-KR" sz="1400" dirty="0" smtClean="0">
+                <a:solidFill>
+                  <a:schemeClr val="tx1">
+                    <a:lumMod val="50000"/>
+                    <a:lumOff val="50000"/>
+                  </a:schemeClr>
+                </a:solidFill>
+                <a:latin typeface="Consolas" charset="0"/>
+                <a:ea typeface="Consolas" charset="0"/>
+                <a:cs typeface="Consolas" charset="0"/>
+              </a:rPr>
+              <a:t>[</a:t>
+            </a:r>
+            <a:r>
+              <a:rPr kumimoji="1" lang="ko-KR" altLang="en-US" sz="1400" dirty="0" smtClean="0">
+                <a:solidFill>
+                  <a:schemeClr val="tx1">
+                    <a:lumMod val="50000"/>
+                    <a:lumOff val="50000"/>
+                  </a:schemeClr>
+                </a:solidFill>
+                <a:latin typeface="Consolas" charset="0"/>
+                <a:ea typeface="Consolas" charset="0"/>
+                <a:cs typeface="Consolas" charset="0"/>
+              </a:rPr>
+              <a:t>모든 타입</a:t>
+            </a:r>
+            <a:r>
+              <a:rPr kumimoji="1" lang="en-US" altLang="ko-KR" sz="1400" dirty="0" smtClean="0">
+                <a:solidFill>
+                  <a:schemeClr val="tx1">
+                    <a:lumMod val="50000"/>
+                    <a:lumOff val="50000"/>
+                  </a:schemeClr>
+                </a:solidFill>
+                <a:latin typeface="Consolas" charset="0"/>
+                <a:ea typeface="Consolas" charset="0"/>
+                <a:cs typeface="Consolas" charset="0"/>
+              </a:rPr>
+              <a:t>]</a:t>
+            </a:r>
+            <a:endParaRPr kumimoji="1" lang="en-US" altLang="ko-KR" sz="1400" dirty="0" smtClean="0">
+              <a:solidFill>
+                <a:schemeClr val="tx1">
+                  <a:lumMod val="50000"/>
+                  <a:lumOff val="50000"/>
+                </a:schemeClr>
+              </a:solidFill>
+              <a:latin typeface="Consolas" charset="0"/>
+              <a:ea typeface="Consolas" charset="0"/>
+              <a:cs typeface="Consolas" charset="0"/>
+            </a:endParaRPr>
+          </a:p>
+        </p:txBody>
+      </p:sp>
+    </p:spTree>
+    <p:extLst>
+      <p:ext uri="{BB962C8B-B14F-4D97-AF65-F5344CB8AC3E}">
+        <p14:creationId xmlns:p14="http://schemas.microsoft.com/office/powerpoint/2010/main" val="1848269715"/>
+      </p:ext>
+    </p:extLst>
+  </p:cSld>
+  <p:clrMapOvr>
+    <a:masterClrMapping/>
+  </p:clrMapOvr>
+</p:sld>
+</file>
+
+<file path=ppt/slides/slide15.xml><?xml version="1.0" encoding="utf-8"?>
+<p:sld xmlns:a="http://schemas.openxmlformats.org/drawingml/2006/main" xmlns:r="http://schemas.openxmlformats.org/officeDocument/2006/relationships" xmlns:p="http://schemas.openxmlformats.org/presentationml/2006/main">
+  <p:cSld>
+    <p:spTree>
+      <p:nvGrpSpPr>
+        <p:cNvPr id="1" name=""/>
+        <p:cNvGrpSpPr/>
+        <p:nvPr/>
+      </p:nvGrpSpPr>
+      <p:grpSpPr>
+        <a:xfrm>
+          <a:off x="0" y="0"/>
+          <a:ext cx="0" cy="0"/>
+          <a:chOff x="0" y="0"/>
+          <a:chExt cx="0" cy="0"/>
+        </a:xfrm>
+      </p:grpSpPr>
+      <p:sp>
+        <p:nvSpPr>
+          <p:cNvPr id="2" name="제목 1"/>
+          <p:cNvSpPr>
+            <a:spLocks noGrp="1"/>
+          </p:cNvSpPr>
+          <p:nvPr>
+            <p:ph type="title"/>
+          </p:nvPr>
+        </p:nvSpPr>
+        <p:spPr>
+          <a:xfrm>
+            <a:off x="395536" y="199006"/>
+            <a:ext cx="4752528" cy="421682"/>
+          </a:xfrm>
+        </p:spPr>
+        <p:txBody>
+          <a:bodyPr>
+            <a:noAutofit/>
+          </a:bodyPr>
+          <a:lstStyle/>
+          <a:p>
+            <a:pPr algn="l"/>
+            <a:r>
+              <a:rPr lang="en-US" altLang="ko-KR" sz="2000" b="1" dirty="0" smtClean="0">
+                <a:solidFill>
+                  <a:schemeClr val="tx2"/>
+                </a:solidFill>
+                <a:latin typeface="Nanum Gothic" charset="-127"/>
+                <a:ea typeface="Nanum Gothic" charset="-127"/>
+                <a:cs typeface="Nanum Gothic" charset="-127"/>
+              </a:rPr>
+              <a:t>11.</a:t>
+            </a:r>
+            <a:r>
+              <a:rPr lang="ko-KR" altLang="en-US" sz="2000" b="1" dirty="0" smtClean="0">
+                <a:solidFill>
+                  <a:schemeClr val="tx2"/>
+                </a:solidFill>
+                <a:latin typeface="Nanum Gothic" charset="-127"/>
+                <a:ea typeface="Nanum Gothic" charset="-127"/>
+                <a:cs typeface="Nanum Gothic" charset="-127"/>
+              </a:rPr>
+              <a:t> </a:t>
+            </a:r>
+            <a:r>
+              <a:rPr lang="en-US" altLang="ko-KR" sz="2000" b="1" dirty="0" err="1" smtClean="0">
+                <a:solidFill>
+                  <a:schemeClr val="tx2"/>
+                </a:solidFill>
+                <a:latin typeface="Nanum Gothic" charset="-127"/>
+                <a:ea typeface="Nanum Gothic" charset="-127"/>
+                <a:cs typeface="Nanum Gothic" charset="-127"/>
+              </a:rPr>
+              <a:t>eval</a:t>
+            </a:r>
+            <a:r>
+              <a:rPr lang="en-US" altLang="ko-KR" sz="2000" b="1" dirty="0" smtClean="0">
+                <a:solidFill>
+                  <a:schemeClr val="tx2"/>
+                </a:solidFill>
+                <a:latin typeface="Nanum Gothic" charset="-127"/>
+                <a:ea typeface="Nanum Gothic" charset="-127"/>
+                <a:cs typeface="Nanum Gothic" charset="-127"/>
+              </a:rPr>
+              <a:t>()</a:t>
+            </a:r>
+            <a:endParaRPr lang="ko-KR" altLang="en-US" sz="2000" b="1" dirty="0">
+              <a:solidFill>
+                <a:schemeClr val="tx2"/>
+              </a:solidFill>
+              <a:latin typeface="Nanum Gothic" charset="-127"/>
+              <a:ea typeface="Nanum Gothic" charset="-127"/>
+              <a:cs typeface="Nanum Gothic" charset="-127"/>
+            </a:endParaRPr>
+          </a:p>
+        </p:txBody>
+      </p:sp>
+      <p:sp>
+        <p:nvSpPr>
+          <p:cNvPr id="4" name="직사각형 3"/>
+          <p:cNvSpPr/>
+          <p:nvPr/>
+        </p:nvSpPr>
+        <p:spPr>
+          <a:xfrm>
+            <a:off x="0" y="0"/>
+            <a:ext cx="323528" cy="692696"/>
+          </a:xfrm>
+          <a:prstGeom prst="rect">
+            <a:avLst/>
+          </a:prstGeom>
+          <a:solidFill>
+            <a:schemeClr val="tx2"/>
+          </a:solidFill>
+        </p:spPr>
+        <p:style>
+          <a:lnRef idx="2">
+            <a:schemeClr val="accent1">
+              <a:shade val="50000"/>
+            </a:schemeClr>
+          </a:lnRef>
+          <a:fillRef idx="1">
+            <a:schemeClr val="accent1"/>
+          </a:fillRef>
+          <a:effectRef idx="0">
+            <a:schemeClr val="accent1"/>
+          </a:effectRef>
+          <a:fontRef idx="minor">
+            <a:schemeClr val="lt1"/>
+          </a:fontRef>
+        </p:style>
+        <p:txBody>
+          <a:bodyPr rtlCol="0" anchor="ctr"/>
+          <a:lstStyle/>
+          <a:p>
+            <a:pPr algn="ctr"/>
+            <a:r>
+              <a:rPr kumimoji="1" lang="ko-KR" altLang="en-US" dirty="0" smtClean="0">
+                <a:solidFill>
+                  <a:schemeClr val="tx2"/>
+                </a:solidFill>
+              </a:rPr>
+              <a:t>ㅊ</a:t>
+            </a:r>
+            <a:endParaRPr kumimoji="1" lang="ko-KR" altLang="en-US" dirty="0">
+              <a:solidFill>
+                <a:schemeClr val="tx2"/>
+              </a:solidFill>
+            </a:endParaRPr>
+          </a:p>
+        </p:txBody>
+      </p:sp>
+      <p:sp>
+        <p:nvSpPr>
+          <p:cNvPr id="11" name="TextBox 6"/>
+          <p:cNvSpPr txBox="1"/>
+          <p:nvPr/>
+        </p:nvSpPr>
+        <p:spPr>
+          <a:xfrm>
+            <a:off x="732487" y="836712"/>
+            <a:ext cx="7249100" cy="2160591"/>
+          </a:xfrm>
+          <a:prstGeom prst="rect">
+            <a:avLst/>
+          </a:prstGeom>
+          <a:noFill/>
+        </p:spPr>
+        <p:txBody>
+          <a:bodyPr wrap="none" rtlCol="0">
+            <a:spAutoFit/>
+          </a:bodyPr>
+          <a:lstStyle/>
+          <a:p>
+            <a:pPr>
+              <a:lnSpc>
+                <a:spcPct val="120000"/>
+              </a:lnSpc>
+            </a:pPr>
+            <a:r>
+              <a:rPr kumimoji="1" lang="ko-KR" altLang="en-US" sz="1600" b="1" dirty="0" smtClean="0">
+                <a:solidFill>
+                  <a:schemeClr val="tx1">
+                    <a:lumMod val="75000"/>
+                    <a:lumOff val="25000"/>
+                  </a:schemeClr>
+                </a:solidFill>
+                <a:latin typeface="Nanum Gothic" charset="-127"/>
+                <a:ea typeface="Nanum Gothic" charset="-127"/>
+                <a:cs typeface="Nanum Gothic" charset="-127"/>
+              </a:rPr>
+              <a:t>문자열을 자바스크립트 코드로 해석해서 평가한 값을 출력하는 전역함수</a:t>
+            </a:r>
+            <a:endParaRPr kumimoji="1" lang="en-US" altLang="ko-KR" sz="1600" b="1" dirty="0" smtClean="0">
+              <a:solidFill>
+                <a:schemeClr val="tx1">
+                  <a:lumMod val="75000"/>
+                  <a:lumOff val="25000"/>
+                </a:schemeClr>
+              </a:solidFill>
+              <a:latin typeface="Nanum Gothic" charset="-127"/>
+              <a:ea typeface="Nanum Gothic" charset="-127"/>
+              <a:cs typeface="Nanum Gothic" charset="-127"/>
+            </a:endParaRPr>
+          </a:p>
+          <a:p>
+            <a:pPr>
+              <a:lnSpc>
+                <a:spcPct val="120000"/>
+              </a:lnSpc>
+            </a:pPr>
+            <a:r>
+              <a:rPr kumimoji="1" lang="ko-KR" altLang="en-US" sz="1600" dirty="0" smtClean="0">
+                <a:solidFill>
+                  <a:schemeClr val="tx1">
+                    <a:lumMod val="75000"/>
+                    <a:lumOff val="25000"/>
+                  </a:schemeClr>
+                </a:solidFill>
+                <a:latin typeface="Nanum Gothic" charset="-127"/>
+                <a:ea typeface="Nanum Gothic" charset="-127"/>
+                <a:cs typeface="Nanum Gothic" charset="-127"/>
+              </a:rPr>
+              <a:t>전역함수이지만 많은 기능이 제한되어 연산자처럼 동작하기에 연산자 챕터에 있다</a:t>
+            </a:r>
+            <a:r>
+              <a:rPr kumimoji="1" lang="en-US" altLang="ko-KR" sz="1600" dirty="0" smtClean="0">
+                <a:solidFill>
+                  <a:schemeClr val="tx1">
+                    <a:lumMod val="75000"/>
+                    <a:lumOff val="25000"/>
+                  </a:schemeClr>
+                </a:solidFill>
+                <a:latin typeface="Nanum Gothic" charset="-127"/>
+                <a:ea typeface="Nanum Gothic" charset="-127"/>
+                <a:cs typeface="Nanum Gothic" charset="-127"/>
+              </a:rPr>
+              <a:t>.</a:t>
+            </a:r>
+            <a:endParaRPr kumimoji="1" lang="en-US" altLang="ko-KR" sz="1600" dirty="0" smtClean="0">
+              <a:solidFill>
+                <a:schemeClr val="tx1">
+                  <a:lumMod val="75000"/>
+                  <a:lumOff val="25000"/>
+                </a:schemeClr>
+              </a:solidFill>
+              <a:latin typeface="Nanum Gothic" charset="-127"/>
+              <a:ea typeface="Nanum Gothic" charset="-127"/>
+              <a:cs typeface="Nanum Gothic" charset="-127"/>
+            </a:endParaRPr>
+          </a:p>
+          <a:p>
+            <a:pPr>
+              <a:lnSpc>
+                <a:spcPct val="120000"/>
+              </a:lnSpc>
+            </a:pPr>
+            <a:r>
+              <a:rPr kumimoji="1" lang="ko-KR" altLang="en-US" sz="1600" dirty="0" smtClean="0">
+                <a:solidFill>
+                  <a:schemeClr val="tx1">
+                    <a:lumMod val="75000"/>
+                    <a:lumOff val="25000"/>
+                  </a:schemeClr>
+                </a:solidFill>
+                <a:latin typeface="Nanum Gothic" charset="-127"/>
+                <a:ea typeface="Nanum Gothic" charset="-127"/>
+                <a:cs typeface="Nanum Gothic" charset="-127"/>
+              </a:rPr>
+              <a:t>소스코드를 동적으로 평가하는 기능은 강력하지만</a:t>
+            </a:r>
+            <a:endParaRPr kumimoji="1" lang="en-US" altLang="ko-KR" sz="1600" dirty="0" smtClean="0">
+              <a:solidFill>
+                <a:schemeClr val="tx1">
+                  <a:lumMod val="75000"/>
+                  <a:lumOff val="25000"/>
+                </a:schemeClr>
+              </a:solidFill>
+              <a:latin typeface="Nanum Gothic" charset="-127"/>
+              <a:ea typeface="Nanum Gothic" charset="-127"/>
+              <a:cs typeface="Nanum Gothic" charset="-127"/>
+            </a:endParaRPr>
+          </a:p>
+          <a:p>
+            <a:pPr>
+              <a:lnSpc>
+                <a:spcPct val="120000"/>
+              </a:lnSpc>
+            </a:pPr>
+            <a:r>
+              <a:rPr kumimoji="1" lang="ko-KR" altLang="en-US" sz="1600" dirty="0" smtClean="0">
+                <a:solidFill>
+                  <a:schemeClr val="tx1">
+                    <a:lumMod val="75000"/>
+                    <a:lumOff val="25000"/>
+                  </a:schemeClr>
+                </a:solidFill>
+                <a:latin typeface="Nanum Gothic" charset="-127"/>
+                <a:ea typeface="Nanum Gothic" charset="-127"/>
+                <a:cs typeface="Nanum Gothic" charset="-127"/>
+              </a:rPr>
+              <a:t>최적화에 영향을 끼치기에 삼가해야할 기능이다</a:t>
+            </a:r>
+            <a:r>
+              <a:rPr kumimoji="1" lang="en-US" altLang="ko-KR" sz="1600" dirty="0" smtClean="0">
+                <a:solidFill>
+                  <a:schemeClr val="tx1">
+                    <a:lumMod val="75000"/>
+                    <a:lumOff val="25000"/>
+                  </a:schemeClr>
+                </a:solidFill>
+                <a:latin typeface="Nanum Gothic" charset="-127"/>
+                <a:ea typeface="Nanum Gothic" charset="-127"/>
+                <a:cs typeface="Nanum Gothic" charset="-127"/>
+              </a:rPr>
+              <a:t>.</a:t>
+            </a:r>
+          </a:p>
+          <a:p>
+            <a:pPr>
+              <a:lnSpc>
+                <a:spcPct val="120000"/>
+              </a:lnSpc>
+            </a:pPr>
+            <a:endParaRPr kumimoji="1" lang="en-US" altLang="ko-KR" sz="1600" dirty="0" smtClean="0">
+              <a:solidFill>
+                <a:schemeClr val="tx1">
+                  <a:lumMod val="75000"/>
+                  <a:lumOff val="25000"/>
+                </a:schemeClr>
+              </a:solidFill>
+              <a:latin typeface="Nanum Gothic" charset="-127"/>
+              <a:ea typeface="Nanum Gothic" charset="-127"/>
+              <a:cs typeface="Nanum Gothic" charset="-127"/>
+            </a:endParaRPr>
+          </a:p>
+          <a:p>
+            <a:pPr>
+              <a:lnSpc>
+                <a:spcPct val="120000"/>
+              </a:lnSpc>
+            </a:pPr>
+            <a:r>
+              <a:rPr kumimoji="1" lang="en-US" altLang="ko-KR" sz="1600" dirty="0" smtClean="0">
+                <a:solidFill>
+                  <a:schemeClr val="tx1">
+                    <a:lumMod val="75000"/>
+                    <a:lumOff val="25000"/>
+                  </a:schemeClr>
+                </a:solidFill>
+                <a:latin typeface="Nanum Gothic" charset="-127"/>
+                <a:ea typeface="Nanum Gothic" charset="-127"/>
+                <a:cs typeface="Nanum Gothic" charset="-127"/>
+              </a:rPr>
+              <a:t>ECMA Script5</a:t>
+            </a:r>
+            <a:r>
+              <a:rPr kumimoji="1" lang="ko-KR" altLang="en-US" sz="1600" dirty="0" smtClean="0">
+                <a:solidFill>
+                  <a:schemeClr val="tx1">
+                    <a:lumMod val="75000"/>
+                    <a:lumOff val="25000"/>
+                  </a:schemeClr>
+                </a:solidFill>
+                <a:latin typeface="Nanum Gothic" charset="-127"/>
+                <a:ea typeface="Nanum Gothic" charset="-127"/>
+                <a:cs typeface="Nanum Gothic" charset="-127"/>
+              </a:rPr>
+              <a:t>부터 </a:t>
+            </a:r>
+            <a:r>
+              <a:rPr kumimoji="1" lang="en-US" altLang="ko-KR" sz="1600" dirty="0" err="1" smtClean="0">
+                <a:solidFill>
+                  <a:schemeClr val="tx1">
+                    <a:lumMod val="75000"/>
+                    <a:lumOff val="25000"/>
+                  </a:schemeClr>
+                </a:solidFill>
+                <a:latin typeface="Nanum Gothic" charset="-127"/>
+                <a:ea typeface="Nanum Gothic" charset="-127"/>
+                <a:cs typeface="Nanum Gothic" charset="-127"/>
+              </a:rPr>
+              <a:t>eval</a:t>
+            </a:r>
+            <a:r>
+              <a:rPr kumimoji="1" lang="en-US" altLang="ko-KR" sz="1600" dirty="0" smtClean="0">
+                <a:solidFill>
+                  <a:schemeClr val="tx1">
+                    <a:lumMod val="75000"/>
+                    <a:lumOff val="25000"/>
+                  </a:schemeClr>
+                </a:solidFill>
+                <a:latin typeface="Nanum Gothic" charset="-127"/>
+                <a:ea typeface="Nanum Gothic" charset="-127"/>
+                <a:cs typeface="Nanum Gothic" charset="-127"/>
+              </a:rPr>
+              <a:t>()</a:t>
+            </a:r>
+            <a:r>
+              <a:rPr kumimoji="1" lang="ko-KR" altLang="en-US" sz="1600" dirty="0" smtClean="0">
+                <a:solidFill>
+                  <a:schemeClr val="tx1">
+                    <a:lumMod val="75000"/>
+                    <a:lumOff val="25000"/>
+                  </a:schemeClr>
+                </a:solidFill>
+                <a:latin typeface="Nanum Gothic" charset="-127"/>
+                <a:ea typeface="Nanum Gothic" charset="-127"/>
+                <a:cs typeface="Nanum Gothic" charset="-127"/>
+              </a:rPr>
+              <a:t>은 호출 </a:t>
+            </a:r>
+            <a:r>
+              <a:rPr kumimoji="1" lang="en-US" altLang="ko-KR" sz="1600" dirty="0" smtClean="0">
+                <a:solidFill>
+                  <a:schemeClr val="tx1">
+                    <a:lumMod val="75000"/>
+                    <a:lumOff val="25000"/>
+                  </a:schemeClr>
+                </a:solidFill>
+                <a:latin typeface="Nanum Gothic" charset="-127"/>
+                <a:ea typeface="Nanum Gothic" charset="-127"/>
+                <a:cs typeface="Nanum Gothic" charset="-127"/>
+              </a:rPr>
+              <a:t>context</a:t>
+            </a:r>
+            <a:r>
+              <a:rPr kumimoji="1" lang="ko-KR" altLang="en-US" sz="1600" dirty="0" smtClean="0">
+                <a:solidFill>
+                  <a:schemeClr val="tx1">
+                    <a:lumMod val="75000"/>
+                    <a:lumOff val="25000"/>
+                  </a:schemeClr>
+                </a:solidFill>
+                <a:latin typeface="Nanum Gothic" charset="-127"/>
+                <a:ea typeface="Nanum Gothic" charset="-127"/>
+                <a:cs typeface="Nanum Gothic" charset="-127"/>
+              </a:rPr>
+              <a:t>의 변수환경을 그대로 사용한다</a:t>
+            </a:r>
+            <a:r>
+              <a:rPr kumimoji="1" lang="en-US" altLang="ko-KR" sz="1600" dirty="0" smtClean="0">
+                <a:solidFill>
+                  <a:schemeClr val="tx1">
+                    <a:lumMod val="75000"/>
+                    <a:lumOff val="25000"/>
+                  </a:schemeClr>
+                </a:solidFill>
+                <a:latin typeface="Nanum Gothic" charset="-127"/>
+                <a:ea typeface="Nanum Gothic" charset="-127"/>
+                <a:cs typeface="Nanum Gothic" charset="-127"/>
+              </a:rPr>
+              <a:t>.</a:t>
+            </a:r>
+          </a:p>
+          <a:p>
+            <a:pPr>
+              <a:lnSpc>
+                <a:spcPct val="120000"/>
+              </a:lnSpc>
+            </a:pPr>
+            <a:r>
+              <a:rPr kumimoji="1" lang="ko-KR" altLang="en-US" sz="1600" dirty="0" smtClean="0">
+                <a:solidFill>
+                  <a:schemeClr val="tx1">
+                    <a:lumMod val="75000"/>
+                    <a:lumOff val="25000"/>
+                  </a:schemeClr>
+                </a:solidFill>
+                <a:latin typeface="Nanum Gothic" charset="-127"/>
+                <a:ea typeface="Nanum Gothic" charset="-127"/>
+                <a:cs typeface="Nanum Gothic" charset="-127"/>
+              </a:rPr>
+              <a:t>예를 들면 다음과 같다</a:t>
+            </a:r>
+            <a:r>
+              <a:rPr kumimoji="1" lang="en-US" altLang="ko-KR" sz="1600" dirty="0" smtClean="0">
+                <a:solidFill>
+                  <a:schemeClr val="tx1">
+                    <a:lumMod val="75000"/>
+                    <a:lumOff val="25000"/>
+                  </a:schemeClr>
+                </a:solidFill>
+                <a:latin typeface="Nanum Gothic" charset="-127"/>
+                <a:ea typeface="Nanum Gothic" charset="-127"/>
+                <a:cs typeface="Nanum Gothic" charset="-127"/>
+              </a:rPr>
+              <a:t>.</a:t>
+            </a:r>
+            <a:endParaRPr kumimoji="1" lang="en-US" altLang="ko-KR" sz="1600" dirty="0">
+              <a:solidFill>
+                <a:schemeClr val="tx1">
+                  <a:lumMod val="75000"/>
+                  <a:lumOff val="25000"/>
+                </a:schemeClr>
+              </a:solidFill>
+              <a:latin typeface="Nanum Gothic" charset="-127"/>
+              <a:ea typeface="Nanum Gothic" charset="-127"/>
+              <a:cs typeface="Nanum Gothic" charset="-127"/>
+            </a:endParaRPr>
+          </a:p>
+        </p:txBody>
+      </p:sp>
+      <p:sp>
+        <p:nvSpPr>
+          <p:cNvPr id="13" name="TextBox 6"/>
+          <p:cNvSpPr txBox="1"/>
+          <p:nvPr/>
+        </p:nvSpPr>
+        <p:spPr>
+          <a:xfrm>
+            <a:off x="735389" y="3037894"/>
+            <a:ext cx="3265638" cy="598625"/>
+          </a:xfrm>
+          <a:prstGeom prst="rect">
+            <a:avLst/>
+          </a:prstGeom>
+          <a:noFill/>
+        </p:spPr>
+        <p:txBody>
+          <a:bodyPr wrap="none" rtlCol="0">
+            <a:spAutoFit/>
+          </a:bodyPr>
+          <a:lstStyle/>
+          <a:p>
+            <a:pPr>
+              <a:lnSpc>
+                <a:spcPct val="120000"/>
+              </a:lnSpc>
+            </a:pPr>
+            <a:r>
+              <a:rPr kumimoji="1" lang="en-US" altLang="ko-KR" sz="1400" dirty="0" err="1" smtClean="0">
+                <a:solidFill>
+                  <a:schemeClr val="tx1">
+                    <a:lumMod val="50000"/>
+                    <a:lumOff val="50000"/>
+                  </a:schemeClr>
+                </a:solidFill>
+                <a:latin typeface="Consolas" charset="0"/>
+                <a:ea typeface="Consolas" charset="0"/>
+                <a:cs typeface="Consolas" charset="0"/>
+              </a:rPr>
+              <a:t>var</a:t>
+            </a:r>
+            <a:r>
+              <a:rPr kumimoji="1" lang="en-US" altLang="ko-KR" sz="1400" dirty="0" smtClean="0">
+                <a:solidFill>
+                  <a:schemeClr val="tx1">
+                    <a:lumMod val="50000"/>
+                    <a:lumOff val="50000"/>
+                  </a:schemeClr>
+                </a:solidFill>
+                <a:latin typeface="Consolas" charset="0"/>
+                <a:ea typeface="Consolas" charset="0"/>
+                <a:cs typeface="Consolas" charset="0"/>
+              </a:rPr>
+              <a:t> </a:t>
+            </a:r>
+            <a:r>
+              <a:rPr kumimoji="1" lang="en-US" altLang="ko-KR" sz="1400" dirty="0" err="1" smtClean="0">
+                <a:solidFill>
+                  <a:schemeClr val="tx1">
+                    <a:lumMod val="50000"/>
+                    <a:lumOff val="50000"/>
+                  </a:schemeClr>
+                </a:solidFill>
+                <a:latin typeface="Consolas" charset="0"/>
+                <a:ea typeface="Consolas" charset="0"/>
+                <a:cs typeface="Consolas" charset="0"/>
+              </a:rPr>
+              <a:t>geval</a:t>
+            </a:r>
+            <a:r>
+              <a:rPr kumimoji="1" lang="en-US" altLang="ko-KR" sz="1400" dirty="0" smtClean="0">
+                <a:solidFill>
+                  <a:schemeClr val="tx1">
+                    <a:lumMod val="50000"/>
+                    <a:lumOff val="50000"/>
+                  </a:schemeClr>
+                </a:solidFill>
+                <a:latin typeface="Consolas" charset="0"/>
+                <a:ea typeface="Consolas" charset="0"/>
+                <a:cs typeface="Consolas" charset="0"/>
+              </a:rPr>
+              <a:t> = </a:t>
+            </a:r>
+            <a:r>
+              <a:rPr kumimoji="1" lang="en-US" altLang="ko-KR" sz="1400" dirty="0" err="1" smtClean="0">
+                <a:solidFill>
+                  <a:schemeClr val="tx1">
+                    <a:lumMod val="50000"/>
+                    <a:lumOff val="50000"/>
+                  </a:schemeClr>
+                </a:solidFill>
+                <a:latin typeface="Consolas" charset="0"/>
+                <a:ea typeface="Consolas" charset="0"/>
+                <a:cs typeface="Consolas" charset="0"/>
+              </a:rPr>
+              <a:t>eval</a:t>
+            </a:r>
+            <a:r>
+              <a:rPr kumimoji="1" lang="en-US" altLang="ko-KR" sz="1400" dirty="0" smtClean="0">
+                <a:solidFill>
+                  <a:schemeClr val="tx1">
+                    <a:lumMod val="50000"/>
+                    <a:lumOff val="50000"/>
+                  </a:schemeClr>
+                </a:solidFill>
+                <a:latin typeface="Consolas" charset="0"/>
+                <a:ea typeface="Consolas" charset="0"/>
+                <a:cs typeface="Consolas" charset="0"/>
+              </a:rPr>
+              <a:t>;</a:t>
+            </a:r>
+          </a:p>
+          <a:p>
+            <a:pPr>
+              <a:lnSpc>
+                <a:spcPct val="120000"/>
+              </a:lnSpc>
+            </a:pPr>
+            <a:r>
+              <a:rPr kumimoji="1" lang="en-US" altLang="ko-KR" sz="1400" dirty="0" err="1" smtClean="0">
+                <a:solidFill>
+                  <a:schemeClr val="tx1">
+                    <a:lumMod val="50000"/>
+                    <a:lumOff val="50000"/>
+                  </a:schemeClr>
+                </a:solidFill>
+                <a:latin typeface="Consolas" charset="0"/>
+                <a:ea typeface="Consolas" charset="0"/>
+                <a:cs typeface="Consolas" charset="0"/>
+              </a:rPr>
+              <a:t>var</a:t>
+            </a:r>
+            <a:r>
+              <a:rPr kumimoji="1" lang="en-US" altLang="ko-KR" sz="1400" dirty="0" smtClean="0">
+                <a:solidFill>
+                  <a:schemeClr val="tx1">
+                    <a:lumMod val="50000"/>
+                    <a:lumOff val="50000"/>
+                  </a:schemeClr>
+                </a:solidFill>
+                <a:latin typeface="Consolas" charset="0"/>
+                <a:ea typeface="Consolas" charset="0"/>
+                <a:cs typeface="Consolas" charset="0"/>
+              </a:rPr>
+              <a:t> x = ’global’, y = ‘global’;</a:t>
+            </a:r>
+            <a:endParaRPr kumimoji="1" lang="en-US" altLang="ko-KR" sz="1400" dirty="0" smtClean="0">
+              <a:solidFill>
+                <a:schemeClr val="tx1">
+                  <a:lumMod val="50000"/>
+                  <a:lumOff val="50000"/>
+                </a:schemeClr>
+              </a:solidFill>
+              <a:latin typeface="Consolas" charset="0"/>
+              <a:ea typeface="Consolas" charset="0"/>
+              <a:cs typeface="Consolas" charset="0"/>
             </a:endParaRPr>
           </a:p>
         </p:txBody>
@@ -11535,10 +14101,10 @@
                 <a:ea typeface="Nanum Gothic" charset="-127"/>
                 <a:cs typeface="Nanum Gothic" charset="-127"/>
               </a:rPr>
-              <a:t>1</a:t>
-            </a:r>
-            <a:r>
-              <a:rPr lang="en-US" altLang="ko-KR" sz="2000" b="1" dirty="0" smtClean="0">
+              <a:t>1.</a:t>
+            </a:r>
+            <a:r>
+              <a:rPr lang="ko-KR" altLang="en-US" sz="2000" b="1" dirty="0" smtClean="0">
                 <a:solidFill>
                   <a:schemeClr val="tx2"/>
                 </a:solidFill>
@@ -11546,29 +14112,7 @@
                 <a:ea typeface="Nanum Gothic" charset="-127"/>
                 <a:cs typeface="Nanum Gothic" charset="-127"/>
               </a:rPr>
-              <a:t>.</a:t>
-            </a:r>
-            <a:r>
-              <a:rPr lang="ko-KR" altLang="en-US" sz="2000" b="1" dirty="0" smtClean="0">
-                <a:solidFill>
-                  <a:schemeClr val="tx2"/>
-                </a:solidFill>
-                <a:latin typeface="Nanum Gothic" charset="-127"/>
-                <a:ea typeface="Nanum Gothic" charset="-127"/>
-                <a:cs typeface="Nanum Gothic" charset="-127"/>
-              </a:rPr>
-              <a:t> </a:t>
-            </a:r>
-            <a:r>
-              <a:rPr lang="ko-KR" altLang="en-US" sz="2000" b="1" dirty="0" smtClean="0">
-                <a:solidFill>
-                  <a:schemeClr val="tx2"/>
-                </a:solidFill>
-                <a:latin typeface="Nanum Gothic" charset="-127"/>
-                <a:ea typeface="Nanum Gothic" charset="-127"/>
-                <a:cs typeface="Nanum Gothic" charset="-127"/>
-              </a:rPr>
-              <a:t>표현식과 연산자란 무엇인가</a:t>
+              <a:t> 표현식과 연산자란 무엇인가</a:t>
             </a:r>
             <a:r>
               <a:rPr lang="en-US" altLang="ko-KR" sz="2000" b="1" dirty="0" smtClean="0">
@@ -12275,18 +14819,7 @@
                 <a:ea typeface="Nanum Gothic" charset="-127"/>
                 <a:cs typeface="Nanum Gothic" charset="-127"/>
               </a:rPr>
-              <a:t> </a:t>
-            </a:r>
-            <a:r>
-              <a:rPr lang="ko-KR" altLang="en-US" sz="2000" b="1" dirty="0" smtClean="0">
-                <a:solidFill>
-                  <a:schemeClr val="tx2"/>
-                </a:solidFill>
-                <a:latin typeface="Nanum Gothic" charset="-127"/>
-                <a:ea typeface="Nanum Gothic" charset="-127"/>
-                <a:cs typeface="Nanum Gothic" charset="-127"/>
-              </a:rPr>
-              <a:t>기본 표현식</a:t>
+              <a:t> 기본 표현식</a:t>
             </a:r>
             <a:endParaRPr lang="ko-KR" altLang="en-US" sz="2000" b="1" dirty="0">
               <a:solidFill>
@@ -13456,18 +15989,7 @@
                 <a:ea typeface="Nanum Gothic" charset="-127"/>
                 <a:cs typeface="Nanum Gothic" charset="-127"/>
               </a:rPr>
-              <a:t> </a:t>
-            </a:r>
-            <a:r>
-              <a:rPr lang="ko-KR" altLang="en-US" sz="2000" b="1" dirty="0" smtClean="0">
-                <a:solidFill>
-                  <a:schemeClr val="tx2"/>
-                </a:solidFill>
-                <a:latin typeface="Nanum Gothic" charset="-127"/>
-                <a:ea typeface="Nanum Gothic" charset="-127"/>
-                <a:cs typeface="Nanum Gothic" charset="-127"/>
-              </a:rPr>
-              <a:t>함수의 표현식</a:t>
+              <a:t> 함수의 표현식</a:t>
             </a:r>
             <a:endParaRPr lang="ko-KR" altLang="en-US" sz="2000" b="1" dirty="0">
               <a:solidFill>
@@ -14502,18 +17024,7 @@
                 <a:ea typeface="Nanum Gothic" charset="-127"/>
                 <a:cs typeface="Nanum Gothic" charset="-127"/>
               </a:rPr>
-              <a:t> </a:t>
-            </a:r>
-            <a:r>
-              <a:rPr lang="ko-KR" altLang="en-US" sz="2000" b="1" dirty="0" smtClean="0">
-                <a:solidFill>
-                  <a:schemeClr val="tx2"/>
-                </a:solidFill>
-                <a:latin typeface="Nanum Gothic" charset="-127"/>
-                <a:ea typeface="Nanum Gothic" charset="-127"/>
-                <a:cs typeface="Nanum Gothic" charset="-127"/>
-              </a:rPr>
-              <a:t>객체의 표현식</a:t>
+              <a:t> 객체의 표현식</a:t>
             </a:r>
             <a:endParaRPr lang="ko-KR" altLang="en-US" sz="2000" b="1" dirty="0">
               <a:solidFill>
@@ -16239,18 +18750,7 @@
                 <a:ea typeface="Nanum Gothic" charset="-127"/>
                 <a:cs typeface="Nanum Gothic" charset="-127"/>
               </a:rPr>
-              <a:t> </a:t>
-            </a:r>
-            <a:r>
-              <a:rPr lang="ko-KR" altLang="en-US" sz="2000" b="1" dirty="0" smtClean="0">
-                <a:solidFill>
-                  <a:schemeClr val="tx2"/>
-                </a:solidFill>
-                <a:latin typeface="Nanum Gothic" charset="-127"/>
-                <a:ea typeface="Nanum Gothic" charset="-127"/>
-                <a:cs typeface="Nanum Gothic" charset="-127"/>
-              </a:rPr>
-              <a:t>배열의 표현식</a:t>
+              <a:t> 배열의 표현식</a:t>
             </a:r>
             <a:endParaRPr lang="ko-KR" altLang="en-US" sz="2000" b="1" dirty="0">
               <a:solidFill>
@@ -17215,18 +19715,7 @@
                 <a:ea typeface="Nanum Gothic" charset="-127"/>
                 <a:cs typeface="Nanum Gothic" charset="-127"/>
               </a:rPr>
-              <a:t>6</a:t>
-            </a:r>
-            <a:r>
-              <a:rPr lang="en-US" altLang="ko-KR" sz="2000" b="1" dirty="0" smtClean="0">
-                <a:solidFill>
-                  <a:schemeClr val="tx2"/>
-                </a:solidFill>
-                <a:latin typeface="Nanum Gothic" charset="-127"/>
-                <a:ea typeface="Nanum Gothic" charset="-127"/>
-                <a:cs typeface="Nanum Gothic" charset="-127"/>
-              </a:rPr>
-              <a:t>.</a:t>
+              <a:t>6.</a:t>
             </a:r>
             <a:r>
               <a:rPr lang="ko-KR" altLang="en-US" sz="2000" b="1" dirty="0" smtClean="0">
@@ -18791,10 +21280,10 @@
                 <a:ea typeface="Nanum Gothic" charset="-127"/>
                 <a:cs typeface="Nanum Gothic" charset="-127"/>
               </a:rPr>
-              <a:t>7</a:t>
-            </a:r>
-            <a:r>
-              <a:rPr lang="en-US" altLang="ko-KR" sz="2000" b="1" dirty="0" smtClean="0">
+              <a:t>7.</a:t>
+            </a:r>
+            <a:r>
+              <a:rPr lang="ko-KR" altLang="en-US" sz="2000" b="1" dirty="0" smtClean="0">
                 <a:solidFill>
                   <a:schemeClr val="tx2"/>
                 </a:solidFill>
@@ -18802,29 +21291,7 @@
                 <a:ea typeface="Nanum Gothic" charset="-127"/>
                 <a:cs typeface="Nanum Gothic" charset="-127"/>
               </a:rPr>
-              <a:t>.</a:t>
-            </a:r>
-            <a:r>
-              <a:rPr lang="ko-KR" altLang="en-US" sz="2000" b="1" dirty="0" smtClean="0">
-                <a:solidFill>
-                  <a:schemeClr val="tx2"/>
-                </a:solidFill>
-                <a:latin typeface="Nanum Gothic" charset="-127"/>
-                <a:ea typeface="Nanum Gothic" charset="-127"/>
-                <a:cs typeface="Nanum Gothic" charset="-127"/>
-              </a:rPr>
-              <a:t> 연산자의 특징과 </a:t>
-            </a:r>
-            <a:r>
-              <a:rPr lang="ko-KR" altLang="en-US" sz="2000" b="1" dirty="0" smtClean="0">
-                <a:solidFill>
-                  <a:schemeClr val="tx2"/>
-                </a:solidFill>
-                <a:latin typeface="Nanum Gothic" charset="-127"/>
-                <a:ea typeface="Nanum Gothic" charset="-127"/>
-                <a:cs typeface="Nanum Gothic" charset="-127"/>
-              </a:rPr>
-              <a:t>우선순위</a:t>
+              <a:t> 연산자의 특징과 우선순위</a:t>
             </a:r>
             <a:endParaRPr lang="ko-KR" altLang="en-US" sz="2000" b="1" dirty="0">
               <a:solidFill>
@@ -20428,10 +22895,10 @@
                 <a:ea typeface="Nanum Gothic" charset="-127"/>
                 <a:cs typeface="Nanum Gothic" charset="-127"/>
               </a:rPr>
-              <a:t>7</a:t>
-            </a:r>
-            <a:r>
-              <a:rPr lang="en-US" altLang="ko-KR" sz="2000" b="1" dirty="0" smtClean="0">
+              <a:t>7.</a:t>
+            </a:r>
+            <a:r>
+              <a:rPr lang="ko-KR" altLang="en-US" sz="2000" b="1" dirty="0" smtClean="0">
                 <a:solidFill>
                   <a:schemeClr val="tx2"/>
                 </a:solidFill>
@@ -20439,29 +22906,7 @@
                 <a:ea typeface="Nanum Gothic" charset="-127"/>
                 <a:cs typeface="Nanum Gothic" charset="-127"/>
               </a:rPr>
-              <a:t>.</a:t>
-            </a:r>
-            <a:r>
-              <a:rPr lang="ko-KR" altLang="en-US" sz="2000" b="1" dirty="0" smtClean="0">
-                <a:solidFill>
-                  <a:schemeClr val="tx2"/>
-                </a:solidFill>
-                <a:latin typeface="Nanum Gothic" charset="-127"/>
-                <a:ea typeface="Nanum Gothic" charset="-127"/>
-                <a:cs typeface="Nanum Gothic" charset="-127"/>
-              </a:rPr>
-              <a:t> 연산자의 특징과 </a:t>
-            </a:r>
-            <a:r>
-              <a:rPr lang="ko-KR" altLang="en-US" sz="2000" b="1" dirty="0" smtClean="0">
-                <a:solidFill>
-                  <a:schemeClr val="tx2"/>
-                </a:solidFill>
-                <a:latin typeface="Nanum Gothic" charset="-127"/>
-                <a:ea typeface="Nanum Gothic" charset="-127"/>
-                <a:cs typeface="Nanum Gothic" charset="-127"/>
-              </a:rPr>
-              <a:t>우선순위</a:t>
+              <a:t> 연산자의 특징과 우선순위</a:t>
             </a:r>
             <a:endParaRPr lang="ko-KR" altLang="en-US" sz="2000" b="1" dirty="0">
               <a:solidFill>

</xml_diff>

<commit_message>
upload chapter 3, chapter 4
</commit_message>
<xml_diff>
--- a/Javascript_Perfect_Guide/week02_c04.pptx
+++ b/Javascript_Perfect_Guide/week02_c04.pptx
@@ -533,12 +533,10 @@
         </p:nvSpPr>
         <p:spPr/>
         <p:txBody>
-          <a:bodyPr>
-            <a:normAutofit/>
-          </a:bodyPr>
+          <a:bodyPr/>
           <a:lstStyle/>
           <a:p>
-            <a:endParaRPr lang="ko-KR" altLang="en-US" dirty="0"/>
+            <a:endParaRPr kumimoji="1" lang="ko-KR" altLang="en-US" dirty="0"/>
           </a:p>
         </p:txBody>
       </p:sp>
@@ -559,7 +557,7 @@
           <a:p>
             <a:fld id="{363F2302-BBF3-4341-9BA5-57316F180DD2}" type="slidenum">
               <a:rPr lang="ko-KR" altLang="en-US" smtClean="0"/>
-              <a:t>2</a:t>
+              <a:t>1</a:t>
             </a:fld>
             <a:endParaRPr lang="ko-KR" altLang="en-US"/>
           </a:p>
@@ -568,7 +566,7 @@
     </p:spTree>
     <p:extLst>
       <p:ext uri="{BB962C8B-B14F-4D97-AF65-F5344CB8AC3E}">
-        <p14:creationId xmlns:p14="http://schemas.microsoft.com/office/powerpoint/2010/main" val="1177527458"/>
+        <p14:creationId xmlns:p14="http://schemas.microsoft.com/office/powerpoint/2010/main" val="918063226"/>
       </p:ext>
     </p:extLst>
   </p:cSld>
@@ -645,7 +643,7 @@
           <a:p>
             <a:fld id="{363F2302-BBF3-4341-9BA5-57316F180DD2}" type="slidenum">
               <a:rPr lang="ko-KR" altLang="en-US" smtClean="0"/>
-              <a:t>11</a:t>
+              <a:t>10</a:t>
             </a:fld>
             <a:endParaRPr lang="ko-KR" altLang="en-US"/>
           </a:p>
@@ -654,7 +652,7 @@
     </p:spTree>
     <p:extLst>
       <p:ext uri="{BB962C8B-B14F-4D97-AF65-F5344CB8AC3E}">
-        <p14:creationId xmlns:p14="http://schemas.microsoft.com/office/powerpoint/2010/main" val="22980136"/>
+        <p14:creationId xmlns:p14="http://schemas.microsoft.com/office/powerpoint/2010/main" val="853144650"/>
       </p:ext>
     </p:extLst>
   </p:cSld>
@@ -731,7 +729,7 @@
           <a:p>
             <a:fld id="{363F2302-BBF3-4341-9BA5-57316F180DD2}" type="slidenum">
               <a:rPr lang="ko-KR" altLang="en-US" smtClean="0"/>
-              <a:t>12</a:t>
+              <a:t>11</a:t>
             </a:fld>
             <a:endParaRPr lang="ko-KR" altLang="en-US"/>
           </a:p>
@@ -740,7 +738,7 @@
     </p:spTree>
     <p:extLst>
       <p:ext uri="{BB962C8B-B14F-4D97-AF65-F5344CB8AC3E}">
-        <p14:creationId xmlns:p14="http://schemas.microsoft.com/office/powerpoint/2010/main" val="1317332424"/>
+        <p14:creationId xmlns:p14="http://schemas.microsoft.com/office/powerpoint/2010/main" val="22980136"/>
       </p:ext>
     </p:extLst>
   </p:cSld>
@@ -817,7 +815,7 @@
           <a:p>
             <a:fld id="{363F2302-BBF3-4341-9BA5-57316F180DD2}" type="slidenum">
               <a:rPr lang="ko-KR" altLang="en-US" smtClean="0"/>
-              <a:t>13</a:t>
+              <a:t>12</a:t>
             </a:fld>
             <a:endParaRPr lang="ko-KR" altLang="en-US"/>
           </a:p>
@@ -826,7 +824,7 @@
     </p:spTree>
     <p:extLst>
       <p:ext uri="{BB962C8B-B14F-4D97-AF65-F5344CB8AC3E}">
-        <p14:creationId xmlns:p14="http://schemas.microsoft.com/office/powerpoint/2010/main" val="1795074291"/>
+        <p14:creationId xmlns:p14="http://schemas.microsoft.com/office/powerpoint/2010/main" val="1317332424"/>
       </p:ext>
     </p:extLst>
   </p:cSld>
@@ -903,6 +901,92 @@
           <a:p>
             <a:fld id="{363F2302-BBF3-4341-9BA5-57316F180DD2}" type="slidenum">
               <a:rPr lang="ko-KR" altLang="en-US" smtClean="0"/>
+              <a:t>13</a:t>
+            </a:fld>
+            <a:endParaRPr lang="ko-KR" altLang="en-US"/>
+          </a:p>
+        </p:txBody>
+      </p:sp>
+    </p:spTree>
+    <p:extLst>
+      <p:ext uri="{BB962C8B-B14F-4D97-AF65-F5344CB8AC3E}">
+        <p14:creationId xmlns:p14="http://schemas.microsoft.com/office/powerpoint/2010/main" val="1795074291"/>
+      </p:ext>
+    </p:extLst>
+  </p:cSld>
+  <p:clrMapOvr>
+    <a:masterClrMapping/>
+  </p:clrMapOvr>
+</p:notes>
+</file>
+
+<file path=ppt/notesSlides/notesSlide14.xml><?xml version="1.0" encoding="utf-8"?>
+<p:notes xmlns:a="http://schemas.openxmlformats.org/drawingml/2006/main" xmlns:r="http://schemas.openxmlformats.org/officeDocument/2006/relationships" xmlns:p="http://schemas.openxmlformats.org/presentationml/2006/main">
+  <p:cSld>
+    <p:spTree>
+      <p:nvGrpSpPr>
+        <p:cNvPr id="1" name=""/>
+        <p:cNvGrpSpPr/>
+        <p:nvPr/>
+      </p:nvGrpSpPr>
+      <p:grpSpPr>
+        <a:xfrm>
+          <a:off x="0" y="0"/>
+          <a:ext cx="0" cy="0"/>
+          <a:chOff x="0" y="0"/>
+          <a:chExt cx="0" cy="0"/>
+        </a:xfrm>
+      </p:grpSpPr>
+      <p:sp>
+        <p:nvSpPr>
+          <p:cNvPr id="2" name="슬라이드 이미지 개체 틀 1"/>
+          <p:cNvSpPr>
+            <a:spLocks noGrp="1" noRot="1" noChangeAspect="1"/>
+          </p:cNvSpPr>
+          <p:nvPr>
+            <p:ph type="sldImg"/>
+          </p:nvPr>
+        </p:nvSpPr>
+        <p:spPr/>
+      </p:sp>
+      <p:sp>
+        <p:nvSpPr>
+          <p:cNvPr id="3" name="슬라이드 노트 개체 틀 2"/>
+          <p:cNvSpPr>
+            <a:spLocks noGrp="1"/>
+          </p:cNvSpPr>
+          <p:nvPr>
+            <p:ph type="body" idx="1"/>
+          </p:nvPr>
+        </p:nvSpPr>
+        <p:spPr/>
+        <p:txBody>
+          <a:bodyPr>
+            <a:normAutofit/>
+          </a:bodyPr>
+          <a:lstStyle/>
+          <a:p>
+            <a:endParaRPr lang="ko-KR" altLang="en-US" dirty="0"/>
+          </a:p>
+        </p:txBody>
+      </p:sp>
+      <p:sp>
+        <p:nvSpPr>
+          <p:cNvPr id="4" name="슬라이드 번호 개체 틀 3"/>
+          <p:cNvSpPr>
+            <a:spLocks noGrp="1"/>
+          </p:cNvSpPr>
+          <p:nvPr>
+            <p:ph type="sldNum" sz="quarter" idx="10"/>
+          </p:nvPr>
+        </p:nvSpPr>
+        <p:spPr/>
+        <p:txBody>
+          <a:bodyPr/>
+          <a:lstStyle/>
+          <a:p>
+            <a:fld id="{363F2302-BBF3-4341-9BA5-57316F180DD2}" type="slidenum">
+              <a:rPr lang="ko-KR" altLang="en-US" smtClean="0"/>
               <a:t>14</a:t>
             </a:fld>
             <a:endParaRPr lang="ko-KR" altLang="en-US"/>
@@ -922,7 +1006,7 @@
 </p:notes>
 </file>
 
-<file path=ppt/notesSlides/notesSlide14.xml><?xml version="1.0" encoding="utf-8"?>
+<file path=ppt/notesSlides/notesSlide15.xml><?xml version="1.0" encoding="utf-8"?>
 <p:notes xmlns:a="http://schemas.openxmlformats.org/drawingml/2006/main" xmlns:r="http://schemas.openxmlformats.org/officeDocument/2006/relationships" xmlns:p="http://schemas.openxmlformats.org/presentationml/2006/main">
   <p:cSld>
     <p:spTree>
@@ -1075,7 +1159,7 @@
           <a:p>
             <a:fld id="{363F2302-BBF3-4341-9BA5-57316F180DD2}" type="slidenum">
               <a:rPr lang="ko-KR" altLang="en-US" smtClean="0"/>
-              <a:t>3</a:t>
+              <a:t>2</a:t>
             </a:fld>
             <a:endParaRPr lang="ko-KR" altLang="en-US"/>
           </a:p>
@@ -1084,7 +1168,7 @@
     </p:spTree>
     <p:extLst>
       <p:ext uri="{BB962C8B-B14F-4D97-AF65-F5344CB8AC3E}">
-        <p14:creationId xmlns:p14="http://schemas.microsoft.com/office/powerpoint/2010/main" val="1211712608"/>
+        <p14:creationId xmlns:p14="http://schemas.microsoft.com/office/powerpoint/2010/main" val="1177527458"/>
       </p:ext>
     </p:extLst>
   </p:cSld>
@@ -1161,7 +1245,7 @@
           <a:p>
             <a:fld id="{363F2302-BBF3-4341-9BA5-57316F180DD2}" type="slidenum">
               <a:rPr lang="ko-KR" altLang="en-US" smtClean="0"/>
-              <a:t>4</a:t>
+              <a:t>3</a:t>
             </a:fld>
             <a:endParaRPr lang="ko-KR" altLang="en-US"/>
           </a:p>
@@ -1170,7 +1254,7 @@
     </p:spTree>
     <p:extLst>
       <p:ext uri="{BB962C8B-B14F-4D97-AF65-F5344CB8AC3E}">
-        <p14:creationId xmlns:p14="http://schemas.microsoft.com/office/powerpoint/2010/main" val="408838510"/>
+        <p14:creationId xmlns:p14="http://schemas.microsoft.com/office/powerpoint/2010/main" val="1211712608"/>
       </p:ext>
     </p:extLst>
   </p:cSld>
@@ -1247,7 +1331,7 @@
           <a:p>
             <a:fld id="{363F2302-BBF3-4341-9BA5-57316F180DD2}" type="slidenum">
               <a:rPr lang="ko-KR" altLang="en-US" smtClean="0"/>
-              <a:t>5</a:t>
+              <a:t>4</a:t>
             </a:fld>
             <a:endParaRPr lang="ko-KR" altLang="en-US"/>
           </a:p>
@@ -1256,7 +1340,7 @@
     </p:spTree>
     <p:extLst>
       <p:ext uri="{BB962C8B-B14F-4D97-AF65-F5344CB8AC3E}">
-        <p14:creationId xmlns:p14="http://schemas.microsoft.com/office/powerpoint/2010/main" val="1244852900"/>
+        <p14:creationId xmlns:p14="http://schemas.microsoft.com/office/powerpoint/2010/main" val="408838510"/>
       </p:ext>
     </p:extLst>
   </p:cSld>
@@ -1333,7 +1417,7 @@
           <a:p>
             <a:fld id="{363F2302-BBF3-4341-9BA5-57316F180DD2}" type="slidenum">
               <a:rPr lang="ko-KR" altLang="en-US" smtClean="0"/>
-              <a:t>6</a:t>
+              <a:t>5</a:t>
             </a:fld>
             <a:endParaRPr lang="ko-KR" altLang="en-US"/>
           </a:p>
@@ -1342,7 +1426,7 @@
     </p:spTree>
     <p:extLst>
       <p:ext uri="{BB962C8B-B14F-4D97-AF65-F5344CB8AC3E}">
-        <p14:creationId xmlns:p14="http://schemas.microsoft.com/office/powerpoint/2010/main" val="2075015627"/>
+        <p14:creationId xmlns:p14="http://schemas.microsoft.com/office/powerpoint/2010/main" val="1244852900"/>
       </p:ext>
     </p:extLst>
   </p:cSld>
@@ -1419,7 +1503,7 @@
           <a:p>
             <a:fld id="{363F2302-BBF3-4341-9BA5-57316F180DD2}" type="slidenum">
               <a:rPr lang="ko-KR" altLang="en-US" smtClean="0"/>
-              <a:t>7</a:t>
+              <a:t>6</a:t>
             </a:fld>
             <a:endParaRPr lang="ko-KR" altLang="en-US"/>
           </a:p>
@@ -1428,7 +1512,7 @@
     </p:spTree>
     <p:extLst>
       <p:ext uri="{BB962C8B-B14F-4D97-AF65-F5344CB8AC3E}">
-        <p14:creationId xmlns:p14="http://schemas.microsoft.com/office/powerpoint/2010/main" val="2005245729"/>
+        <p14:creationId xmlns:p14="http://schemas.microsoft.com/office/powerpoint/2010/main" val="2075015627"/>
       </p:ext>
     </p:extLst>
   </p:cSld>
@@ -1505,7 +1589,7 @@
           <a:p>
             <a:fld id="{363F2302-BBF3-4341-9BA5-57316F180DD2}" type="slidenum">
               <a:rPr lang="ko-KR" altLang="en-US" smtClean="0"/>
-              <a:t>8</a:t>
+              <a:t>7</a:t>
             </a:fld>
             <a:endParaRPr lang="ko-KR" altLang="en-US"/>
           </a:p>
@@ -1514,7 +1598,7 @@
     </p:spTree>
     <p:extLst>
       <p:ext uri="{BB962C8B-B14F-4D97-AF65-F5344CB8AC3E}">
-        <p14:creationId xmlns:p14="http://schemas.microsoft.com/office/powerpoint/2010/main" val="609871063"/>
+        <p14:creationId xmlns:p14="http://schemas.microsoft.com/office/powerpoint/2010/main" val="2005245729"/>
       </p:ext>
     </p:extLst>
   </p:cSld>
@@ -1591,7 +1675,7 @@
           <a:p>
             <a:fld id="{363F2302-BBF3-4341-9BA5-57316F180DD2}" type="slidenum">
               <a:rPr lang="ko-KR" altLang="en-US" smtClean="0"/>
-              <a:t>9</a:t>
+              <a:t>8</a:t>
             </a:fld>
             <a:endParaRPr lang="ko-KR" altLang="en-US"/>
           </a:p>
@@ -1600,7 +1684,7 @@
     </p:spTree>
     <p:extLst>
       <p:ext uri="{BB962C8B-B14F-4D97-AF65-F5344CB8AC3E}">
-        <p14:creationId xmlns:p14="http://schemas.microsoft.com/office/powerpoint/2010/main" val="2141788844"/>
+        <p14:creationId xmlns:p14="http://schemas.microsoft.com/office/powerpoint/2010/main" val="609871063"/>
       </p:ext>
     </p:extLst>
   </p:cSld>
@@ -1677,7 +1761,7 @@
           <a:p>
             <a:fld id="{363F2302-BBF3-4341-9BA5-57316F180DD2}" type="slidenum">
               <a:rPr lang="ko-KR" altLang="en-US" smtClean="0"/>
-              <a:t>10</a:t>
+              <a:t>9</a:t>
             </a:fld>
             <a:endParaRPr lang="ko-KR" altLang="en-US"/>
           </a:p>
@@ -1686,7 +1770,7 @@
     </p:spTree>
     <p:extLst>
       <p:ext uri="{BB962C8B-B14F-4D97-AF65-F5344CB8AC3E}">
-        <p14:creationId xmlns:p14="http://schemas.microsoft.com/office/powerpoint/2010/main" val="853144650"/>
+        <p14:creationId xmlns:p14="http://schemas.microsoft.com/office/powerpoint/2010/main" val="2141788844"/>
       </p:ext>
     </p:extLst>
   </p:cSld>
@@ -7888,6 +7972,13 @@
   <p:clrMapOvr>
     <a:masterClrMapping/>
   </p:clrMapOvr>
+  <p:timing>
+    <p:tnLst>
+      <p:par>
+        <p:cTn id="1" dur="indefinite" restart="never" nodeType="tmRoot"/>
+      </p:par>
+    </p:tnLst>
+  </p:timing>
 </p:sld>
 </file>
 
@@ -9467,6 +9558,13 @@
   <p:clrMapOvr>
     <a:masterClrMapping/>
   </p:clrMapOvr>
+  <p:timing>
+    <p:tnLst>
+      <p:par>
+        <p:cTn id="1" dur="indefinite" restart="never" nodeType="tmRoot"/>
+      </p:par>
+    </p:tnLst>
+  </p:timing>
 </p:sld>
 </file>
 
@@ -10135,6 +10233,13 @@
   <p:clrMapOvr>
     <a:masterClrMapping/>
   </p:clrMapOvr>
+  <p:timing>
+    <p:tnLst>
+      <p:par>
+        <p:cTn id="1" dur="indefinite" restart="never" nodeType="tmRoot"/>
+      </p:par>
+    </p:tnLst>
+  </p:timing>
 </p:sld>
 </file>
 
@@ -10957,7 +11062,21 @@
                 <a:ea typeface="Nanum Gothic" charset="-127"/>
                 <a:cs typeface="Nanum Gothic" charset="-127"/>
               </a:rPr>
-              <a:t>객체의 </a:t>
+              <a:t>객체의 클래스</a:t>
+            </a:r>
+            <a:r>
+              <a:rPr kumimoji="1" lang="en-US" altLang="ko-KR" sz="1600" dirty="0" smtClean="0">
+                <a:solidFill>
+                  <a:schemeClr val="tx1">
+                    <a:lumMod val="75000"/>
+                    <a:lumOff val="25000"/>
+                  </a:schemeClr>
+                </a:solidFill>
+                <a:latin typeface="Nanum Gothic" charset="-127"/>
+                <a:ea typeface="Nanum Gothic" charset="-127"/>
+                <a:cs typeface="Nanum Gothic" charset="-127"/>
+              </a:rPr>
+              <a:t>(</a:t>
             </a:r>
             <a:r>
               <a:rPr kumimoji="1" lang="ko-KR" altLang="en-US" sz="1600" dirty="0" smtClean="0">
@@ -10971,7 +11090,7 @@
                 <a:ea typeface="Nanum Gothic" charset="-127"/>
                 <a:cs typeface="Nanum Gothic" charset="-127"/>
               </a:rPr>
-              <a:t>클래스</a:t>
+              <a:t>생성자 함수</a:t>
             </a:r>
             <a:r>
               <a:rPr kumimoji="1" lang="en-US" altLang="ko-KR" sz="1600" dirty="0" smtClean="0">
@@ -10985,7 +11104,7 @@
                 <a:ea typeface="Nanum Gothic" charset="-127"/>
                 <a:cs typeface="Nanum Gothic" charset="-127"/>
               </a:rPr>
-              <a:t>(</a:t>
+              <a:t>)</a:t>
             </a:r>
             <a:r>
               <a:rPr kumimoji="1" lang="ko-KR" altLang="en-US" sz="1600" dirty="0" smtClean="0">
@@ -10999,49 +11118,7 @@
                 <a:ea typeface="Nanum Gothic" charset="-127"/>
                 <a:cs typeface="Nanum Gothic" charset="-127"/>
               </a:rPr>
-              <a:t>생성자 함수</a:t>
-            </a:r>
-            <a:r>
-              <a:rPr kumimoji="1" lang="en-US" altLang="ko-KR" sz="1600" dirty="0" smtClean="0">
-                <a:solidFill>
-                  <a:schemeClr val="tx1">
-                    <a:lumMod val="75000"/>
-                    <a:lumOff val="25000"/>
-                  </a:schemeClr>
-                </a:solidFill>
-                <a:latin typeface="Nanum Gothic" charset="-127"/>
-                <a:ea typeface="Nanum Gothic" charset="-127"/>
-                <a:cs typeface="Nanum Gothic" charset="-127"/>
-              </a:rPr>
-              <a:t>)</a:t>
-            </a:r>
-            <a:r>
-              <a:rPr kumimoji="1" lang="ko-KR" altLang="en-US" sz="1600" dirty="0" smtClean="0">
-                <a:solidFill>
-                  <a:schemeClr val="tx1">
-                    <a:lumMod val="75000"/>
-                    <a:lumOff val="25000"/>
-                  </a:schemeClr>
-                </a:solidFill>
-                <a:latin typeface="Nanum Gothic" charset="-127"/>
-                <a:ea typeface="Nanum Gothic" charset="-127"/>
-                <a:cs typeface="Nanum Gothic" charset="-127"/>
-              </a:rPr>
-              <a:t>를 </a:t>
-            </a:r>
-            <a:r>
-              <a:rPr kumimoji="1" lang="ko-KR" altLang="en-US" sz="1600" dirty="0" smtClean="0">
-                <a:solidFill>
-                  <a:schemeClr val="tx1">
-                    <a:lumMod val="75000"/>
-                    <a:lumOff val="25000"/>
-                  </a:schemeClr>
-                </a:solidFill>
-                <a:latin typeface="Nanum Gothic" charset="-127"/>
-                <a:ea typeface="Nanum Gothic" charset="-127"/>
-                <a:cs typeface="Nanum Gothic" charset="-127"/>
-              </a:rPr>
-              <a:t>체크하는 연산자</a:t>
+              <a:t>를 체크하는 연산자</a:t>
             </a:r>
             <a:endParaRPr kumimoji="1" lang="en-US" altLang="ko-KR" sz="1600" dirty="0" smtClean="0">
               <a:solidFill>
@@ -11073,49 +11150,7 @@
                 <a:ea typeface="Nanum Gothic" charset="-127"/>
                 <a:cs typeface="Nanum Gothic" charset="-127"/>
               </a:rPr>
-              <a:t>후에 프로토타입 체이닝을 알고나면 더 </a:t>
-            </a:r>
-            <a:r>
-              <a:rPr kumimoji="1" lang="ko-KR" altLang="en-US" sz="1600" dirty="0" smtClean="0">
-                <a:solidFill>
-                  <a:schemeClr val="tx1">
-                    <a:lumMod val="75000"/>
-                    <a:lumOff val="25000"/>
-                  </a:schemeClr>
-                </a:solidFill>
-                <a:latin typeface="Nanum Gothic" charset="-127"/>
-                <a:ea typeface="Nanum Gothic" charset="-127"/>
-                <a:cs typeface="Nanum Gothic" charset="-127"/>
-              </a:rPr>
-              <a:t>잘 이해 할 </a:t>
-            </a:r>
-            <a:r>
-              <a:rPr kumimoji="1" lang="ko-KR" altLang="en-US" sz="1600" dirty="0" smtClean="0">
-                <a:solidFill>
-                  <a:schemeClr val="tx1">
-                    <a:lumMod val="75000"/>
-                    <a:lumOff val="25000"/>
-                  </a:schemeClr>
-                </a:solidFill>
-                <a:latin typeface="Nanum Gothic" charset="-127"/>
-                <a:ea typeface="Nanum Gothic" charset="-127"/>
-                <a:cs typeface="Nanum Gothic" charset="-127"/>
-              </a:rPr>
-              <a:t>수 </a:t>
-            </a:r>
-            <a:r>
-              <a:rPr kumimoji="1" lang="ko-KR" altLang="en-US" sz="1600" dirty="0" smtClean="0">
-                <a:solidFill>
-                  <a:schemeClr val="tx1">
-                    <a:lumMod val="75000"/>
-                    <a:lumOff val="25000"/>
-                  </a:schemeClr>
-                </a:solidFill>
-                <a:latin typeface="Nanum Gothic" charset="-127"/>
-                <a:ea typeface="Nanum Gothic" charset="-127"/>
-                <a:cs typeface="Nanum Gothic" charset="-127"/>
-              </a:rPr>
-              <a:t>있다</a:t>
+              <a:t>후에 프로토타입 체이닝을 알고나면 더 잘 이해 할 수 있다</a:t>
             </a:r>
             <a:r>
               <a:rPr kumimoji="1" lang="en-US" altLang="ko-KR" sz="1600" dirty="0" smtClean="0">
@@ -11418,6 +11453,27 @@
               </a:rPr>
               <a:t>.</a:t>
             </a:r>
+          </a:p>
+          <a:p>
+            <a:pPr>
+              <a:lnSpc>
+                <a:spcPct val="120000"/>
+              </a:lnSpc>
+            </a:pPr>
+            <a:r>
+              <a:rPr kumimoji="1" lang="ko-KR" altLang="en-US" sz="1600" dirty="0" smtClean="0">
+                <a:solidFill>
+                  <a:schemeClr val="tx1">
+                    <a:lumMod val="75000"/>
+                    <a:lumOff val="25000"/>
+                  </a:schemeClr>
+                </a:solidFill>
+                <a:latin typeface="Nanum Gothic" charset="-127"/>
+                <a:ea typeface="Nanum Gothic" charset="-127"/>
+                <a:cs typeface="Nanum Gothic" charset="-127"/>
+              </a:rPr>
+              <a:t>몇가지 알아둬야할 부분은 </a:t>
+            </a:r>
             <a:endParaRPr kumimoji="1" lang="en-US" altLang="ko-KR" sz="1600" dirty="0" smtClean="0">
               <a:solidFill>
                 <a:schemeClr val="tx1">
@@ -11437,38 +11493,6 @@
               </a:lnSpc>
             </a:pPr>
             <a:r>
-              <a:rPr kumimoji="1" lang="ko-KR" altLang="en-US" sz="1600" dirty="0" smtClean="0">
-                <a:solidFill>
-                  <a:schemeClr val="tx1">
-                    <a:lumMod val="75000"/>
-                    <a:lumOff val="25000"/>
-                  </a:schemeClr>
-                </a:solidFill>
-                <a:latin typeface="Nanum Gothic" charset="-127"/>
-                <a:ea typeface="Nanum Gothic" charset="-127"/>
-                <a:cs typeface="Nanum Gothic" charset="-127"/>
-              </a:rPr>
-              <a:t>몇가지 알아둬야할 부분은 </a:t>
-            </a:r>
-            <a:endParaRPr kumimoji="1" lang="en-US" altLang="ko-KR" sz="1600" dirty="0" smtClean="0">
-              <a:solidFill>
-                <a:schemeClr val="tx1">
-                  <a:lumMod val="75000"/>
-                  <a:lumOff val="25000"/>
-                </a:schemeClr>
-              </a:solidFill>
-              <a:latin typeface="Nanum Gothic" charset="-127"/>
-              <a:ea typeface="Nanum Gothic" charset="-127"/>
-              <a:cs typeface="Nanum Gothic" charset="-127"/>
-            </a:endParaRPr>
-          </a:p>
-          <a:p>
-            <a:pPr>
-              <a:lnSpc>
-                <a:spcPct val="120000"/>
-              </a:lnSpc>
-            </a:pPr>
-            <a:r>
               <a:rPr kumimoji="1" lang="en-US" altLang="ko-KR" sz="1600" dirty="0" err="1" smtClean="0">
                 <a:solidFill>
                   <a:schemeClr val="tx1">
@@ -11524,17 +11548,6 @@
               </a:rPr>
               <a:t> null : object</a:t>
             </a:r>
-            <a:endParaRPr kumimoji="1" lang="en-US" altLang="ko-KR" sz="1600" dirty="0" smtClean="0">
-              <a:solidFill>
-                <a:schemeClr val="tx1">
-                  <a:lumMod val="75000"/>
-                  <a:lumOff val="25000"/>
-                </a:schemeClr>
-              </a:solidFill>
-              <a:latin typeface="Nanum Gothic" charset="-127"/>
-              <a:ea typeface="Nanum Gothic" charset="-127"/>
-              <a:cs typeface="Nanum Gothic" charset="-127"/>
-            </a:endParaRPr>
           </a:p>
         </p:txBody>
       </p:sp>
@@ -11621,17 +11634,6 @@
               </a:rPr>
               <a:t>]</a:t>
             </a:r>
-            <a:endParaRPr kumimoji="1" lang="en-US" altLang="ko-KR" sz="1400" dirty="0" smtClean="0">
-              <a:solidFill>
-                <a:schemeClr val="tx1">
-                  <a:lumMod val="50000"/>
-                  <a:lumOff val="50000"/>
-                </a:schemeClr>
-              </a:solidFill>
-              <a:latin typeface="Consolas" charset="0"/>
-              <a:ea typeface="Consolas" charset="0"/>
-              <a:cs typeface="Consolas" charset="0"/>
-            </a:endParaRPr>
           </a:p>
         </p:txBody>
       </p:sp>
@@ -11645,6 +11647,13 @@
   <p:clrMapOvr>
     <a:masterClrMapping/>
   </p:clrMapOvr>
+  <p:timing>
+    <p:tnLst>
+      <p:par>
+        <p:cTn id="1" dur="indefinite" restart="never" nodeType="tmRoot"/>
+      </p:par>
+    </p:tnLst>
+  </p:timing>
 </p:sld>
 </file>
 
@@ -12335,17 +12344,6 @@
               </a:rPr>
               <a:t>delete [property]</a:t>
             </a:r>
-            <a:endParaRPr kumimoji="1" lang="en-US" altLang="ko-KR" sz="1400" dirty="0" smtClean="0">
-              <a:solidFill>
-                <a:schemeClr val="tx1">
-                  <a:lumMod val="50000"/>
-                  <a:lumOff val="50000"/>
-                </a:schemeClr>
-              </a:solidFill>
-              <a:latin typeface="Consolas" charset="0"/>
-              <a:ea typeface="Consolas" charset="0"/>
-              <a:cs typeface="Consolas" charset="0"/>
-            </a:endParaRPr>
           </a:p>
         </p:txBody>
       </p:sp>
@@ -12446,17 +12444,6 @@
               </a:rPr>
               <a:t>.</a:t>
             </a:r>
-            <a:endParaRPr kumimoji="1" lang="en-US" altLang="ko-KR" sz="1600" dirty="0" smtClean="0">
-              <a:solidFill>
-                <a:schemeClr val="tx1">
-                  <a:lumMod val="75000"/>
-                  <a:lumOff val="25000"/>
-                </a:schemeClr>
-              </a:solidFill>
-              <a:latin typeface="Nanum Gothic" charset="-127"/>
-              <a:ea typeface="Nanum Gothic" charset="-127"/>
-              <a:cs typeface="Nanum Gothic" charset="-127"/>
-            </a:endParaRPr>
           </a:p>
         </p:txBody>
       </p:sp>
@@ -12499,10 +12486,10 @@
                 <a:ea typeface="Consolas" charset="0"/>
                 <a:cs typeface="Consolas" charset="0"/>
               </a:rPr>
-              <a:t>void</a:t>
-            </a:r>
-            <a:r>
-              <a:rPr kumimoji="1" lang="en-US" altLang="ko-KR" sz="1400" dirty="0" smtClean="0">
+              <a:t>void [</a:t>
+            </a:r>
+            <a:r>
+              <a:rPr kumimoji="1" lang="ko-KR" altLang="en-US" sz="1400" dirty="0" smtClean="0">
                 <a:solidFill>
                   <a:schemeClr val="tx1">
                     <a:lumMod val="50000"/>
@@ -12513,10 +12500,10 @@
                 <a:ea typeface="Consolas" charset="0"/>
                 <a:cs typeface="Consolas" charset="0"/>
               </a:rPr>
-              <a:t> [</a:t>
-            </a:r>
-            <a:r>
-              <a:rPr kumimoji="1" lang="ko-KR" altLang="en-US" sz="1400" dirty="0" smtClean="0">
+              <a:t>모든 타입</a:t>
+            </a:r>
+            <a:r>
+              <a:rPr kumimoji="1" lang="en-US" altLang="ko-KR" sz="1400" dirty="0" smtClean="0">
                 <a:solidFill>
                   <a:schemeClr val="tx1">
                     <a:lumMod val="50000"/>
@@ -12527,33 +12514,8 @@
                 <a:ea typeface="Consolas" charset="0"/>
                 <a:cs typeface="Consolas" charset="0"/>
               </a:rPr>
-              <a:t>모든 타입</a:t>
-            </a:r>
-            <a:r>
-              <a:rPr kumimoji="1" lang="en-US" altLang="ko-KR" sz="1400" dirty="0" smtClean="0">
-                <a:solidFill>
-                  <a:schemeClr val="tx1">
-                    <a:lumMod val="50000"/>
-                    <a:lumOff val="50000"/>
-                  </a:schemeClr>
-                </a:solidFill>
-                <a:latin typeface="Consolas" charset="0"/>
-                <a:ea typeface="Consolas" charset="0"/>
-                <a:cs typeface="Consolas" charset="0"/>
-              </a:rPr>
               <a:t>]</a:t>
             </a:r>
-            <a:endParaRPr kumimoji="1" lang="en-US" altLang="ko-KR" sz="1400" dirty="0" smtClean="0">
-              <a:solidFill>
-                <a:schemeClr val="tx1">
-                  <a:lumMod val="50000"/>
-                  <a:lumOff val="50000"/>
-                </a:schemeClr>
-              </a:solidFill>
-              <a:latin typeface="Consolas" charset="0"/>
-              <a:ea typeface="Consolas" charset="0"/>
-              <a:cs typeface="Consolas" charset="0"/>
-            </a:endParaRPr>
           </a:p>
         </p:txBody>
       </p:sp>
@@ -12590,20 +12552,7 @@
                 <a:ea typeface="Nanum Gothic" charset="-127"/>
                 <a:cs typeface="Nanum Gothic" charset="-127"/>
               </a:rPr>
-              <a:t>► </a:t>
-            </a:r>
-            <a:r>
-              <a:rPr kumimoji="1" lang="ko-KR" altLang="en-US" b="1" dirty="0" smtClean="0">
-                <a:solidFill>
-                  <a:schemeClr val="accent6">
-                    <a:lumMod val="50000"/>
-                  </a:schemeClr>
-                </a:solidFill>
-                <a:latin typeface="Nanum Gothic" charset="-127"/>
-                <a:ea typeface="Nanum Gothic" charset="-127"/>
-                <a:cs typeface="Nanum Gothic" charset="-127"/>
-              </a:rPr>
-              <a:t>쉼표</a:t>
+              <a:t>► 쉼표</a:t>
             </a:r>
             <a:r>
               <a:rPr kumimoji="1" lang="en-US" altLang="ko-KR" b="1" dirty="0" smtClean="0">
@@ -12874,17 +12823,6 @@
               </a:rPr>
               <a:t>.</a:t>
             </a:r>
-            <a:endParaRPr kumimoji="1" lang="en-US" altLang="ko-KR" sz="1600" dirty="0" smtClean="0">
-              <a:solidFill>
-                <a:schemeClr val="tx1">
-                  <a:lumMod val="75000"/>
-                  <a:lumOff val="25000"/>
-                </a:schemeClr>
-              </a:solidFill>
-              <a:latin typeface="Nanum Gothic" charset="-127"/>
-              <a:ea typeface="Nanum Gothic" charset="-127"/>
-              <a:cs typeface="Nanum Gothic" charset="-127"/>
-            </a:endParaRPr>
           </a:p>
         </p:txBody>
       </p:sp>
@@ -13013,17 +12951,6 @@
               </a:rPr>
               <a:t>]</a:t>
             </a:r>
-            <a:endParaRPr kumimoji="1" lang="en-US" altLang="ko-KR" sz="1400" dirty="0" smtClean="0">
-              <a:solidFill>
-                <a:schemeClr val="tx1">
-                  <a:lumMod val="50000"/>
-                  <a:lumOff val="50000"/>
-                </a:schemeClr>
-              </a:solidFill>
-              <a:latin typeface="Consolas" charset="0"/>
-              <a:ea typeface="Consolas" charset="0"/>
-              <a:cs typeface="Consolas" charset="0"/>
-            </a:endParaRPr>
           </a:p>
         </p:txBody>
       </p:sp>
@@ -13060,20 +12987,7 @@
                 <a:ea typeface="Nanum Gothic" charset="-127"/>
                 <a:cs typeface="Nanum Gothic" charset="-127"/>
               </a:rPr>
-              <a:t>► </a:t>
-            </a:r>
-            <a:r>
-              <a:rPr kumimoji="1" lang="ko-KR" altLang="en-US" b="1" dirty="0" smtClean="0">
-                <a:solidFill>
-                  <a:schemeClr val="accent6">
-                    <a:lumMod val="50000"/>
-                  </a:schemeClr>
-                </a:solidFill>
-                <a:latin typeface="Nanum Gothic" charset="-127"/>
-                <a:ea typeface="Nanum Gothic" charset="-127"/>
-                <a:cs typeface="Nanum Gothic" charset="-127"/>
-              </a:rPr>
-              <a:t>삼항</a:t>
+              <a:t>► 삼항</a:t>
             </a:r>
             <a:r>
               <a:rPr kumimoji="1" lang="en-US" altLang="ko-KR" b="1" dirty="0" smtClean="0">
@@ -13351,17 +13265,6 @@
               </a:rPr>
               <a:t>]</a:t>
             </a:r>
-            <a:endParaRPr kumimoji="1" lang="en-US" altLang="ko-KR" sz="1400" dirty="0" smtClean="0">
-              <a:solidFill>
-                <a:schemeClr val="tx1">
-                  <a:lumMod val="50000"/>
-                  <a:lumOff val="50000"/>
-                </a:schemeClr>
-              </a:solidFill>
-              <a:latin typeface="Consolas" charset="0"/>
-              <a:ea typeface="Consolas" charset="0"/>
-              <a:cs typeface="Consolas" charset="0"/>
-            </a:endParaRPr>
           </a:p>
         </p:txBody>
       </p:sp>
@@ -13375,6 +13278,13 @@
   <p:clrMapOvr>
     <a:masterClrMapping/>
   </p:clrMapOvr>
+  <p:timing>
+    <p:tnLst>
+      <p:par>
+        <p:cTn id="1" dur="indefinite" restart="never" nodeType="tmRoot"/>
+      </p:par>
+    </p:tnLst>
+  </p:timing>
 </p:sld>
 </file>
 
@@ -13615,17 +13525,6 @@
               </a:rPr>
               <a:t>.</a:t>
             </a:r>
-            <a:endParaRPr kumimoji="1" lang="en-US" altLang="ko-KR" sz="1600" dirty="0" smtClean="0">
-              <a:solidFill>
-                <a:schemeClr val="tx1">
-                  <a:lumMod val="75000"/>
-                  <a:lumOff val="25000"/>
-                </a:schemeClr>
-              </a:solidFill>
-              <a:latin typeface="Nanum Gothic" charset="-127"/>
-              <a:ea typeface="Nanum Gothic" charset="-127"/>
-              <a:cs typeface="Nanum Gothic" charset="-127"/>
-            </a:endParaRPr>
           </a:p>
           <a:p>
             <a:pPr>
@@ -13879,166 +13778,6 @@
           </a:p>
         </p:txBody>
       </p:sp>
-      <p:sp>
-        <p:nvSpPr>
-          <p:cNvPr id="13" name="TextBox 6"/>
-          <p:cNvSpPr txBox="1"/>
-          <p:nvPr/>
-        </p:nvSpPr>
-        <p:spPr>
-          <a:xfrm>
-            <a:off x="735389" y="3037894"/>
-            <a:ext cx="3265638" cy="598625"/>
-          </a:xfrm>
-          <a:prstGeom prst="rect">
-            <a:avLst/>
-          </a:prstGeom>
-          <a:noFill/>
-        </p:spPr>
-        <p:txBody>
-          <a:bodyPr wrap="none" rtlCol="0">
-            <a:spAutoFit/>
-          </a:bodyPr>
-          <a:lstStyle/>
-          <a:p>
-            <a:pPr>
-              <a:lnSpc>
-                <a:spcPct val="120000"/>
-              </a:lnSpc>
-            </a:pPr>
-            <a:r>
-              <a:rPr kumimoji="1" lang="en-US" altLang="ko-KR" sz="1400" dirty="0" err="1" smtClean="0">
-                <a:solidFill>
-                  <a:schemeClr val="tx1">
-                    <a:lumMod val="50000"/>
-                    <a:lumOff val="50000"/>
-                  </a:schemeClr>
-                </a:solidFill>
-                <a:latin typeface="Consolas" charset="0"/>
-                <a:ea typeface="Consolas" charset="0"/>
-                <a:cs typeface="Consolas" charset="0"/>
-              </a:rPr>
-              <a:t>var</a:t>
-            </a:r>
-            <a:r>
-              <a:rPr kumimoji="1" lang="en-US" altLang="ko-KR" sz="1400" dirty="0" smtClean="0">
-                <a:solidFill>
-                  <a:schemeClr val="tx1">
-                    <a:lumMod val="50000"/>
-                    <a:lumOff val="50000"/>
-                  </a:schemeClr>
-                </a:solidFill>
-                <a:latin typeface="Consolas" charset="0"/>
-                <a:ea typeface="Consolas" charset="0"/>
-                <a:cs typeface="Consolas" charset="0"/>
-              </a:rPr>
-              <a:t> </a:t>
-            </a:r>
-            <a:r>
-              <a:rPr kumimoji="1" lang="en-US" altLang="ko-KR" sz="1400" dirty="0" err="1" smtClean="0">
-                <a:solidFill>
-                  <a:schemeClr val="tx1">
-                    <a:lumMod val="50000"/>
-                    <a:lumOff val="50000"/>
-                  </a:schemeClr>
-                </a:solidFill>
-                <a:latin typeface="Consolas" charset="0"/>
-                <a:ea typeface="Consolas" charset="0"/>
-                <a:cs typeface="Consolas" charset="0"/>
-              </a:rPr>
-              <a:t>geval</a:t>
-            </a:r>
-            <a:r>
-              <a:rPr kumimoji="1" lang="en-US" altLang="ko-KR" sz="1400" dirty="0" smtClean="0">
-                <a:solidFill>
-                  <a:schemeClr val="tx1">
-                    <a:lumMod val="50000"/>
-                    <a:lumOff val="50000"/>
-                  </a:schemeClr>
-                </a:solidFill>
-                <a:latin typeface="Consolas" charset="0"/>
-                <a:ea typeface="Consolas" charset="0"/>
-                <a:cs typeface="Consolas" charset="0"/>
-              </a:rPr>
-              <a:t> = </a:t>
-            </a:r>
-            <a:r>
-              <a:rPr kumimoji="1" lang="en-US" altLang="ko-KR" sz="1400" dirty="0" err="1" smtClean="0">
-                <a:solidFill>
-                  <a:schemeClr val="tx1">
-                    <a:lumMod val="50000"/>
-                    <a:lumOff val="50000"/>
-                  </a:schemeClr>
-                </a:solidFill>
-                <a:latin typeface="Consolas" charset="0"/>
-                <a:ea typeface="Consolas" charset="0"/>
-                <a:cs typeface="Consolas" charset="0"/>
-              </a:rPr>
-              <a:t>eval</a:t>
-            </a:r>
-            <a:r>
-              <a:rPr kumimoji="1" lang="en-US" altLang="ko-KR" sz="1400" dirty="0" smtClean="0">
-                <a:solidFill>
-                  <a:schemeClr val="tx1">
-                    <a:lumMod val="50000"/>
-                    <a:lumOff val="50000"/>
-                  </a:schemeClr>
-                </a:solidFill>
-                <a:latin typeface="Consolas" charset="0"/>
-                <a:ea typeface="Consolas" charset="0"/>
-                <a:cs typeface="Consolas" charset="0"/>
-              </a:rPr>
-              <a:t>;</a:t>
-            </a:r>
-          </a:p>
-          <a:p>
-            <a:pPr>
-              <a:lnSpc>
-                <a:spcPct val="120000"/>
-              </a:lnSpc>
-            </a:pPr>
-            <a:r>
-              <a:rPr kumimoji="1" lang="en-US" altLang="ko-KR" sz="1400" dirty="0" err="1" smtClean="0">
-                <a:solidFill>
-                  <a:schemeClr val="tx1">
-                    <a:lumMod val="50000"/>
-                    <a:lumOff val="50000"/>
-                  </a:schemeClr>
-                </a:solidFill>
-                <a:latin typeface="Consolas" charset="0"/>
-                <a:ea typeface="Consolas" charset="0"/>
-                <a:cs typeface="Consolas" charset="0"/>
-              </a:rPr>
-              <a:t>var</a:t>
-            </a:r>
-            <a:r>
-              <a:rPr kumimoji="1" lang="en-US" altLang="ko-KR" sz="1400" dirty="0" smtClean="0">
-                <a:solidFill>
-                  <a:schemeClr val="tx1">
-                    <a:lumMod val="50000"/>
-                    <a:lumOff val="50000"/>
-                  </a:schemeClr>
-                </a:solidFill>
-                <a:latin typeface="Consolas" charset="0"/>
-                <a:ea typeface="Consolas" charset="0"/>
-                <a:cs typeface="Consolas" charset="0"/>
-              </a:rPr>
-              <a:t> x = ’global’, y = ‘global’;</a:t>
-            </a:r>
-            <a:endParaRPr kumimoji="1" lang="en-US" altLang="ko-KR" sz="1400" dirty="0" smtClean="0">
-              <a:solidFill>
-                <a:schemeClr val="tx1">
-                  <a:lumMod val="50000"/>
-                  <a:lumOff val="50000"/>
-                </a:schemeClr>
-              </a:solidFill>
-              <a:latin typeface="Consolas" charset="0"/>
-              <a:ea typeface="Consolas" charset="0"/>
-              <a:cs typeface="Consolas" charset="0"/>
-            </a:endParaRPr>
-          </a:p>
-        </p:txBody>
-      </p:sp>
     </p:spTree>
     <p:extLst>
       <p:ext uri="{BB962C8B-B14F-4D97-AF65-F5344CB8AC3E}">
@@ -14049,6 +13788,13 @@
   <p:clrMapOvr>
     <a:masterClrMapping/>
   </p:clrMapOvr>
+  <p:timing>
+    <p:tnLst>
+      <p:par>
+        <p:cTn id="1" dur="indefinite" restart="never" nodeType="tmRoot"/>
+      </p:par>
+    </p:tnLst>
+  </p:timing>
 </p:sld>
 </file>
 
@@ -15926,6 +15672,13 @@
   <p:clrMapOvr>
     <a:masterClrMapping/>
   </p:clrMapOvr>
+  <p:timing>
+    <p:tnLst>
+      <p:par>
+        <p:cTn id="1" dur="indefinite" restart="never" nodeType="tmRoot"/>
+      </p:par>
+    </p:tnLst>
+  </p:timing>
 </p:sld>
 </file>
 
@@ -16961,6 +16714,13 @@
   <p:clrMapOvr>
     <a:masterClrMapping/>
   </p:clrMapOvr>
+  <p:timing>
+    <p:tnLst>
+      <p:par>
+        <p:cTn id="1" dur="indefinite" restart="never" nodeType="tmRoot"/>
+      </p:par>
+    </p:tnLst>
+  </p:timing>
 </p:sld>
 </file>
 
@@ -18676,6 +18436,13 @@
   <p:clrMapOvr>
     <a:masterClrMapping/>
   </p:clrMapOvr>
+  <p:timing>
+    <p:tnLst>
+      <p:par>
+        <p:cTn id="1" dur="indefinite" restart="never" nodeType="tmRoot"/>
+      </p:par>
+    </p:tnLst>
+  </p:timing>
 </p:sld>
 </file>
 
@@ -19663,6 +19430,13 @@
   <p:clrMapOvr>
     <a:masterClrMapping/>
   </p:clrMapOvr>
+  <p:timing>
+    <p:tnLst>
+      <p:par>
+        <p:cTn id="1" dur="indefinite" restart="never" nodeType="tmRoot"/>
+      </p:par>
+    </p:tnLst>
+  </p:timing>
 </p:sld>
 </file>
 
@@ -21228,6 +21002,13 @@
   <p:clrMapOvr>
     <a:masterClrMapping/>
   </p:clrMapOvr>
+  <p:timing>
+    <p:tnLst>
+      <p:par>
+        <p:cTn id="1" dur="indefinite" restart="never" nodeType="tmRoot"/>
+      </p:par>
+    </p:tnLst>
+  </p:timing>
 </p:sld>
 </file>
 
@@ -22843,6 +22624,13 @@
   <p:clrMapOvr>
     <a:masterClrMapping/>
   </p:clrMapOvr>
+  <p:timing>
+    <p:tnLst>
+      <p:par>
+        <p:cTn id="1" dur="indefinite" restart="never" nodeType="tmRoot"/>
+      </p:par>
+    </p:tnLst>
+  </p:timing>
 </p:sld>
 </file>
 
@@ -23665,7 +23453,7 @@
                 <a:ea typeface="Nanum Gothic" charset="-127"/>
                 <a:cs typeface="Nanum Gothic" charset="-127"/>
               </a:rPr>
-              <a:t>2/0,</a:t>
+              <a:t>0/0</a:t>
             </a:r>
             <a:r>
               <a:rPr kumimoji="1" lang="ko-KR" altLang="en-US" sz="1600" dirty="0" smtClean="0">
@@ -23682,20 +23470,6 @@
               <a:t> </a:t>
             </a:r>
             <a:r>
-              <a:rPr kumimoji="1" lang="en-US" altLang="ko-KR" sz="1600" dirty="0" smtClean="0">
-                <a:solidFill>
-                  <a:schemeClr val="tx1">
-                    <a:lumMod val="75000"/>
-                    <a:lumOff val="25000"/>
-                  </a:schemeClr>
-                </a:solidFill>
-                <a:latin typeface="Nanum Gothic" charset="-127"/>
-                <a:ea typeface="Nanum Gothic" charset="-127"/>
-                <a:cs typeface="Nanum Gothic" charset="-127"/>
-              </a:rPr>
-              <a:t>0/2,</a:t>
-            </a:r>
-            <a:r>
               <a:rPr kumimoji="1" lang="ko-KR" altLang="en-US" sz="1600" dirty="0" smtClean="0">
                 <a:solidFill>
                   <a:schemeClr val="tx1">
@@ -23707,35 +23481,7 @@
                 <a:ea typeface="Nanum Gothic" charset="-127"/>
                 <a:cs typeface="Nanum Gothic" charset="-127"/>
               </a:rPr>
-              <a:t> </a:t>
-            </a:r>
-            <a:r>
-              <a:rPr kumimoji="1" lang="en-US" altLang="ko-KR" sz="1600" dirty="0" smtClean="0">
-                <a:solidFill>
-                  <a:schemeClr val="tx1">
-                    <a:lumMod val="75000"/>
-                    <a:lumOff val="25000"/>
-                  </a:schemeClr>
-                </a:solidFill>
-                <a:latin typeface="Nanum Gothic" charset="-127"/>
-                <a:ea typeface="Nanum Gothic" charset="-127"/>
-                <a:cs typeface="Nanum Gothic" charset="-127"/>
-              </a:rPr>
-              <a:t>0/0</a:t>
-            </a:r>
-            <a:r>
-              <a:rPr kumimoji="1" lang="ko-KR" altLang="en-US" sz="1600" dirty="0" smtClean="0">
-                <a:solidFill>
-                  <a:schemeClr val="tx1">
-                    <a:lumMod val="75000"/>
-                    <a:lumOff val="25000"/>
-                  </a:schemeClr>
-                </a:solidFill>
-                <a:latin typeface="Nanum Gothic" charset="-127"/>
-                <a:ea typeface="Nanum Gothic" charset="-127"/>
-                <a:cs typeface="Nanum Gothic" charset="-127"/>
-              </a:rPr>
-              <a:t> 등 </a:t>
+              <a:t>등 </a:t>
             </a:r>
             <a:endParaRPr kumimoji="1" lang="en-US" altLang="ko-KR" sz="1600" dirty="0" smtClean="0">
               <a:solidFill>
@@ -24220,6 +23966,13 @@
   <p:clrMapOvr>
     <a:masterClrMapping/>
   </p:clrMapOvr>
+  <p:timing>
+    <p:tnLst>
+      <p:par>
+        <p:cTn id="1" dur="indefinite" restart="never" nodeType="tmRoot"/>
+      </p:par>
+    </p:tnLst>
+  </p:timing>
 </p:sld>
 </file>
 

</xml_diff>